<commit_message>
added git link to last slide
</commit_message>
<xml_diff>
--- a/top4sports_presentation.pptx
+++ b/top4sports_presentation.pptx
@@ -38566,9 +38566,6 @@
           </a:p>
           <a:p>
             <a:pPr indent="0" lvl="0" marL="0" rtl="0" algn="ctr">
-              <a:lnSpc>
-                <a:spcPct val="150000"/>
-              </a:lnSpc>
               <a:spcBef>
                 <a:spcPts val="0"/>
               </a:spcBef>
@@ -38578,7 +38575,56 @@
               <a:buNone/>
             </a:pPr>
             <a:r>
-              <a:rPr lang="en" sz="1300"/>
+              <a:rPr lang="en" sz="1300" u="sng">
+                <a:solidFill>
+                  <a:schemeClr val="hlink"/>
+                </a:solidFill>
+                <a:hlinkClick r:id="rId3"/>
+              </a:rPr>
+              <a:t>github.com/Jaghs/demand-prediction-project</a:t>
+            </a:r>
+            <a:endParaRPr sz="1300"/>
+          </a:p>
+          <a:p>
+            <a:pPr indent="0" lvl="0" marL="0" rtl="0" algn="ctr">
+              <a:spcBef>
+                <a:spcPts val="0"/>
+              </a:spcBef>
+              <a:spcAft>
+                <a:spcPts val="0"/>
+              </a:spcAft>
+              <a:buClr>
+                <a:schemeClr val="dk1"/>
+              </a:buClr>
+              <a:buSzPts val="1100"/>
+              <a:buFont typeface="Arial"/>
+              <a:buNone/>
+            </a:pPr>
+            <a:r>
+              <a:t/>
+            </a:r>
+            <a:endParaRPr sz="1300"/>
+          </a:p>
+          <a:p>
+            <a:pPr indent="0" lvl="0" marL="0" rtl="0" algn="ctr">
+              <a:lnSpc>
+                <a:spcPct val="150000"/>
+              </a:lnSpc>
+              <a:spcBef>
+                <a:spcPts val="0"/>
+              </a:spcBef>
+              <a:spcAft>
+                <a:spcPts val="0"/>
+              </a:spcAft>
+              <a:buNone/>
+            </a:pPr>
+            <a:r>
+              <a:rPr lang="en" sz="1300" u="sng">
+                <a:solidFill>
+                  <a:schemeClr val="hlink"/>
+                </a:solidFill>
+                <a:hlinkClick r:id="rId4"/>
+              </a:rPr>
               <a:t>linkedin.com/in/jagvirdhesi/</a:t>
             </a:r>
             <a:endParaRPr sz="1300"/>
@@ -41337,492 +41383,6 @@
           </p:txBody>
         </p:sp>
       </p:grpSp>
-      <p:grpSp>
-        <p:nvGrpSpPr>
-          <p:cNvPr id="710" name="Google Shape;710;p43"/>
-          <p:cNvGrpSpPr/>
-          <p:nvPr/>
-        </p:nvGrpSpPr>
-        <p:grpSpPr>
-          <a:xfrm>
-            <a:off x="4320650" y="3058999"/>
-            <a:ext cx="502800" cy="502800"/>
-            <a:chOff x="7536900" y="2615775"/>
-            <a:chExt cx="502800" cy="502800"/>
-          </a:xfrm>
-        </p:grpSpPr>
-        <p:grpSp>
-          <p:nvGrpSpPr>
-            <p:cNvPr id="711" name="Google Shape;711;p43"/>
-            <p:cNvGrpSpPr/>
-            <p:nvPr/>
-          </p:nvGrpSpPr>
-          <p:grpSpPr>
-            <a:xfrm>
-              <a:off x="7628278" y="2728495"/>
-              <a:ext cx="320044" cy="277360"/>
-              <a:chOff x="6623062" y="2744141"/>
-              <a:chExt cx="208105" cy="186110"/>
-            </a:xfrm>
-          </p:grpSpPr>
-          <p:sp>
-            <p:nvSpPr>
-              <p:cNvPr id="712" name="Google Shape;712;p43"/>
-              <p:cNvSpPr/>
-              <p:nvPr/>
-            </p:nvSpPr>
-            <p:spPr>
-              <a:xfrm>
-                <a:off x="6630256" y="2809710"/>
-                <a:ext cx="47809" cy="120540"/>
-              </a:xfrm>
-              <a:custGeom>
-                <a:rect b="b" l="l" r="r" t="t"/>
-                <a:pathLst>
-                  <a:path extrusionOk="0" h="3787" w="1502">
-                    <a:moveTo>
-                      <a:pt x="1168" y="346"/>
-                    </a:moveTo>
-                    <a:lnTo>
-                      <a:pt x="1168" y="3430"/>
-                    </a:lnTo>
-                    <a:lnTo>
-                      <a:pt x="358" y="3430"/>
-                    </a:lnTo>
-                    <a:lnTo>
-                      <a:pt x="358" y="346"/>
-                    </a:lnTo>
-                    <a:close/>
-                    <a:moveTo>
-                      <a:pt x="180" y="1"/>
-                    </a:moveTo>
-                    <a:cubicBezTo>
-                      <a:pt x="96" y="1"/>
-                      <a:pt x="1" y="72"/>
-                      <a:pt x="1" y="179"/>
-                    </a:cubicBezTo>
-                    <a:lnTo>
-                      <a:pt x="1" y="3608"/>
-                    </a:lnTo>
-                    <a:cubicBezTo>
-                      <a:pt x="1" y="3703"/>
-                      <a:pt x="72" y="3787"/>
-                      <a:pt x="180" y="3787"/>
-                    </a:cubicBezTo>
-                    <a:lnTo>
-                      <a:pt x="1323" y="3787"/>
-                    </a:lnTo>
-                    <a:cubicBezTo>
-                      <a:pt x="1418" y="3787"/>
-                      <a:pt x="1501" y="3715"/>
-                      <a:pt x="1501" y="3608"/>
-                    </a:cubicBezTo>
-                    <a:lnTo>
-                      <a:pt x="1501" y="179"/>
-                    </a:lnTo>
-                    <a:cubicBezTo>
-                      <a:pt x="1501" y="72"/>
-                      <a:pt x="1430" y="1"/>
-                      <a:pt x="1323" y="1"/>
-                    </a:cubicBezTo>
-                    <a:close/>
-                  </a:path>
-                </a:pathLst>
-              </a:custGeom>
-              <a:solidFill>
-                <a:schemeClr val="dk1"/>
-              </a:solidFill>
-              <a:ln cap="flat" cmpd="sng" w="9525">
-                <a:solidFill>
-                  <a:schemeClr val="dk1"/>
-                </a:solidFill>
-                <a:prstDash val="solid"/>
-                <a:round/>
-                <a:headEnd len="sm" w="sm" type="none"/>
-                <a:tailEnd len="sm" w="sm" type="none"/>
-              </a:ln>
-            </p:spPr>
-            <p:txBody>
-              <a:bodyPr anchorCtr="0" anchor="ctr" bIns="91425" lIns="91425" spcFirstLastPara="1" rIns="91425" wrap="square" tIns="91425">
-                <a:noAutofit/>
-              </a:bodyPr>
-              <a:lstStyle/>
-              <a:p>
-                <a:pPr indent="0" lvl="0" marL="0" rtl="0" algn="l">
-                  <a:spcBef>
-                    <a:spcPts val="0"/>
-                  </a:spcBef>
-                  <a:spcAft>
-                    <a:spcPts val="0"/>
-                  </a:spcAft>
-                  <a:buNone/>
-                </a:pPr>
-                <a:r>
-                  <a:t/>
-                </a:r>
-                <a:endParaRPr/>
-              </a:p>
-            </p:txBody>
-          </p:sp>
-          <p:sp>
-            <p:nvSpPr>
-              <p:cNvPr id="713" name="Google Shape;713;p43"/>
-              <p:cNvSpPr/>
-              <p:nvPr/>
-            </p:nvSpPr>
-            <p:spPr>
-              <a:xfrm>
-                <a:off x="6623062" y="2744141"/>
-                <a:ext cx="55002" cy="55002"/>
-              </a:xfrm>
-              <a:custGeom>
-                <a:rect b="b" l="l" r="r" t="t"/>
-                <a:pathLst>
-                  <a:path extrusionOk="0" h="1728" w="1728">
-                    <a:moveTo>
-                      <a:pt x="870" y="334"/>
-                    </a:moveTo>
-                    <a:cubicBezTo>
-                      <a:pt x="1156" y="334"/>
-                      <a:pt x="1394" y="572"/>
-                      <a:pt x="1394" y="846"/>
-                    </a:cubicBezTo>
-                    <a:cubicBezTo>
-                      <a:pt x="1394" y="1132"/>
-                      <a:pt x="1156" y="1370"/>
-                      <a:pt x="870" y="1370"/>
-                    </a:cubicBezTo>
-                    <a:cubicBezTo>
-                      <a:pt x="584" y="1370"/>
-                      <a:pt x="346" y="1132"/>
-                      <a:pt x="346" y="846"/>
-                    </a:cubicBezTo>
-                    <a:cubicBezTo>
-                      <a:pt x="346" y="572"/>
-                      <a:pt x="584" y="334"/>
-                      <a:pt x="870" y="334"/>
-                    </a:cubicBezTo>
-                    <a:close/>
-                    <a:moveTo>
-                      <a:pt x="870" y="1"/>
-                    </a:moveTo>
-                    <a:cubicBezTo>
-                      <a:pt x="394" y="1"/>
-                      <a:pt x="1" y="394"/>
-                      <a:pt x="1" y="870"/>
-                    </a:cubicBezTo>
-                    <a:cubicBezTo>
-                      <a:pt x="1" y="1346"/>
-                      <a:pt x="394" y="1727"/>
-                      <a:pt x="870" y="1727"/>
-                    </a:cubicBezTo>
-                    <a:cubicBezTo>
-                      <a:pt x="1346" y="1727"/>
-                      <a:pt x="1727" y="1334"/>
-                      <a:pt x="1727" y="870"/>
-                    </a:cubicBezTo>
-                    <a:cubicBezTo>
-                      <a:pt x="1727" y="394"/>
-                      <a:pt x="1346" y="1"/>
-                      <a:pt x="870" y="1"/>
-                    </a:cubicBezTo>
-                    <a:close/>
-                  </a:path>
-                </a:pathLst>
-              </a:custGeom>
-              <a:solidFill>
-                <a:schemeClr val="dk1"/>
-              </a:solidFill>
-              <a:ln cap="flat" cmpd="sng" w="9525">
-                <a:solidFill>
-                  <a:schemeClr val="dk1"/>
-                </a:solidFill>
-                <a:prstDash val="solid"/>
-                <a:round/>
-                <a:headEnd len="sm" w="sm" type="none"/>
-                <a:tailEnd len="sm" w="sm" type="none"/>
-              </a:ln>
-            </p:spPr>
-            <p:txBody>
-              <a:bodyPr anchorCtr="0" anchor="ctr" bIns="91425" lIns="91425" spcFirstLastPara="1" rIns="91425" wrap="square" tIns="91425">
-                <a:noAutofit/>
-              </a:bodyPr>
-              <a:lstStyle/>
-              <a:p>
-                <a:pPr indent="0" lvl="0" marL="0" rtl="0" algn="l">
-                  <a:spcBef>
-                    <a:spcPts val="0"/>
-                  </a:spcBef>
-                  <a:spcAft>
-                    <a:spcPts val="0"/>
-                  </a:spcAft>
-                  <a:buNone/>
-                </a:pPr>
-                <a:r>
-                  <a:t/>
-                </a:r>
-                <a:endParaRPr/>
-              </a:p>
-            </p:txBody>
-          </p:sp>
-          <p:sp>
-            <p:nvSpPr>
-              <p:cNvPr id="714" name="Google Shape;714;p43"/>
-              <p:cNvSpPr/>
-              <p:nvPr/>
-            </p:nvSpPr>
-            <p:spPr>
-              <a:xfrm>
-                <a:off x="6703019" y="2809710"/>
-                <a:ext cx="128148" cy="120540"/>
-              </a:xfrm>
-              <a:custGeom>
-                <a:rect b="b" l="l" r="r" t="t"/>
-                <a:pathLst>
-                  <a:path extrusionOk="0" h="3787" w="4026">
-                    <a:moveTo>
-                      <a:pt x="191" y="1"/>
-                    </a:moveTo>
-                    <a:cubicBezTo>
-                      <a:pt x="96" y="1"/>
-                      <a:pt x="1" y="72"/>
-                      <a:pt x="1" y="179"/>
-                    </a:cubicBezTo>
-                    <a:lnTo>
-                      <a:pt x="1" y="3608"/>
-                    </a:lnTo>
-                    <a:cubicBezTo>
-                      <a:pt x="1" y="3703"/>
-                      <a:pt x="84" y="3787"/>
-                      <a:pt x="191" y="3787"/>
-                    </a:cubicBezTo>
-                    <a:lnTo>
-                      <a:pt x="1334" y="3787"/>
-                    </a:lnTo>
-                    <a:cubicBezTo>
-                      <a:pt x="1418" y="3787"/>
-                      <a:pt x="1513" y="3715"/>
-                      <a:pt x="1513" y="3608"/>
-                    </a:cubicBezTo>
-                    <a:lnTo>
-                      <a:pt x="1513" y="2382"/>
-                    </a:lnTo>
-                    <a:cubicBezTo>
-                      <a:pt x="1513" y="1977"/>
-                      <a:pt x="1596" y="1501"/>
-                      <a:pt x="2037" y="1501"/>
-                    </a:cubicBezTo>
-                    <a:cubicBezTo>
-                      <a:pt x="2347" y="1501"/>
-                      <a:pt x="2477" y="1763"/>
-                      <a:pt x="2525" y="2060"/>
-                    </a:cubicBezTo>
-                    <a:cubicBezTo>
-                      <a:pt x="2537" y="2156"/>
-                      <a:pt x="2608" y="2215"/>
-                      <a:pt x="2692" y="2215"/>
-                    </a:cubicBezTo>
-                    <a:cubicBezTo>
-                      <a:pt x="2787" y="2215"/>
-                      <a:pt x="2870" y="2120"/>
-                      <a:pt x="2847" y="2025"/>
-                    </a:cubicBezTo>
-                    <a:cubicBezTo>
-                      <a:pt x="2763" y="1465"/>
-                      <a:pt x="2477" y="1155"/>
-                      <a:pt x="2013" y="1155"/>
-                    </a:cubicBezTo>
-                    <a:cubicBezTo>
-                      <a:pt x="1465" y="1155"/>
-                      <a:pt x="1156" y="1608"/>
-                      <a:pt x="1156" y="2382"/>
-                    </a:cubicBezTo>
-                    <a:lnTo>
-                      <a:pt x="1156" y="3430"/>
-                    </a:lnTo>
-                    <a:lnTo>
-                      <a:pt x="346" y="3430"/>
-                    </a:lnTo>
-                    <a:lnTo>
-                      <a:pt x="346" y="358"/>
-                    </a:lnTo>
-                    <a:lnTo>
-                      <a:pt x="918" y="358"/>
-                    </a:lnTo>
-                    <a:lnTo>
-                      <a:pt x="918" y="572"/>
-                    </a:lnTo>
-                    <a:cubicBezTo>
-                      <a:pt x="918" y="632"/>
-                      <a:pt x="930" y="679"/>
-                      <a:pt x="977" y="715"/>
-                    </a:cubicBezTo>
-                    <a:cubicBezTo>
-                      <a:pt x="1007" y="733"/>
-                      <a:pt x="1043" y="742"/>
-                      <a:pt x="1078" y="742"/>
-                    </a:cubicBezTo>
-                    <a:cubicBezTo>
-                      <a:pt x="1114" y="742"/>
-                      <a:pt x="1150" y="733"/>
-                      <a:pt x="1180" y="715"/>
-                    </a:cubicBezTo>
-                    <a:cubicBezTo>
-                      <a:pt x="1477" y="477"/>
-                      <a:pt x="1835" y="358"/>
-                      <a:pt x="2227" y="358"/>
-                    </a:cubicBezTo>
-                    <a:cubicBezTo>
-                      <a:pt x="3204" y="358"/>
-                      <a:pt x="3656" y="1191"/>
-                      <a:pt x="3656" y="2001"/>
-                    </a:cubicBezTo>
-                    <a:lnTo>
-                      <a:pt x="3656" y="3430"/>
-                    </a:lnTo>
-                    <a:lnTo>
-                      <a:pt x="2847" y="3430"/>
-                    </a:lnTo>
-                    <a:lnTo>
-                      <a:pt x="2847" y="2870"/>
-                    </a:lnTo>
-                    <a:cubicBezTo>
-                      <a:pt x="2847" y="2775"/>
-                      <a:pt x="2775" y="2703"/>
-                      <a:pt x="2692" y="2703"/>
-                    </a:cubicBezTo>
-                    <a:cubicBezTo>
-                      <a:pt x="2597" y="2703"/>
-                      <a:pt x="2525" y="2775"/>
-                      <a:pt x="2525" y="2870"/>
-                    </a:cubicBezTo>
-                    <a:lnTo>
-                      <a:pt x="2525" y="3596"/>
-                    </a:lnTo>
-                    <a:cubicBezTo>
-                      <a:pt x="2525" y="3691"/>
-                      <a:pt x="2597" y="3775"/>
-                      <a:pt x="2704" y="3775"/>
-                    </a:cubicBezTo>
-                    <a:lnTo>
-                      <a:pt x="3847" y="3775"/>
-                    </a:lnTo>
-                    <a:cubicBezTo>
-                      <a:pt x="3942" y="3775"/>
-                      <a:pt x="4025" y="3703"/>
-                      <a:pt x="4025" y="3596"/>
-                    </a:cubicBezTo>
-                    <a:lnTo>
-                      <a:pt x="4025" y="1989"/>
-                    </a:lnTo>
-                    <a:cubicBezTo>
-                      <a:pt x="4025" y="810"/>
-                      <a:pt x="3299" y="1"/>
-                      <a:pt x="2239" y="1"/>
-                    </a:cubicBezTo>
-                    <a:cubicBezTo>
-                      <a:pt x="1894" y="1"/>
-                      <a:pt x="1573" y="84"/>
-                      <a:pt x="1275" y="251"/>
-                    </a:cubicBezTo>
-                    <a:lnTo>
-                      <a:pt x="1275" y="179"/>
-                    </a:lnTo>
-                    <a:cubicBezTo>
-                      <a:pt x="1275" y="84"/>
-                      <a:pt x="1204" y="1"/>
-                      <a:pt x="1096" y="1"/>
-                    </a:cubicBezTo>
-                    <a:close/>
-                  </a:path>
-                </a:pathLst>
-              </a:custGeom>
-              <a:solidFill>
-                <a:schemeClr val="dk1"/>
-              </a:solidFill>
-              <a:ln cap="flat" cmpd="sng" w="9525">
-                <a:solidFill>
-                  <a:schemeClr val="dk1"/>
-                </a:solidFill>
-                <a:prstDash val="solid"/>
-                <a:round/>
-                <a:headEnd len="sm" w="sm" type="none"/>
-                <a:tailEnd len="sm" w="sm" type="none"/>
-              </a:ln>
-            </p:spPr>
-            <p:txBody>
-              <a:bodyPr anchorCtr="0" anchor="ctr" bIns="91425" lIns="91425" spcFirstLastPara="1" rIns="91425" wrap="square" tIns="91425">
-                <a:noAutofit/>
-              </a:bodyPr>
-              <a:lstStyle/>
-              <a:p>
-                <a:pPr indent="0" lvl="0" marL="0" rtl="0" algn="l">
-                  <a:spcBef>
-                    <a:spcPts val="0"/>
-                  </a:spcBef>
-                  <a:spcAft>
-                    <a:spcPts val="0"/>
-                  </a:spcAft>
-                  <a:buNone/>
-                </a:pPr>
-                <a:r>
-                  <a:t/>
-                </a:r>
-                <a:endParaRPr/>
-              </a:p>
-            </p:txBody>
-          </p:sp>
-        </p:grpSp>
-        <p:sp>
-          <p:nvSpPr>
-            <p:cNvPr id="715" name="Google Shape;715;p43"/>
-            <p:cNvSpPr/>
-            <p:nvPr/>
-          </p:nvSpPr>
-          <p:spPr>
-            <a:xfrm>
-              <a:off x="7536900" y="2615775"/>
-              <a:ext cx="502800" cy="502800"/>
-            </a:xfrm>
-            <a:prstGeom prst="roundRect">
-              <a:avLst>
-                <a:gd fmla="val 15109" name="adj"/>
-              </a:avLst>
-            </a:prstGeom>
-            <a:noFill/>
-            <a:ln cap="flat" cmpd="sng" w="28575">
-              <a:solidFill>
-                <a:schemeClr val="dk1"/>
-              </a:solidFill>
-              <a:prstDash val="solid"/>
-              <a:round/>
-              <a:headEnd len="sm" w="sm" type="none"/>
-              <a:tailEnd len="sm" w="sm" type="none"/>
-            </a:ln>
-          </p:spPr>
-          <p:txBody>
-            <a:bodyPr anchorCtr="0" anchor="ctr" bIns="91425" lIns="91425" spcFirstLastPara="1" rIns="91425" wrap="square" tIns="91425">
-              <a:noAutofit/>
-            </a:bodyPr>
-            <a:lstStyle/>
-            <a:p>
-              <a:pPr indent="0" lvl="0" marL="0" rtl="0" algn="l">
-                <a:spcBef>
-                  <a:spcPts val="0"/>
-                </a:spcBef>
-                <a:spcAft>
-                  <a:spcPts val="0"/>
-                </a:spcAft>
-                <a:buNone/>
-              </a:pPr>
-              <a:r>
-                <a:t/>
-              </a:r>
-              <a:endParaRPr/>
-            </a:p>
-          </p:txBody>
-        </p:sp>
-      </p:grpSp>
     </p:spTree>
   </p:cSld>
   <p:clrMapOvr>
@@ -47862,6 +47422,285 @@
 </file>
 
 <file path=ppt/theme/theme1.xml><?xml version="1.0" encoding="utf-8"?>
+<a:theme xmlns:a="http://schemas.openxmlformats.org/drawingml/2006/main" xmlns:r="http://schemas.openxmlformats.org/officeDocument/2006/relationships" name="Soft Colors UI Design for Agencies by Slidesgo">
+  <a:themeElements>
+    <a:clrScheme name="Simple Light">
+      <a:dk1>
+        <a:srgbClr val="000000"/>
+      </a:dk1>
+      <a:lt1>
+        <a:srgbClr val="FCF6E8"/>
+      </a:lt1>
+      <a:dk2>
+        <a:srgbClr val="DBCFC3"/>
+      </a:dk2>
+      <a:lt2>
+        <a:srgbClr val="EFC4B9"/>
+      </a:lt2>
+      <a:accent1>
+        <a:srgbClr val="FDBC96"/>
+      </a:accent1>
+      <a:accent2>
+        <a:srgbClr val="DAC2CF"/>
+      </a:accent2>
+      <a:accent3>
+        <a:srgbClr val="D3E3D6"/>
+      </a:accent3>
+      <a:accent4>
+        <a:srgbClr val="FFFFFF"/>
+      </a:accent4>
+      <a:accent5>
+        <a:srgbClr val="FFFFFF"/>
+      </a:accent5>
+      <a:accent6>
+        <a:srgbClr val="FFFFFF"/>
+      </a:accent6>
+      <a:hlink>
+        <a:srgbClr val="000000"/>
+      </a:hlink>
+      <a:folHlink>
+        <a:srgbClr val="0097A7"/>
+      </a:folHlink>
+    </a:clrScheme>
+    <a:fontScheme name="Office">
+      <a:majorFont>
+        <a:latin typeface="Arial"/>
+        <a:ea typeface=""/>
+        <a:cs typeface=""/>
+        <a:font script="Jpan" typeface="ＭＳ Ｐゴシック"/>
+        <a:font script="Hang" typeface="맑은 고딕"/>
+        <a:font script="Hans" typeface="宋体"/>
+        <a:font script="Hant" typeface="新細明體"/>
+        <a:font script="Arab" typeface="Times New Roman"/>
+        <a:font script="Hebr" typeface="Times New Roman"/>
+        <a:font script="Thai" typeface="Angsana New"/>
+        <a:font script="Ethi" typeface="Nyala"/>
+        <a:font script="Beng" typeface="Vrinda"/>
+        <a:font script="Gujr" typeface="Shruti"/>
+        <a:font script="Khmr" typeface="MoolBoran"/>
+        <a:font script="Knda" typeface="Tunga"/>
+        <a:font script="Guru" typeface="Raavi"/>
+        <a:font script="Cans" typeface="Euphemia"/>
+        <a:font script="Cher" typeface="Plantagenet Cherokee"/>
+        <a:font script="Yiii" typeface="Microsoft Yi Baiti"/>
+        <a:font script="Tibt" typeface="Microsoft Himalaya"/>
+        <a:font script="Thaa" typeface="MV Boli"/>
+        <a:font script="Deva" typeface="Mangal"/>
+        <a:font script="Telu" typeface="Gautami"/>
+        <a:font script="Taml" typeface="Latha"/>
+        <a:font script="Syrc" typeface="Estrangelo Edessa"/>
+        <a:font script="Orya" typeface="Kalinga"/>
+        <a:font script="Mlym" typeface="Kartika"/>
+        <a:font script="Laoo" typeface="DokChampa"/>
+        <a:font script="Sinh" typeface="Iskoola Pota"/>
+        <a:font script="Mong" typeface="Mongolian Baiti"/>
+        <a:font script="Viet" typeface="Times New Roman"/>
+        <a:font script="Uigh" typeface="Microsoft Uighur"/>
+        <a:font script="Geor" typeface="Sylfaen"/>
+      </a:majorFont>
+      <a:minorFont>
+        <a:latin typeface="Arial"/>
+        <a:ea typeface=""/>
+        <a:cs typeface=""/>
+        <a:font script="Jpan" typeface="ＭＳ Ｐゴシック"/>
+        <a:font script="Hang" typeface="맑은 고딕"/>
+        <a:font script="Hans" typeface="宋体"/>
+        <a:font script="Hant" typeface="新細明體"/>
+        <a:font script="Arab" typeface="Arial"/>
+        <a:font script="Hebr" typeface="Arial"/>
+        <a:font script="Thai" typeface="Cordia New"/>
+        <a:font script="Ethi" typeface="Nyala"/>
+        <a:font script="Beng" typeface="Vrinda"/>
+        <a:font script="Gujr" typeface="Shruti"/>
+        <a:font script="Khmr" typeface="DaunPenh"/>
+        <a:font script="Knda" typeface="Tunga"/>
+        <a:font script="Guru" typeface="Raavi"/>
+        <a:font script="Cans" typeface="Euphemia"/>
+        <a:font script="Cher" typeface="Plantagenet Cherokee"/>
+        <a:font script="Yiii" typeface="Microsoft Yi Baiti"/>
+        <a:font script="Tibt" typeface="Microsoft Himalaya"/>
+        <a:font script="Thaa" typeface="MV Boli"/>
+        <a:font script="Deva" typeface="Mangal"/>
+        <a:font script="Telu" typeface="Gautami"/>
+        <a:font script="Taml" typeface="Latha"/>
+        <a:font script="Syrc" typeface="Estrangelo Edessa"/>
+        <a:font script="Orya" typeface="Kalinga"/>
+        <a:font script="Mlym" typeface="Kartika"/>
+        <a:font script="Laoo" typeface="DokChampa"/>
+        <a:font script="Sinh" typeface="Iskoola Pota"/>
+        <a:font script="Mong" typeface="Mongolian Baiti"/>
+        <a:font script="Viet" typeface="Arial"/>
+        <a:font script="Uigh" typeface="Microsoft Uighur"/>
+        <a:font script="Geor" typeface="Sylfaen"/>
+      </a:minorFont>
+    </a:fontScheme>
+    <a:fmtScheme name="Office">
+      <a:fillStyleLst>
+        <a:solidFill>
+          <a:schemeClr val="phClr"/>
+        </a:solidFill>
+        <a:gradFill rotWithShape="1">
+          <a:gsLst>
+            <a:gs pos="0">
+              <a:schemeClr val="phClr">
+                <a:tint val="50000"/>
+                <a:satMod val="300000"/>
+              </a:schemeClr>
+            </a:gs>
+            <a:gs pos="35000">
+              <a:schemeClr val="phClr">
+                <a:tint val="37000"/>
+                <a:satMod val="300000"/>
+              </a:schemeClr>
+            </a:gs>
+            <a:gs pos="100000">
+              <a:schemeClr val="phClr">
+                <a:tint val="15000"/>
+                <a:satMod val="350000"/>
+              </a:schemeClr>
+            </a:gs>
+          </a:gsLst>
+          <a:lin ang="16200000" scaled="1"/>
+        </a:gradFill>
+        <a:gradFill rotWithShape="1">
+          <a:gsLst>
+            <a:gs pos="0">
+              <a:schemeClr val="phClr">
+                <a:tint val="100000"/>
+                <a:shade val="100000"/>
+                <a:satMod val="130000"/>
+              </a:schemeClr>
+            </a:gs>
+            <a:gs pos="100000">
+              <a:schemeClr val="phClr">
+                <a:tint val="50000"/>
+                <a:shade val="100000"/>
+                <a:satMod val="350000"/>
+              </a:schemeClr>
+            </a:gs>
+          </a:gsLst>
+          <a:lin ang="16200000" scaled="0"/>
+        </a:gradFill>
+      </a:fillStyleLst>
+      <a:lnStyleLst>
+        <a:ln w="9525" cap="flat" cmpd="sng" algn="ctr">
+          <a:solidFill>
+            <a:schemeClr val="phClr">
+              <a:shade val="95000"/>
+              <a:satMod val="105000"/>
+            </a:schemeClr>
+          </a:solidFill>
+          <a:prstDash val="solid"/>
+        </a:ln>
+        <a:ln w="25400" cap="flat" cmpd="sng" algn="ctr">
+          <a:solidFill>
+            <a:schemeClr val="phClr"/>
+          </a:solidFill>
+          <a:prstDash val="solid"/>
+        </a:ln>
+        <a:ln w="38100" cap="flat" cmpd="sng" algn="ctr">
+          <a:solidFill>
+            <a:schemeClr val="phClr"/>
+          </a:solidFill>
+          <a:prstDash val="solid"/>
+        </a:ln>
+      </a:lnStyleLst>
+      <a:effectStyleLst>
+        <a:effectStyle>
+          <a:effectLst>
+            <a:outerShdw blurRad="40000" dist="20000" dir="5400000" rotWithShape="0">
+              <a:srgbClr val="000000">
+                <a:alpha val="38000"/>
+              </a:srgbClr>
+            </a:outerShdw>
+          </a:effectLst>
+        </a:effectStyle>
+        <a:effectStyle>
+          <a:effectLst>
+            <a:outerShdw blurRad="40000" dist="23000" dir="5400000" rotWithShape="0">
+              <a:srgbClr val="000000">
+                <a:alpha val="35000"/>
+              </a:srgbClr>
+            </a:outerShdw>
+          </a:effectLst>
+        </a:effectStyle>
+        <a:effectStyle>
+          <a:effectLst>
+            <a:outerShdw blurRad="40000" dist="23000" dir="5400000" rotWithShape="0">
+              <a:srgbClr val="000000">
+                <a:alpha val="35000"/>
+              </a:srgbClr>
+            </a:outerShdw>
+          </a:effectLst>
+          <a:scene3d>
+            <a:camera prst="orthographicFront">
+              <a:rot lat="0" lon="0" rev="0"/>
+            </a:camera>
+            <a:lightRig rig="threePt" dir="t">
+              <a:rot lat="0" lon="0" rev="1200000"/>
+            </a:lightRig>
+          </a:scene3d>
+          <a:sp3d>
+            <a:bevelT w="63500" h="25400"/>
+          </a:sp3d>
+        </a:effectStyle>
+      </a:effectStyleLst>
+      <a:bgFillStyleLst>
+        <a:solidFill>
+          <a:schemeClr val="phClr"/>
+        </a:solidFill>
+        <a:gradFill rotWithShape="1">
+          <a:gsLst>
+            <a:gs pos="0">
+              <a:schemeClr val="phClr">
+                <a:tint val="40000"/>
+                <a:satMod val="350000"/>
+              </a:schemeClr>
+            </a:gs>
+            <a:gs pos="40000">
+              <a:schemeClr val="phClr">
+                <a:tint val="45000"/>
+                <a:shade val="99000"/>
+                <a:satMod val="350000"/>
+              </a:schemeClr>
+            </a:gs>
+            <a:gs pos="100000">
+              <a:schemeClr val="phClr">
+                <a:shade val="20000"/>
+                <a:satMod val="255000"/>
+              </a:schemeClr>
+            </a:gs>
+          </a:gsLst>
+          <a:path path="circle">
+            <a:fillToRect l="50000" t="-80000" r="50000" b="180000"/>
+          </a:path>
+        </a:gradFill>
+        <a:gradFill rotWithShape="1">
+          <a:gsLst>
+            <a:gs pos="0">
+              <a:schemeClr val="phClr">
+                <a:tint val="80000"/>
+                <a:satMod val="300000"/>
+              </a:schemeClr>
+            </a:gs>
+            <a:gs pos="100000">
+              <a:schemeClr val="phClr">
+                <a:shade val="30000"/>
+                <a:satMod val="200000"/>
+              </a:schemeClr>
+            </a:gs>
+          </a:gsLst>
+          <a:path path="circle">
+            <a:fillToRect l="50000" t="50000" r="50000" b="50000"/>
+          </a:path>
+        </a:gradFill>
+      </a:bgFillStyleLst>
+    </a:fmtScheme>
+  </a:themeElements>
+</a:theme>
+</file>
+
+<file path=ppt/theme/theme2.xml><?xml version="1.0" encoding="utf-8"?>
 <a:theme xmlns:a="http://schemas.openxmlformats.org/drawingml/2006/main" xmlns:r="http://schemas.openxmlformats.org/officeDocument/2006/relationships">
   <a:themeElements>
     <a:clrScheme name="Default">
@@ -48138,283 +47977,4 @@
     </a:fmtScheme>
   </a:themeElements>
 </a:theme>
-</file>
-
-<file path=ppt/theme/theme2.xml><?xml version="1.0" encoding="utf-8"?>
-<a:theme xmlns:a="http://schemas.openxmlformats.org/drawingml/2006/main" xmlns:r="http://schemas.openxmlformats.org/officeDocument/2006/relationships" name="Soft Colors UI Design for Agencies by Slidesgo">
-  <a:themeElements>
-    <a:clrScheme name="Simple Light">
-      <a:dk1>
-        <a:srgbClr val="000000"/>
-      </a:dk1>
-      <a:lt1>
-        <a:srgbClr val="FCF6E8"/>
-      </a:lt1>
-      <a:dk2>
-        <a:srgbClr val="DBCFC3"/>
-      </a:dk2>
-      <a:lt2>
-        <a:srgbClr val="EFC4B9"/>
-      </a:lt2>
-      <a:accent1>
-        <a:srgbClr val="FDBC96"/>
-      </a:accent1>
-      <a:accent2>
-        <a:srgbClr val="DAC2CF"/>
-      </a:accent2>
-      <a:accent3>
-        <a:srgbClr val="D3E3D6"/>
-      </a:accent3>
-      <a:accent4>
-        <a:srgbClr val="FFFFFF"/>
-      </a:accent4>
-      <a:accent5>
-        <a:srgbClr val="FFFFFF"/>
-      </a:accent5>
-      <a:accent6>
-        <a:srgbClr val="FFFFFF"/>
-      </a:accent6>
-      <a:hlink>
-        <a:srgbClr val="000000"/>
-      </a:hlink>
-      <a:folHlink>
-        <a:srgbClr val="0097A7"/>
-      </a:folHlink>
-    </a:clrScheme>
-    <a:fontScheme name="Office">
-      <a:majorFont>
-        <a:latin typeface="Arial"/>
-        <a:ea typeface=""/>
-        <a:cs typeface=""/>
-        <a:font script="Jpan" typeface="ＭＳ Ｐゴシック"/>
-        <a:font script="Hang" typeface="맑은 고딕"/>
-        <a:font script="Hans" typeface="宋体"/>
-        <a:font script="Hant" typeface="新細明體"/>
-        <a:font script="Arab" typeface="Times New Roman"/>
-        <a:font script="Hebr" typeface="Times New Roman"/>
-        <a:font script="Thai" typeface="Angsana New"/>
-        <a:font script="Ethi" typeface="Nyala"/>
-        <a:font script="Beng" typeface="Vrinda"/>
-        <a:font script="Gujr" typeface="Shruti"/>
-        <a:font script="Khmr" typeface="MoolBoran"/>
-        <a:font script="Knda" typeface="Tunga"/>
-        <a:font script="Guru" typeface="Raavi"/>
-        <a:font script="Cans" typeface="Euphemia"/>
-        <a:font script="Cher" typeface="Plantagenet Cherokee"/>
-        <a:font script="Yiii" typeface="Microsoft Yi Baiti"/>
-        <a:font script="Tibt" typeface="Microsoft Himalaya"/>
-        <a:font script="Thaa" typeface="MV Boli"/>
-        <a:font script="Deva" typeface="Mangal"/>
-        <a:font script="Telu" typeface="Gautami"/>
-        <a:font script="Taml" typeface="Latha"/>
-        <a:font script="Syrc" typeface="Estrangelo Edessa"/>
-        <a:font script="Orya" typeface="Kalinga"/>
-        <a:font script="Mlym" typeface="Kartika"/>
-        <a:font script="Laoo" typeface="DokChampa"/>
-        <a:font script="Sinh" typeface="Iskoola Pota"/>
-        <a:font script="Mong" typeface="Mongolian Baiti"/>
-        <a:font script="Viet" typeface="Times New Roman"/>
-        <a:font script="Uigh" typeface="Microsoft Uighur"/>
-        <a:font script="Geor" typeface="Sylfaen"/>
-      </a:majorFont>
-      <a:minorFont>
-        <a:latin typeface="Arial"/>
-        <a:ea typeface=""/>
-        <a:cs typeface=""/>
-        <a:font script="Jpan" typeface="ＭＳ Ｐゴシック"/>
-        <a:font script="Hang" typeface="맑은 고딕"/>
-        <a:font script="Hans" typeface="宋体"/>
-        <a:font script="Hant" typeface="新細明體"/>
-        <a:font script="Arab" typeface="Arial"/>
-        <a:font script="Hebr" typeface="Arial"/>
-        <a:font script="Thai" typeface="Cordia New"/>
-        <a:font script="Ethi" typeface="Nyala"/>
-        <a:font script="Beng" typeface="Vrinda"/>
-        <a:font script="Gujr" typeface="Shruti"/>
-        <a:font script="Khmr" typeface="DaunPenh"/>
-        <a:font script="Knda" typeface="Tunga"/>
-        <a:font script="Guru" typeface="Raavi"/>
-        <a:font script="Cans" typeface="Euphemia"/>
-        <a:font script="Cher" typeface="Plantagenet Cherokee"/>
-        <a:font script="Yiii" typeface="Microsoft Yi Baiti"/>
-        <a:font script="Tibt" typeface="Microsoft Himalaya"/>
-        <a:font script="Thaa" typeface="MV Boli"/>
-        <a:font script="Deva" typeface="Mangal"/>
-        <a:font script="Telu" typeface="Gautami"/>
-        <a:font script="Taml" typeface="Latha"/>
-        <a:font script="Syrc" typeface="Estrangelo Edessa"/>
-        <a:font script="Orya" typeface="Kalinga"/>
-        <a:font script="Mlym" typeface="Kartika"/>
-        <a:font script="Laoo" typeface="DokChampa"/>
-        <a:font script="Sinh" typeface="Iskoola Pota"/>
-        <a:font script="Mong" typeface="Mongolian Baiti"/>
-        <a:font script="Viet" typeface="Arial"/>
-        <a:font script="Uigh" typeface="Microsoft Uighur"/>
-        <a:font script="Geor" typeface="Sylfaen"/>
-      </a:minorFont>
-    </a:fontScheme>
-    <a:fmtScheme name="Office">
-      <a:fillStyleLst>
-        <a:solidFill>
-          <a:schemeClr val="phClr"/>
-        </a:solidFill>
-        <a:gradFill rotWithShape="1">
-          <a:gsLst>
-            <a:gs pos="0">
-              <a:schemeClr val="phClr">
-                <a:tint val="50000"/>
-                <a:satMod val="300000"/>
-              </a:schemeClr>
-            </a:gs>
-            <a:gs pos="35000">
-              <a:schemeClr val="phClr">
-                <a:tint val="37000"/>
-                <a:satMod val="300000"/>
-              </a:schemeClr>
-            </a:gs>
-            <a:gs pos="100000">
-              <a:schemeClr val="phClr">
-                <a:tint val="15000"/>
-                <a:satMod val="350000"/>
-              </a:schemeClr>
-            </a:gs>
-          </a:gsLst>
-          <a:lin ang="16200000" scaled="1"/>
-        </a:gradFill>
-        <a:gradFill rotWithShape="1">
-          <a:gsLst>
-            <a:gs pos="0">
-              <a:schemeClr val="phClr">
-                <a:tint val="100000"/>
-                <a:shade val="100000"/>
-                <a:satMod val="130000"/>
-              </a:schemeClr>
-            </a:gs>
-            <a:gs pos="100000">
-              <a:schemeClr val="phClr">
-                <a:tint val="50000"/>
-                <a:shade val="100000"/>
-                <a:satMod val="350000"/>
-              </a:schemeClr>
-            </a:gs>
-          </a:gsLst>
-          <a:lin ang="16200000" scaled="0"/>
-        </a:gradFill>
-      </a:fillStyleLst>
-      <a:lnStyleLst>
-        <a:ln w="9525" cap="flat" cmpd="sng" algn="ctr">
-          <a:solidFill>
-            <a:schemeClr val="phClr">
-              <a:shade val="95000"/>
-              <a:satMod val="105000"/>
-            </a:schemeClr>
-          </a:solidFill>
-          <a:prstDash val="solid"/>
-        </a:ln>
-        <a:ln w="25400" cap="flat" cmpd="sng" algn="ctr">
-          <a:solidFill>
-            <a:schemeClr val="phClr"/>
-          </a:solidFill>
-          <a:prstDash val="solid"/>
-        </a:ln>
-        <a:ln w="38100" cap="flat" cmpd="sng" algn="ctr">
-          <a:solidFill>
-            <a:schemeClr val="phClr"/>
-          </a:solidFill>
-          <a:prstDash val="solid"/>
-        </a:ln>
-      </a:lnStyleLst>
-      <a:effectStyleLst>
-        <a:effectStyle>
-          <a:effectLst>
-            <a:outerShdw blurRad="40000" dist="20000" dir="5400000" rotWithShape="0">
-              <a:srgbClr val="000000">
-                <a:alpha val="38000"/>
-              </a:srgbClr>
-            </a:outerShdw>
-          </a:effectLst>
-        </a:effectStyle>
-        <a:effectStyle>
-          <a:effectLst>
-            <a:outerShdw blurRad="40000" dist="23000" dir="5400000" rotWithShape="0">
-              <a:srgbClr val="000000">
-                <a:alpha val="35000"/>
-              </a:srgbClr>
-            </a:outerShdw>
-          </a:effectLst>
-        </a:effectStyle>
-        <a:effectStyle>
-          <a:effectLst>
-            <a:outerShdw blurRad="40000" dist="23000" dir="5400000" rotWithShape="0">
-              <a:srgbClr val="000000">
-                <a:alpha val="35000"/>
-              </a:srgbClr>
-            </a:outerShdw>
-          </a:effectLst>
-          <a:scene3d>
-            <a:camera prst="orthographicFront">
-              <a:rot lat="0" lon="0" rev="0"/>
-            </a:camera>
-            <a:lightRig rig="threePt" dir="t">
-              <a:rot lat="0" lon="0" rev="1200000"/>
-            </a:lightRig>
-          </a:scene3d>
-          <a:sp3d>
-            <a:bevelT w="63500" h="25400"/>
-          </a:sp3d>
-        </a:effectStyle>
-      </a:effectStyleLst>
-      <a:bgFillStyleLst>
-        <a:solidFill>
-          <a:schemeClr val="phClr"/>
-        </a:solidFill>
-        <a:gradFill rotWithShape="1">
-          <a:gsLst>
-            <a:gs pos="0">
-              <a:schemeClr val="phClr">
-                <a:tint val="40000"/>
-                <a:satMod val="350000"/>
-              </a:schemeClr>
-            </a:gs>
-            <a:gs pos="40000">
-              <a:schemeClr val="phClr">
-                <a:tint val="45000"/>
-                <a:shade val="99000"/>
-                <a:satMod val="350000"/>
-              </a:schemeClr>
-            </a:gs>
-            <a:gs pos="100000">
-              <a:schemeClr val="phClr">
-                <a:shade val="20000"/>
-                <a:satMod val="255000"/>
-              </a:schemeClr>
-            </a:gs>
-          </a:gsLst>
-          <a:path path="circle">
-            <a:fillToRect l="50000" t="-80000" r="50000" b="180000"/>
-          </a:path>
-        </a:gradFill>
-        <a:gradFill rotWithShape="1">
-          <a:gsLst>
-            <a:gs pos="0">
-              <a:schemeClr val="phClr">
-                <a:tint val="80000"/>
-                <a:satMod val="300000"/>
-              </a:schemeClr>
-            </a:gs>
-            <a:gs pos="100000">
-              <a:schemeClr val="phClr">
-                <a:shade val="30000"/>
-                <a:satMod val="200000"/>
-              </a:schemeClr>
-            </a:gs>
-          </a:gsLst>
-          <a:path path="circle">
-            <a:fillToRect l="50000" t="50000" r="50000" b="50000"/>
-          </a:path>
-        </a:gradFill>
-      </a:bgFillStyleLst>
-    </a:fmtScheme>
-  </a:themeElements>
-</a:theme>
 </file>
</xml_diff>

<commit_message>
added about me slide
</commit_message>
<xml_diff>
--- a/top4sports_presentation.pptx
+++ b/top4sports_presentation.pptx
@@ -26,46 +26,47 @@
     <p:sldId id="271" r:id="rId20"/>
     <p:sldId id="272" r:id="rId21"/>
     <p:sldId id="273" r:id="rId22"/>
+    <p:sldId id="274" r:id="rId23"/>
   </p:sldIdLst>
   <p:sldSz cy="5143500" cx="9144000"/>
   <p:notesSz cx="6858000" cy="9144000"/>
   <p:embeddedFontLst>
     <p:embeddedFont>
       <p:font typeface="Roboto"/>
-      <p:regular r:id="rId23"/>
-      <p:bold r:id="rId24"/>
-      <p:italic r:id="rId25"/>
-      <p:boldItalic r:id="rId26"/>
+      <p:regular r:id="rId24"/>
+      <p:bold r:id="rId25"/>
+      <p:italic r:id="rId26"/>
+      <p:boldItalic r:id="rId27"/>
     </p:embeddedFont>
     <p:embeddedFont>
       <p:font typeface="Bebas Neue"/>
-      <p:regular r:id="rId27"/>
+      <p:regular r:id="rId28"/>
     </p:embeddedFont>
     <p:embeddedFont>
       <p:font typeface="Rubik Black"/>
-      <p:bold r:id="rId28"/>
-      <p:boldItalic r:id="rId29"/>
+      <p:bold r:id="rId29"/>
+      <p:boldItalic r:id="rId30"/>
     </p:embeddedFont>
     <p:embeddedFont>
       <p:font typeface="Rubik"/>
-      <p:regular r:id="rId30"/>
-      <p:bold r:id="rId31"/>
-      <p:italic r:id="rId32"/>
-      <p:boldItalic r:id="rId33"/>
+      <p:regular r:id="rId31"/>
+      <p:bold r:id="rId32"/>
+      <p:italic r:id="rId33"/>
+      <p:boldItalic r:id="rId34"/>
     </p:embeddedFont>
     <p:embeddedFont>
       <p:font typeface="Fira Sans Extra Condensed"/>
-      <p:regular r:id="rId34"/>
-      <p:bold r:id="rId35"/>
-      <p:italic r:id="rId36"/>
-      <p:boldItalic r:id="rId37"/>
+      <p:regular r:id="rId35"/>
+      <p:bold r:id="rId36"/>
+      <p:italic r:id="rId37"/>
+      <p:boldItalic r:id="rId38"/>
     </p:embeddedFont>
     <p:embeddedFont>
       <p:font typeface="Karla"/>
-      <p:regular r:id="rId38"/>
-      <p:bold r:id="rId39"/>
-      <p:italic r:id="rId40"/>
-      <p:boldItalic r:id="rId41"/>
+      <p:regular r:id="rId39"/>
+      <p:bold r:id="rId40"/>
+      <p:italic r:id="rId41"/>
+      <p:boldItalic r:id="rId42"/>
     </p:embeddedFont>
   </p:embeddedFontLst>
   <p:defaultTextStyle>
@@ -899,7 +900,7 @@
   <p:cSld>
     <p:spTree>
       <p:nvGrpSpPr>
-        <p:cNvPr id="567" name="Shape 567"/>
+        <p:cNvPr id="577" name="Shape 577"/>
         <p:cNvGrpSpPr/>
         <p:nvPr/>
       </p:nvGrpSpPr>
@@ -913,7 +914,7 @@
       </p:grpSpPr>
       <p:sp>
         <p:nvSpPr>
-          <p:cNvPr id="568" name="Google Shape;568;g23a6315a7e8_0_473:notes"/>
+          <p:cNvPr id="578" name="Google Shape;578;g23a6315a7e8_0_460:notes"/>
           <p:cNvSpPr/>
           <p:nvPr>
             <p:ph idx="2" type="sldImg"/>
@@ -948,7 +949,7 @@
       </p:sp>
       <p:sp>
         <p:nvSpPr>
-          <p:cNvPr id="569" name="Google Shape;569;g23a6315a7e8_0_473:notes"/>
+          <p:cNvPr id="579" name="Google Shape;579;g23a6315a7e8_0_460:notes"/>
           <p:cNvSpPr txBox="1"/>
           <p:nvPr>
             <p:ph idx="1" type="body"/>
@@ -981,7 +982,23 @@
             </a:pPr>
             <a:r>
               <a:rPr lang="en"/>
-              <a:t>And here, we can see the sales revenue by country where the Czech Republic is the highest sales generator for Top4Sports, which makes sense since they are based from there </a:t>
+              <a:t>Here, we can see the number of orders for specific product types, </a:t>
+            </a:r>
+            <a:r>
+              <a:rPr lang="en"/>
+              <a:t>where</a:t>
+            </a:r>
+            <a:r>
+              <a:rPr lang="en"/>
+              <a:t> running shoes, pants, and t-shirts are the top 3 most </a:t>
+            </a:r>
+            <a:r>
+              <a:rPr lang="en"/>
+              <a:t>highest</a:t>
+            </a:r>
+            <a:r>
+              <a:rPr lang="en"/>
+              <a:t> selling</a:t>
             </a:r>
             <a:endParaRPr/>
           </a:p>
@@ -1000,7 +1017,7 @@
   <p:cSld>
     <p:spTree>
       <p:nvGrpSpPr>
-        <p:cNvPr id="574" name="Shape 574"/>
+        <p:cNvPr id="584" name="Shape 584"/>
         <p:cNvGrpSpPr/>
         <p:nvPr/>
       </p:nvGrpSpPr>
@@ -1014,7 +1031,7 @@
       </p:grpSpPr>
       <p:sp>
         <p:nvSpPr>
-          <p:cNvPr id="575" name="Google Shape;575;g23a6315a7e8_0_485:notes"/>
+          <p:cNvPr id="585" name="Google Shape;585;g23a6315a7e8_0_473:notes"/>
           <p:cNvSpPr/>
           <p:nvPr>
             <p:ph idx="2" type="sldImg"/>
@@ -1049,7 +1066,7 @@
       </p:sp>
       <p:sp>
         <p:nvSpPr>
-          <p:cNvPr id="576" name="Google Shape;576;g23a6315a7e8_0_485:notes"/>
+          <p:cNvPr id="586" name="Google Shape;586;g23a6315a7e8_0_473:notes"/>
           <p:cNvSpPr txBox="1"/>
           <p:nvPr>
             <p:ph idx="1" type="body"/>
@@ -1082,15 +1099,7 @@
             </a:pPr>
             <a:r>
               <a:rPr lang="en"/>
-              <a:t>Lastly, for the EDA, this is the total sales </a:t>
-            </a:r>
-            <a:r>
-              <a:rPr lang="en"/>
-              <a:t>revenue</a:t>
-            </a:r>
-            <a:r>
-              <a:rPr lang="en"/>
-              <a:t> from the historical sales data plotted over time with seasonal peaks around the ending of each of the years</a:t>
+              <a:t>And here, we can see the sales revenue by country where the Czech Republic is the highest sales generator for Top4Sports, which makes sense since they are based from there </a:t>
             </a:r>
             <a:endParaRPr/>
           </a:p>
@@ -1109,7 +1118,7 @@
   <p:cSld>
     <p:spTree>
       <p:nvGrpSpPr>
-        <p:cNvPr id="581" name="Shape 581"/>
+        <p:cNvPr id="591" name="Shape 591"/>
         <p:cNvGrpSpPr/>
         <p:nvPr/>
       </p:nvGrpSpPr>
@@ -1123,7 +1132,7 @@
       </p:grpSpPr>
       <p:sp>
         <p:nvSpPr>
-          <p:cNvPr id="582" name="Google Shape;582;g23a6315a7e8_0_498:notes"/>
+          <p:cNvPr id="592" name="Google Shape;592;g23a6315a7e8_0_485:notes"/>
           <p:cNvSpPr/>
           <p:nvPr>
             <p:ph idx="2" type="sldImg"/>
@@ -1158,7 +1167,116 @@
       </p:sp>
       <p:sp>
         <p:nvSpPr>
-          <p:cNvPr id="583" name="Google Shape;583;g23a6315a7e8_0_498:notes"/>
+          <p:cNvPr id="593" name="Google Shape;593;g23a6315a7e8_0_485:notes"/>
+          <p:cNvSpPr txBox="1"/>
+          <p:nvPr>
+            <p:ph idx="1" type="body"/>
+          </p:nvPr>
+        </p:nvSpPr>
+        <p:spPr>
+          <a:xfrm>
+            <a:off x="685800" y="4343400"/>
+            <a:ext cx="5486400" cy="4114800"/>
+          </a:xfrm>
+          <a:prstGeom prst="rect">
+            <a:avLst/>
+          </a:prstGeom>
+        </p:spPr>
+        <p:txBody>
+          <a:bodyPr anchorCtr="0" anchor="t" bIns="91425" lIns="91425" spcFirstLastPara="1" rIns="91425" wrap="square" tIns="91425">
+            <a:noAutofit/>
+          </a:bodyPr>
+          <a:lstStyle/>
+          <a:p>
+            <a:pPr indent="-298450" lvl="0" marL="457200" rtl="0" algn="l">
+              <a:spcBef>
+                <a:spcPts val="0"/>
+              </a:spcBef>
+              <a:spcAft>
+                <a:spcPts val="0"/>
+              </a:spcAft>
+              <a:buSzPts val="1100"/>
+              <a:buChar char="●"/>
+            </a:pPr>
+            <a:r>
+              <a:rPr lang="en"/>
+              <a:t>Lastly, for the EDA, this is the total sales </a:t>
+            </a:r>
+            <a:r>
+              <a:rPr lang="en"/>
+              <a:t>revenue</a:t>
+            </a:r>
+            <a:r>
+              <a:rPr lang="en"/>
+              <a:t> from the historical sales data plotted over time with seasonal peaks around the ending of each of the years</a:t>
+            </a:r>
+            <a:endParaRPr/>
+          </a:p>
+        </p:txBody>
+      </p:sp>
+    </p:spTree>
+  </p:cSld>
+  <p:clrMapOvr>
+    <a:masterClrMapping/>
+  </p:clrMapOvr>
+</p:notes>
+</file>
+
+<file path=ppt/notesSlides/notesSlide13.xml><?xml version="1.0" encoding="utf-8"?>
+<p:notes xmlns:a="http://schemas.openxmlformats.org/drawingml/2006/main" xmlns:r="http://schemas.openxmlformats.org/officeDocument/2006/relationships" xmlns:mc="http://schemas.openxmlformats.org/markup-compatibility/2006" xmlns:mv="urn:schemas-microsoft-com:mac:vml" xmlns:p="http://schemas.openxmlformats.org/presentationml/2006/main" xmlns:c="http://schemas.openxmlformats.org/drawingml/2006/chart" xmlns:dgm="http://schemas.openxmlformats.org/drawingml/2006/diagram" xmlns:o="urn:schemas-microsoft-com:office:office" xmlns:v="urn:schemas-microsoft-com:vml" xmlns:pvml="urn:schemas-microsoft-com:office:powerpoint" xmlns:com="http://schemas.openxmlformats.org/drawingml/2006/compatibility" xmlns:p14="http://schemas.microsoft.com/office/powerpoint/2010/main" xmlns:p15="http://schemas.microsoft.com/office/powerpoint/2012/main" xmlns:ahyp="http://schemas.microsoft.com/office/drawing/2018/hyperlinkcolor" showMasterPhAnim="0" showMasterSp="0">
+  <p:cSld>
+    <p:spTree>
+      <p:nvGrpSpPr>
+        <p:cNvPr id="598" name="Shape 598"/>
+        <p:cNvGrpSpPr/>
+        <p:nvPr/>
+      </p:nvGrpSpPr>
+      <p:grpSpPr>
+        <a:xfrm>
+          <a:off x="0" y="0"/>
+          <a:ext cx="0" cy="0"/>
+          <a:chOff x="0" y="0"/>
+          <a:chExt cx="0" cy="0"/>
+        </a:xfrm>
+      </p:grpSpPr>
+      <p:sp>
+        <p:nvSpPr>
+          <p:cNvPr id="599" name="Google Shape;599;g23a6315a7e8_0_498:notes"/>
+          <p:cNvSpPr/>
+          <p:nvPr>
+            <p:ph idx="2" type="sldImg"/>
+          </p:nvPr>
+        </p:nvSpPr>
+        <p:spPr>
+          <a:xfrm>
+            <a:off x="381300" y="685800"/>
+            <a:ext cx="6096000" cy="3429000"/>
+          </a:xfrm>
+          <a:custGeom>
+            <a:rect b="b" l="l" r="r" t="t"/>
+            <a:pathLst>
+              <a:path extrusionOk="0" h="120000" w="120000">
+                <a:moveTo>
+                  <a:pt x="0" y="0"/>
+                </a:moveTo>
+                <a:lnTo>
+                  <a:pt x="120000" y="0"/>
+                </a:lnTo>
+                <a:lnTo>
+                  <a:pt x="120000" y="120000"/>
+                </a:lnTo>
+                <a:lnTo>
+                  <a:pt x="0" y="120000"/>
+                </a:lnTo>
+                <a:close/>
+              </a:path>
+            </a:pathLst>
+          </a:custGeom>
+        </p:spPr>
+      </p:sp>
+      <p:sp>
+        <p:nvSpPr>
+          <p:cNvPr id="600" name="Google Shape;600;g23a6315a7e8_0_498:notes"/>
           <p:cNvSpPr txBox="1"/>
           <p:nvPr>
             <p:ph idx="1" type="body"/>
@@ -1338,12 +1456,12 @@
 </p:notes>
 </file>
 
-<file path=ppt/notesSlides/notesSlide13.xml><?xml version="1.0" encoding="utf-8"?>
+<file path=ppt/notesSlides/notesSlide14.xml><?xml version="1.0" encoding="utf-8"?>
 <p:notes xmlns:a="http://schemas.openxmlformats.org/drawingml/2006/main" xmlns:r="http://schemas.openxmlformats.org/officeDocument/2006/relationships" xmlns:mc="http://schemas.openxmlformats.org/markup-compatibility/2006" xmlns:mv="urn:schemas-microsoft-com:mac:vml" xmlns:p="http://schemas.openxmlformats.org/presentationml/2006/main" xmlns:c="http://schemas.openxmlformats.org/drawingml/2006/chart" xmlns:dgm="http://schemas.openxmlformats.org/drawingml/2006/diagram" xmlns:o="urn:schemas-microsoft-com:office:office" xmlns:v="urn:schemas-microsoft-com:vml" xmlns:pvml="urn:schemas-microsoft-com:office:powerpoint" xmlns:com="http://schemas.openxmlformats.org/drawingml/2006/compatibility" xmlns:p14="http://schemas.microsoft.com/office/powerpoint/2010/main" xmlns:p15="http://schemas.microsoft.com/office/powerpoint/2012/main" xmlns:ahyp="http://schemas.microsoft.com/office/drawing/2018/hyperlinkcolor" showMasterPhAnim="0" showMasterSp="0">
   <p:cSld>
     <p:spTree>
       <p:nvGrpSpPr>
-        <p:cNvPr id="588" name="Shape 588"/>
+        <p:cNvPr id="605" name="Shape 605"/>
         <p:cNvGrpSpPr/>
         <p:nvPr/>
       </p:nvGrpSpPr>
@@ -1357,7 +1475,7 @@
       </p:grpSpPr>
       <p:sp>
         <p:nvSpPr>
-          <p:cNvPr id="589" name="Google Shape;589;g23a6315a7e8_0_492:notes"/>
+          <p:cNvPr id="606" name="Google Shape;606;g23a6315a7e8_0_492:notes"/>
           <p:cNvSpPr/>
           <p:nvPr>
             <p:ph idx="2" type="sldImg"/>
@@ -1392,7 +1510,7 @@
       </p:sp>
       <p:sp>
         <p:nvSpPr>
-          <p:cNvPr id="590" name="Google Shape;590;g23a6315a7e8_0_492:notes"/>
+          <p:cNvPr id="607" name="Google Shape;607;g23a6315a7e8_0_492:notes"/>
           <p:cNvSpPr txBox="1"/>
           <p:nvPr>
             <p:ph idx="1" type="body"/>
@@ -1447,12 +1565,12 @@
 </p:notes>
 </file>
 
-<file path=ppt/notesSlides/notesSlide14.xml><?xml version="1.0" encoding="utf-8"?>
+<file path=ppt/notesSlides/notesSlide15.xml><?xml version="1.0" encoding="utf-8"?>
 <p:notes xmlns:a="http://schemas.openxmlformats.org/drawingml/2006/main" xmlns:r="http://schemas.openxmlformats.org/officeDocument/2006/relationships" xmlns:mc="http://schemas.openxmlformats.org/markup-compatibility/2006" xmlns:mv="urn:schemas-microsoft-com:mac:vml" xmlns:p="http://schemas.openxmlformats.org/presentationml/2006/main" xmlns:c="http://schemas.openxmlformats.org/drawingml/2006/chart" xmlns:dgm="http://schemas.openxmlformats.org/drawingml/2006/diagram" xmlns:o="urn:schemas-microsoft-com:office:office" xmlns:v="urn:schemas-microsoft-com:vml" xmlns:pvml="urn:schemas-microsoft-com:office:powerpoint" xmlns:com="http://schemas.openxmlformats.org/drawingml/2006/compatibility" xmlns:p14="http://schemas.microsoft.com/office/powerpoint/2010/main" xmlns:p15="http://schemas.microsoft.com/office/powerpoint/2012/main" xmlns:ahyp="http://schemas.microsoft.com/office/drawing/2018/hyperlinkcolor" showMasterPhAnim="0" showMasterSp="0">
   <p:cSld>
     <p:spTree>
       <p:nvGrpSpPr>
-        <p:cNvPr id="595" name="Shape 595"/>
+        <p:cNvPr id="612" name="Shape 612"/>
         <p:cNvGrpSpPr/>
         <p:nvPr/>
       </p:nvGrpSpPr>
@@ -1466,7 +1584,7 @@
       </p:grpSpPr>
       <p:sp>
         <p:nvSpPr>
-          <p:cNvPr id="596" name="Google Shape;596;g23a6315a7e8_0_506:notes"/>
+          <p:cNvPr id="613" name="Google Shape;613;g23a6315a7e8_0_506:notes"/>
           <p:cNvSpPr/>
           <p:nvPr>
             <p:ph idx="2" type="sldImg"/>
@@ -1501,7 +1619,7 @@
       </p:sp>
       <p:sp>
         <p:nvSpPr>
-          <p:cNvPr id="597" name="Google Shape;597;g23a6315a7e8_0_506:notes"/>
+          <p:cNvPr id="614" name="Google Shape;614;g23a6315a7e8_0_506:notes"/>
           <p:cNvSpPr txBox="1"/>
           <p:nvPr>
             <p:ph idx="1" type="body"/>
@@ -1556,12 +1674,12 @@
 </p:notes>
 </file>
 
-<file path=ppt/notesSlides/notesSlide15.xml><?xml version="1.0" encoding="utf-8"?>
+<file path=ppt/notesSlides/notesSlide16.xml><?xml version="1.0" encoding="utf-8"?>
 <p:notes xmlns:a="http://schemas.openxmlformats.org/drawingml/2006/main" xmlns:r="http://schemas.openxmlformats.org/officeDocument/2006/relationships" xmlns:mc="http://schemas.openxmlformats.org/markup-compatibility/2006" xmlns:mv="urn:schemas-microsoft-com:mac:vml" xmlns:p="http://schemas.openxmlformats.org/presentationml/2006/main" xmlns:c="http://schemas.openxmlformats.org/drawingml/2006/chart" xmlns:dgm="http://schemas.openxmlformats.org/drawingml/2006/diagram" xmlns:o="urn:schemas-microsoft-com:office:office" xmlns:v="urn:schemas-microsoft-com:vml" xmlns:pvml="urn:schemas-microsoft-com:office:powerpoint" xmlns:com="http://schemas.openxmlformats.org/drawingml/2006/compatibility" xmlns:p14="http://schemas.microsoft.com/office/powerpoint/2010/main" xmlns:p15="http://schemas.microsoft.com/office/powerpoint/2012/main" xmlns:ahyp="http://schemas.microsoft.com/office/drawing/2018/hyperlinkcolor" showMasterPhAnim="0" showMasterSp="0">
   <p:cSld>
     <p:spTree>
       <p:nvGrpSpPr>
-        <p:cNvPr id="602" name="Shape 602"/>
+        <p:cNvPr id="619" name="Shape 619"/>
         <p:cNvGrpSpPr/>
         <p:nvPr/>
       </p:nvGrpSpPr>
@@ -1575,7 +1693,7 @@
       </p:grpSpPr>
       <p:sp>
         <p:nvSpPr>
-          <p:cNvPr id="603" name="Google Shape;603;g23a6315a7e8_0_516:notes"/>
+          <p:cNvPr id="620" name="Google Shape;620;g23a6315a7e8_0_516:notes"/>
           <p:cNvSpPr/>
           <p:nvPr>
             <p:ph idx="2" type="sldImg"/>
@@ -1610,7 +1728,7 @@
       </p:sp>
       <p:sp>
         <p:nvSpPr>
-          <p:cNvPr id="604" name="Google Shape;604;g23a6315a7e8_0_516:notes"/>
+          <p:cNvPr id="621" name="Google Shape;621;g23a6315a7e8_0_516:notes"/>
           <p:cNvSpPr txBox="1"/>
           <p:nvPr>
             <p:ph idx="1" type="body"/>
@@ -1679,12 +1797,12 @@
 </p:notes>
 </file>
 
-<file path=ppt/notesSlides/notesSlide16.xml><?xml version="1.0" encoding="utf-8"?>
+<file path=ppt/notesSlides/notesSlide17.xml><?xml version="1.0" encoding="utf-8"?>
 <p:notes xmlns:a="http://schemas.openxmlformats.org/drawingml/2006/main" xmlns:r="http://schemas.openxmlformats.org/officeDocument/2006/relationships" xmlns:mc="http://schemas.openxmlformats.org/markup-compatibility/2006" xmlns:mv="urn:schemas-microsoft-com:mac:vml" xmlns:p="http://schemas.openxmlformats.org/presentationml/2006/main" xmlns:c="http://schemas.openxmlformats.org/drawingml/2006/chart" xmlns:dgm="http://schemas.openxmlformats.org/drawingml/2006/diagram" xmlns:o="urn:schemas-microsoft-com:office:office" xmlns:v="urn:schemas-microsoft-com:vml" xmlns:pvml="urn:schemas-microsoft-com:office:powerpoint" xmlns:com="http://schemas.openxmlformats.org/drawingml/2006/compatibility" xmlns:p14="http://schemas.microsoft.com/office/powerpoint/2010/main" xmlns:p15="http://schemas.microsoft.com/office/powerpoint/2012/main" xmlns:ahyp="http://schemas.microsoft.com/office/drawing/2018/hyperlinkcolor" showMasterPhAnim="0" showMasterSp="0">
   <p:cSld>
     <p:spTree>
       <p:nvGrpSpPr>
-        <p:cNvPr id="620" name="Shape 620"/>
+        <p:cNvPr id="637" name="Shape 637"/>
         <p:cNvGrpSpPr/>
         <p:nvPr/>
       </p:nvGrpSpPr>
@@ -1698,7 +1816,7 @@
       </p:grpSpPr>
       <p:sp>
         <p:nvSpPr>
-          <p:cNvPr id="621" name="Google Shape;621;g23a6315a7e8_0_570:notes"/>
+          <p:cNvPr id="638" name="Google Shape;638;g23a6315a7e8_0_570:notes"/>
           <p:cNvSpPr/>
           <p:nvPr>
             <p:ph idx="2" type="sldImg"/>
@@ -1733,7 +1851,7 @@
       </p:sp>
       <p:sp>
         <p:nvSpPr>
-          <p:cNvPr id="622" name="Google Shape;622;g23a6315a7e8_0_570:notes"/>
+          <p:cNvPr id="639" name="Google Shape;639;g23a6315a7e8_0_570:notes"/>
           <p:cNvSpPr txBox="1"/>
           <p:nvPr>
             <p:ph idx="1" type="body"/>
@@ -1876,12 +1994,12 @@
 </p:notes>
 </file>
 
-<file path=ppt/notesSlides/notesSlide17.xml><?xml version="1.0" encoding="utf-8"?>
+<file path=ppt/notesSlides/notesSlide18.xml><?xml version="1.0" encoding="utf-8"?>
 <p:notes xmlns:a="http://schemas.openxmlformats.org/drawingml/2006/main" xmlns:r="http://schemas.openxmlformats.org/officeDocument/2006/relationships" xmlns:mc="http://schemas.openxmlformats.org/markup-compatibility/2006" xmlns:mv="urn:schemas-microsoft-com:mac:vml" xmlns:p="http://schemas.openxmlformats.org/presentationml/2006/main" xmlns:c="http://schemas.openxmlformats.org/drawingml/2006/chart" xmlns:dgm="http://schemas.openxmlformats.org/drawingml/2006/diagram" xmlns:o="urn:schemas-microsoft-com:office:office" xmlns:v="urn:schemas-microsoft-com:vml" xmlns:pvml="urn:schemas-microsoft-com:office:powerpoint" xmlns:com="http://schemas.openxmlformats.org/drawingml/2006/compatibility" xmlns:p14="http://schemas.microsoft.com/office/powerpoint/2010/main" xmlns:p15="http://schemas.microsoft.com/office/powerpoint/2012/main" xmlns:ahyp="http://schemas.microsoft.com/office/drawing/2018/hyperlinkcolor" showMasterPhAnim="0" showMasterSp="0">
   <p:cSld>
     <p:spTree>
       <p:nvGrpSpPr>
-        <p:cNvPr id="643" name="Shape 643"/>
+        <p:cNvPr id="660" name="Shape 660"/>
         <p:cNvGrpSpPr/>
         <p:nvPr/>
       </p:nvGrpSpPr>
@@ -1895,7 +2013,7 @@
       </p:grpSpPr>
       <p:sp>
         <p:nvSpPr>
-          <p:cNvPr id="644" name="Google Shape;644;g23a6315a7e8_0_605:notes"/>
+          <p:cNvPr id="661" name="Google Shape;661;g23a6315a7e8_0_605:notes"/>
           <p:cNvSpPr/>
           <p:nvPr>
             <p:ph idx="2" type="sldImg"/>
@@ -1930,7 +2048,7 @@
       </p:sp>
       <p:sp>
         <p:nvSpPr>
-          <p:cNvPr id="645" name="Google Shape;645;g23a6315a7e8_0_605:notes"/>
+          <p:cNvPr id="662" name="Google Shape;662;g23a6315a7e8_0_605:notes"/>
           <p:cNvSpPr txBox="1"/>
           <p:nvPr>
             <p:ph idx="1" type="body"/>
@@ -2163,12 +2281,12 @@
 </p:notes>
 </file>
 
-<file path=ppt/notesSlides/notesSlide18.xml><?xml version="1.0" encoding="utf-8"?>
+<file path=ppt/notesSlides/notesSlide19.xml><?xml version="1.0" encoding="utf-8"?>
 <p:notes xmlns:a="http://schemas.openxmlformats.org/drawingml/2006/main" xmlns:r="http://schemas.openxmlformats.org/officeDocument/2006/relationships" xmlns:mc="http://schemas.openxmlformats.org/markup-compatibility/2006" xmlns:mv="urn:schemas-microsoft-com:mac:vml" xmlns:p="http://schemas.openxmlformats.org/presentationml/2006/main" xmlns:c="http://schemas.openxmlformats.org/drawingml/2006/chart" xmlns:dgm="http://schemas.openxmlformats.org/drawingml/2006/diagram" xmlns:o="urn:schemas-microsoft-com:office:office" xmlns:v="urn:schemas-microsoft-com:vml" xmlns:pvml="urn:schemas-microsoft-com:office:powerpoint" xmlns:com="http://schemas.openxmlformats.org/drawingml/2006/compatibility" xmlns:p14="http://schemas.microsoft.com/office/powerpoint/2010/main" xmlns:p15="http://schemas.microsoft.com/office/powerpoint/2012/main" xmlns:ahyp="http://schemas.microsoft.com/office/drawing/2018/hyperlinkcolor" showMasterPhAnim="0" showMasterSp="0">
   <p:cSld>
     <p:spTree>
       <p:nvGrpSpPr>
-        <p:cNvPr id="666" name="Shape 666"/>
+        <p:cNvPr id="683" name="Shape 683"/>
         <p:cNvGrpSpPr/>
         <p:nvPr/>
       </p:nvGrpSpPr>
@@ -2182,7 +2300,7 @@
       </p:grpSpPr>
       <p:sp>
         <p:nvSpPr>
-          <p:cNvPr id="667" name="Google Shape;667;g1125d80b419_0_216:notes"/>
+          <p:cNvPr id="684" name="Google Shape;684;g1125d80b419_0_216:notes"/>
           <p:cNvSpPr/>
           <p:nvPr>
             <p:ph idx="2" type="sldImg"/>
@@ -2217,7 +2335,7 @@
       </p:sp>
       <p:sp>
         <p:nvSpPr>
-          <p:cNvPr id="668" name="Google Shape;668;g1125d80b419_0_216:notes"/>
+          <p:cNvPr id="685" name="Google Shape;685;g1125d80b419_0_216:notes"/>
           <p:cNvSpPr txBox="1"/>
           <p:nvPr>
             <p:ph idx="1" type="body"/>
@@ -2594,11 +2712,11 @@
                   <a:schemeClr val="dk1"/>
                 </a:solidFill>
               </a:rPr>
-              <a:t>As a Data Scientist with an accounting background, I was recently approached by Top4Sport to help</a:t>
+              <a:t>I was recently approached by Top4Sport to help</a:t>
             </a:r>
             <a:r>
               <a:rPr lang="en"/>
-              <a:t> them predict sales for various countries and products, and enable them to manage and allocate resources more efficiently</a:t>
+              <a:t> them predict sales for various countries and products, and enable them to manage and allocate resources more efficiently </a:t>
             </a:r>
             <a:endParaRPr/>
           </a:p>
@@ -2646,7 +2764,7 @@
       </p:grpSpPr>
       <p:sp>
         <p:nvSpPr>
-          <p:cNvPr id="463" name="Google Shape;463;g23a6315a7e8_0_121:notes"/>
+          <p:cNvPr id="463" name="Google Shape;463;g21ea758c45c_0_10:notes"/>
           <p:cNvSpPr/>
           <p:nvPr>
             <p:ph idx="2" type="sldImg"/>
@@ -2681,7 +2799,150 @@
       </p:sp>
       <p:sp>
         <p:nvSpPr>
-          <p:cNvPr id="464" name="Google Shape;464;g23a6315a7e8_0_121:notes"/>
+          <p:cNvPr id="464" name="Google Shape;464;g21ea758c45c_0_10:notes"/>
+          <p:cNvSpPr txBox="1"/>
+          <p:nvPr>
+            <p:ph idx="1" type="body"/>
+          </p:nvPr>
+        </p:nvSpPr>
+        <p:spPr>
+          <a:xfrm>
+            <a:off x="685800" y="4343400"/>
+            <a:ext cx="5486400" cy="4114800"/>
+          </a:xfrm>
+          <a:prstGeom prst="rect">
+            <a:avLst/>
+          </a:prstGeom>
+        </p:spPr>
+        <p:txBody>
+          <a:bodyPr anchorCtr="0" anchor="t" bIns="91425" lIns="91425" spcFirstLastPara="1" rIns="91425" wrap="square" tIns="91425">
+            <a:noAutofit/>
+          </a:bodyPr>
+          <a:lstStyle/>
+          <a:p>
+            <a:pPr indent="-298450" lvl="0" marL="457200" rtl="0" algn="l">
+              <a:spcBef>
+                <a:spcPts val="0"/>
+              </a:spcBef>
+              <a:spcAft>
+                <a:spcPts val="0"/>
+              </a:spcAft>
+              <a:buSzPts val="1100"/>
+              <a:buChar char="●"/>
+            </a:pPr>
+            <a:r>
+              <a:rPr lang="en"/>
+              <a:t>And </a:t>
+            </a:r>
+            <a:r>
+              <a:rPr lang="en"/>
+              <a:t>here's</a:t>
+            </a:r>
+            <a:r>
+              <a:rPr lang="en"/>
+              <a:t> where I come in.</a:t>
+            </a:r>
+            <a:endParaRPr/>
+          </a:p>
+          <a:p>
+            <a:pPr indent="-298450" lvl="0" marL="457200" rtl="0" algn="l">
+              <a:spcBef>
+                <a:spcPts val="0"/>
+              </a:spcBef>
+              <a:spcAft>
+                <a:spcPts val="0"/>
+              </a:spcAft>
+              <a:buSzPts val="1100"/>
+              <a:buChar char="●"/>
+            </a:pPr>
+            <a:r>
+              <a:rPr lang="en"/>
+              <a:t>I'm a data scientist with an accounting background. </a:t>
+            </a:r>
+            <a:endParaRPr/>
+          </a:p>
+          <a:p>
+            <a:pPr indent="-298450" lvl="0" marL="457200" rtl="0" algn="l">
+              <a:spcBef>
+                <a:spcPts val="0"/>
+              </a:spcBef>
+              <a:spcAft>
+                <a:spcPts val="0"/>
+              </a:spcAft>
+              <a:buSzPts val="1100"/>
+              <a:buChar char="●"/>
+            </a:pPr>
+            <a:r>
+              <a:rPr lang="en"/>
+              <a:t>I analyze complex data using statistical modeling and programming to provide valuable insights for informed decision-making. My financial analysis skills and business acumen help me understand industry challenges and opportunities, making me a valuable asset for clients.</a:t>
+            </a:r>
+            <a:endParaRPr/>
+          </a:p>
+        </p:txBody>
+      </p:sp>
+    </p:spTree>
+  </p:cSld>
+  <p:clrMapOvr>
+    <a:masterClrMapping/>
+  </p:clrMapOvr>
+</p:notes>
+</file>
+
+<file path=ppt/notesSlides/notesSlide5.xml><?xml version="1.0" encoding="utf-8"?>
+<p:notes xmlns:a="http://schemas.openxmlformats.org/drawingml/2006/main" xmlns:r="http://schemas.openxmlformats.org/officeDocument/2006/relationships" xmlns:mc="http://schemas.openxmlformats.org/markup-compatibility/2006" xmlns:mv="urn:schemas-microsoft-com:mac:vml" xmlns:p="http://schemas.openxmlformats.org/presentationml/2006/main" xmlns:c="http://schemas.openxmlformats.org/drawingml/2006/chart" xmlns:dgm="http://schemas.openxmlformats.org/drawingml/2006/diagram" xmlns:o="urn:schemas-microsoft-com:office:office" xmlns:v="urn:schemas-microsoft-com:vml" xmlns:pvml="urn:schemas-microsoft-com:office:powerpoint" xmlns:com="http://schemas.openxmlformats.org/drawingml/2006/compatibility" xmlns:p14="http://schemas.microsoft.com/office/powerpoint/2010/main" xmlns:p15="http://schemas.microsoft.com/office/powerpoint/2012/main" xmlns:ahyp="http://schemas.microsoft.com/office/drawing/2018/hyperlinkcolor" showMasterPhAnim="0" showMasterSp="0">
+  <p:cSld>
+    <p:spTree>
+      <p:nvGrpSpPr>
+        <p:cNvPr id="479" name="Shape 479"/>
+        <p:cNvGrpSpPr/>
+        <p:nvPr/>
+      </p:nvGrpSpPr>
+      <p:grpSpPr>
+        <a:xfrm>
+          <a:off x="0" y="0"/>
+          <a:ext cx="0" cy="0"/>
+          <a:chOff x="0" y="0"/>
+          <a:chExt cx="0" cy="0"/>
+        </a:xfrm>
+      </p:grpSpPr>
+      <p:sp>
+        <p:nvSpPr>
+          <p:cNvPr id="480" name="Google Shape;480;g23a6315a7e8_0_121:notes"/>
+          <p:cNvSpPr/>
+          <p:nvPr>
+            <p:ph idx="2" type="sldImg"/>
+          </p:nvPr>
+        </p:nvSpPr>
+        <p:spPr>
+          <a:xfrm>
+            <a:off x="381300" y="685800"/>
+            <a:ext cx="6096000" cy="3429000"/>
+          </a:xfrm>
+          <a:custGeom>
+            <a:rect b="b" l="l" r="r" t="t"/>
+            <a:pathLst>
+              <a:path extrusionOk="0" h="120000" w="120000">
+                <a:moveTo>
+                  <a:pt x="0" y="0"/>
+                </a:moveTo>
+                <a:lnTo>
+                  <a:pt x="120000" y="0"/>
+                </a:lnTo>
+                <a:lnTo>
+                  <a:pt x="120000" y="120000"/>
+                </a:lnTo>
+                <a:lnTo>
+                  <a:pt x="0" y="120000"/>
+                </a:lnTo>
+                <a:close/>
+              </a:path>
+            </a:pathLst>
+          </a:custGeom>
+        </p:spPr>
+      </p:sp>
+      <p:sp>
+        <p:nvSpPr>
+          <p:cNvPr id="481" name="Google Shape;481;g23a6315a7e8_0_121:notes"/>
           <p:cNvSpPr txBox="1"/>
           <p:nvPr>
             <p:ph idx="1" type="body"/>
@@ -2848,12 +3109,12 @@
 </p:notes>
 </file>
 
-<file path=ppt/notesSlides/notesSlide5.xml><?xml version="1.0" encoding="utf-8"?>
+<file path=ppt/notesSlides/notesSlide6.xml><?xml version="1.0" encoding="utf-8"?>
 <p:notes xmlns:a="http://schemas.openxmlformats.org/drawingml/2006/main" xmlns:r="http://schemas.openxmlformats.org/officeDocument/2006/relationships" xmlns:mc="http://schemas.openxmlformats.org/markup-compatibility/2006" xmlns:mv="urn:schemas-microsoft-com:mac:vml" xmlns:p="http://schemas.openxmlformats.org/presentationml/2006/main" xmlns:c="http://schemas.openxmlformats.org/drawingml/2006/chart" xmlns:dgm="http://schemas.openxmlformats.org/drawingml/2006/diagram" xmlns:o="urn:schemas-microsoft-com:office:office" xmlns:v="urn:schemas-microsoft-com:vml" xmlns:pvml="urn:schemas-microsoft-com:office:powerpoint" xmlns:com="http://schemas.openxmlformats.org/drawingml/2006/compatibility" xmlns:p14="http://schemas.microsoft.com/office/powerpoint/2010/main" xmlns:p15="http://schemas.microsoft.com/office/powerpoint/2012/main" xmlns:ahyp="http://schemas.microsoft.com/office/drawing/2018/hyperlinkcolor" showMasterPhAnim="0" showMasterSp="0">
   <p:cSld>
     <p:spTree>
       <p:nvGrpSpPr>
-        <p:cNvPr id="474" name="Shape 474"/>
+        <p:cNvPr id="491" name="Shape 491"/>
         <p:cNvGrpSpPr/>
         <p:nvPr/>
       </p:nvGrpSpPr>
@@ -2867,7 +3128,7 @@
       </p:grpSpPr>
       <p:sp>
         <p:nvSpPr>
-          <p:cNvPr id="475" name="Google Shape;475;g23a6315a7e8_0_76:notes"/>
+          <p:cNvPr id="492" name="Google Shape;492;g23a6315a7e8_0_76:notes"/>
           <p:cNvSpPr/>
           <p:nvPr>
             <p:ph idx="2" type="sldImg"/>
@@ -2902,7 +3163,7 @@
       </p:sp>
       <p:sp>
         <p:nvSpPr>
-          <p:cNvPr id="476" name="Google Shape;476;g23a6315a7e8_0_76:notes"/>
+          <p:cNvPr id="493" name="Google Shape;493;g23a6315a7e8_0_76:notes"/>
           <p:cNvSpPr txBox="1"/>
           <p:nvPr>
             <p:ph idx="1" type="body"/>
@@ -2964,12 +3225,12 @@
 </p:notes>
 </file>
 
-<file path=ppt/notesSlides/notesSlide6.xml><?xml version="1.0" encoding="utf-8"?>
+<file path=ppt/notesSlides/notesSlide7.xml><?xml version="1.0" encoding="utf-8"?>
 <p:notes xmlns:a="http://schemas.openxmlformats.org/drawingml/2006/main" xmlns:r="http://schemas.openxmlformats.org/officeDocument/2006/relationships" xmlns:mc="http://schemas.openxmlformats.org/markup-compatibility/2006" xmlns:mv="urn:schemas-microsoft-com:mac:vml" xmlns:p="http://schemas.openxmlformats.org/presentationml/2006/main" xmlns:c="http://schemas.openxmlformats.org/drawingml/2006/chart" xmlns:dgm="http://schemas.openxmlformats.org/drawingml/2006/diagram" xmlns:o="urn:schemas-microsoft-com:office:office" xmlns:v="urn:schemas-microsoft-com:vml" xmlns:pvml="urn:schemas-microsoft-com:office:powerpoint" xmlns:com="http://schemas.openxmlformats.org/drawingml/2006/compatibility" xmlns:p14="http://schemas.microsoft.com/office/powerpoint/2010/main" xmlns:p15="http://schemas.microsoft.com/office/powerpoint/2012/main" xmlns:ahyp="http://schemas.microsoft.com/office/drawing/2018/hyperlinkcolor" showMasterPhAnim="0" showMasterSp="0">
   <p:cSld>
     <p:spTree>
       <p:nvGrpSpPr>
-        <p:cNvPr id="482" name="Shape 482"/>
+        <p:cNvPr id="499" name="Shape 499"/>
         <p:cNvGrpSpPr/>
         <p:nvPr/>
       </p:nvGrpSpPr>
@@ -2983,7 +3244,7 @@
       </p:grpSpPr>
       <p:sp>
         <p:nvSpPr>
-          <p:cNvPr id="483" name="Google Shape;483;g23a6315a7e8_0_322:notes"/>
+          <p:cNvPr id="500" name="Google Shape;500;g23a6315a7e8_0_322:notes"/>
           <p:cNvSpPr/>
           <p:nvPr>
             <p:ph idx="2" type="sldImg"/>
@@ -3018,7 +3279,7 @@
       </p:sp>
       <p:sp>
         <p:nvSpPr>
-          <p:cNvPr id="484" name="Google Shape;484;g23a6315a7e8_0_322:notes"/>
+          <p:cNvPr id="501" name="Google Shape;501;g23a6315a7e8_0_322:notes"/>
           <p:cNvSpPr txBox="1"/>
           <p:nvPr>
             <p:ph idx="1" type="body"/>
@@ -3147,12 +3408,12 @@
 </p:notes>
 </file>
 
-<file path=ppt/notesSlides/notesSlide7.xml><?xml version="1.0" encoding="utf-8"?>
+<file path=ppt/notesSlides/notesSlide8.xml><?xml version="1.0" encoding="utf-8"?>
 <p:notes xmlns:a="http://schemas.openxmlformats.org/drawingml/2006/main" xmlns:r="http://schemas.openxmlformats.org/officeDocument/2006/relationships" xmlns:mc="http://schemas.openxmlformats.org/markup-compatibility/2006" xmlns:mv="urn:schemas-microsoft-com:mac:vml" xmlns:p="http://schemas.openxmlformats.org/presentationml/2006/main" xmlns:c="http://schemas.openxmlformats.org/drawingml/2006/chart" xmlns:dgm="http://schemas.openxmlformats.org/drawingml/2006/diagram" xmlns:o="urn:schemas-microsoft-com:office:office" xmlns:v="urn:schemas-microsoft-com:vml" xmlns:pvml="urn:schemas-microsoft-com:office:powerpoint" xmlns:com="http://schemas.openxmlformats.org/drawingml/2006/compatibility" xmlns:p14="http://schemas.microsoft.com/office/powerpoint/2010/main" xmlns:p15="http://schemas.microsoft.com/office/powerpoint/2012/main" xmlns:ahyp="http://schemas.microsoft.com/office/drawing/2018/hyperlinkcolor" showMasterPhAnim="0" showMasterSp="0">
   <p:cSld>
     <p:spTree>
       <p:nvGrpSpPr>
-        <p:cNvPr id="524" name="Shape 524"/>
+        <p:cNvPr id="541" name="Shape 541"/>
         <p:cNvGrpSpPr/>
         <p:nvPr/>
       </p:nvGrpSpPr>
@@ -3166,7 +3427,7 @@
       </p:grpSpPr>
       <p:sp>
         <p:nvSpPr>
-          <p:cNvPr id="525" name="Google Shape;525;g23a6315a7e8_0_315:notes"/>
+          <p:cNvPr id="542" name="Google Shape;542;g23a6315a7e8_0_315:notes"/>
           <p:cNvSpPr/>
           <p:nvPr>
             <p:ph idx="2" type="sldImg"/>
@@ -3201,7 +3462,7 @@
       </p:sp>
       <p:sp>
         <p:nvSpPr>
-          <p:cNvPr id="526" name="Google Shape;526;g23a6315a7e8_0_315:notes"/>
+          <p:cNvPr id="543" name="Google Shape;543;g23a6315a7e8_0_315:notes"/>
           <p:cNvSpPr txBox="1"/>
           <p:nvPr>
             <p:ph idx="1" type="body"/>
@@ -3540,12 +3801,12 @@
 </p:notes>
 </file>
 
-<file path=ppt/notesSlides/notesSlide8.xml><?xml version="1.0" encoding="utf-8"?>
+<file path=ppt/notesSlides/notesSlide9.xml><?xml version="1.0" encoding="utf-8"?>
 <p:notes xmlns:a="http://schemas.openxmlformats.org/drawingml/2006/main" xmlns:r="http://schemas.openxmlformats.org/officeDocument/2006/relationships" xmlns:mc="http://schemas.openxmlformats.org/markup-compatibility/2006" xmlns:mv="urn:schemas-microsoft-com:mac:vml" xmlns:p="http://schemas.openxmlformats.org/presentationml/2006/main" xmlns:c="http://schemas.openxmlformats.org/drawingml/2006/chart" xmlns:dgm="http://schemas.openxmlformats.org/drawingml/2006/diagram" xmlns:o="urn:schemas-microsoft-com:office:office" xmlns:v="urn:schemas-microsoft-com:vml" xmlns:pvml="urn:schemas-microsoft-com:office:powerpoint" xmlns:com="http://schemas.openxmlformats.org/drawingml/2006/compatibility" xmlns:p14="http://schemas.microsoft.com/office/powerpoint/2010/main" xmlns:p15="http://schemas.microsoft.com/office/powerpoint/2012/main" xmlns:ahyp="http://schemas.microsoft.com/office/drawing/2018/hyperlinkcolor" showMasterPhAnim="0" showMasterSp="0">
   <p:cSld>
     <p:spTree>
       <p:nvGrpSpPr>
-        <p:cNvPr id="553" name="Shape 553"/>
+        <p:cNvPr id="570" name="Shape 570"/>
         <p:cNvGrpSpPr/>
         <p:nvPr/>
       </p:nvGrpSpPr>
@@ -3559,7 +3820,7 @@
       </p:grpSpPr>
       <p:sp>
         <p:nvSpPr>
-          <p:cNvPr id="554" name="Google Shape;554;g23a6315a7e8_0_451:notes"/>
+          <p:cNvPr id="571" name="Google Shape;571;g23a6315a7e8_0_451:notes"/>
           <p:cNvSpPr/>
           <p:nvPr>
             <p:ph idx="2" type="sldImg"/>
@@ -3594,7 +3855,7 @@
       </p:sp>
       <p:sp>
         <p:nvSpPr>
-          <p:cNvPr id="555" name="Google Shape;555;g23a6315a7e8_0_451:notes"/>
+          <p:cNvPr id="572" name="Google Shape;572;g23a6315a7e8_0_451:notes"/>
           <p:cNvSpPr txBox="1"/>
           <p:nvPr>
             <p:ph idx="1" type="body"/>
@@ -3628,123 +3889,6 @@
             <a:r>
               <a:rPr lang="en"/>
               <a:t>Here, we can see the number of orders by manufacturers, where Nike has the biggest volume of orders from Top4Sports</a:t>
-            </a:r>
-            <a:endParaRPr/>
-          </a:p>
-        </p:txBody>
-      </p:sp>
-    </p:spTree>
-  </p:cSld>
-  <p:clrMapOvr>
-    <a:masterClrMapping/>
-  </p:clrMapOvr>
-</p:notes>
-</file>
-
-<file path=ppt/notesSlides/notesSlide9.xml><?xml version="1.0" encoding="utf-8"?>
-<p:notes xmlns:a="http://schemas.openxmlformats.org/drawingml/2006/main" xmlns:r="http://schemas.openxmlformats.org/officeDocument/2006/relationships" xmlns:mc="http://schemas.openxmlformats.org/markup-compatibility/2006" xmlns:mv="urn:schemas-microsoft-com:mac:vml" xmlns:p="http://schemas.openxmlformats.org/presentationml/2006/main" xmlns:c="http://schemas.openxmlformats.org/drawingml/2006/chart" xmlns:dgm="http://schemas.openxmlformats.org/drawingml/2006/diagram" xmlns:o="urn:schemas-microsoft-com:office:office" xmlns:v="urn:schemas-microsoft-com:vml" xmlns:pvml="urn:schemas-microsoft-com:office:powerpoint" xmlns:com="http://schemas.openxmlformats.org/drawingml/2006/compatibility" xmlns:p14="http://schemas.microsoft.com/office/powerpoint/2010/main" xmlns:p15="http://schemas.microsoft.com/office/powerpoint/2012/main" xmlns:ahyp="http://schemas.microsoft.com/office/drawing/2018/hyperlinkcolor" showMasterPhAnim="0" showMasterSp="0">
-  <p:cSld>
-    <p:spTree>
-      <p:nvGrpSpPr>
-        <p:cNvPr id="560" name="Shape 560"/>
-        <p:cNvGrpSpPr/>
-        <p:nvPr/>
-      </p:nvGrpSpPr>
-      <p:grpSpPr>
-        <a:xfrm>
-          <a:off x="0" y="0"/>
-          <a:ext cx="0" cy="0"/>
-          <a:chOff x="0" y="0"/>
-          <a:chExt cx="0" cy="0"/>
-        </a:xfrm>
-      </p:grpSpPr>
-      <p:sp>
-        <p:nvSpPr>
-          <p:cNvPr id="561" name="Google Shape;561;g23a6315a7e8_0_460:notes"/>
-          <p:cNvSpPr/>
-          <p:nvPr>
-            <p:ph idx="2" type="sldImg"/>
-          </p:nvPr>
-        </p:nvSpPr>
-        <p:spPr>
-          <a:xfrm>
-            <a:off x="381300" y="685800"/>
-            <a:ext cx="6096000" cy="3429000"/>
-          </a:xfrm>
-          <a:custGeom>
-            <a:rect b="b" l="l" r="r" t="t"/>
-            <a:pathLst>
-              <a:path extrusionOk="0" h="120000" w="120000">
-                <a:moveTo>
-                  <a:pt x="0" y="0"/>
-                </a:moveTo>
-                <a:lnTo>
-                  <a:pt x="120000" y="0"/>
-                </a:lnTo>
-                <a:lnTo>
-                  <a:pt x="120000" y="120000"/>
-                </a:lnTo>
-                <a:lnTo>
-                  <a:pt x="0" y="120000"/>
-                </a:lnTo>
-                <a:close/>
-              </a:path>
-            </a:pathLst>
-          </a:custGeom>
-        </p:spPr>
-      </p:sp>
-      <p:sp>
-        <p:nvSpPr>
-          <p:cNvPr id="562" name="Google Shape;562;g23a6315a7e8_0_460:notes"/>
-          <p:cNvSpPr txBox="1"/>
-          <p:nvPr>
-            <p:ph idx="1" type="body"/>
-          </p:nvPr>
-        </p:nvSpPr>
-        <p:spPr>
-          <a:xfrm>
-            <a:off x="685800" y="4343400"/>
-            <a:ext cx="5486400" cy="4114800"/>
-          </a:xfrm>
-          <a:prstGeom prst="rect">
-            <a:avLst/>
-          </a:prstGeom>
-        </p:spPr>
-        <p:txBody>
-          <a:bodyPr anchorCtr="0" anchor="t" bIns="91425" lIns="91425" spcFirstLastPara="1" rIns="91425" wrap="square" tIns="91425">
-            <a:noAutofit/>
-          </a:bodyPr>
-          <a:lstStyle/>
-          <a:p>
-            <a:pPr indent="-298450" lvl="0" marL="457200" rtl="0" algn="l">
-              <a:spcBef>
-                <a:spcPts val="0"/>
-              </a:spcBef>
-              <a:spcAft>
-                <a:spcPts val="0"/>
-              </a:spcAft>
-              <a:buSzPts val="1100"/>
-              <a:buChar char="●"/>
-            </a:pPr>
-            <a:r>
-              <a:rPr lang="en"/>
-              <a:t>Here, we can see the number of orders for specific product types, </a:t>
-            </a:r>
-            <a:r>
-              <a:rPr lang="en"/>
-              <a:t>where</a:t>
-            </a:r>
-            <a:r>
-              <a:rPr lang="en"/>
-              <a:t> running shoes, pants, and t-shirts are the top 3 most </a:t>
-            </a:r>
-            <a:r>
-              <a:rPr lang="en"/>
-              <a:t>highest</a:t>
-            </a:r>
-            <a:r>
-              <a:rPr lang="en"/>
-              <a:t> selling</a:t>
             </a:r>
             <a:endParaRPr/>
           </a:p>
@@ -32476,7 +32620,7 @@
   <p:cSld>
     <p:spTree>
       <p:nvGrpSpPr>
-        <p:cNvPr id="570" name="Shape 570"/>
+        <p:cNvPr id="580" name="Shape 580"/>
         <p:cNvGrpSpPr/>
         <p:nvPr/>
       </p:nvGrpSpPr>
@@ -32490,7 +32634,7 @@
       </p:grpSpPr>
       <p:sp>
         <p:nvSpPr>
-          <p:cNvPr id="571" name="Google Shape;571;p35"/>
+          <p:cNvPr id="581" name="Google Shape;581;p35"/>
           <p:cNvSpPr txBox="1"/>
           <p:nvPr>
             <p:ph idx="4294967295" type="ctrTitle"/>
@@ -32534,7 +32678,7 @@
       </p:sp>
       <p:sp>
         <p:nvSpPr>
-          <p:cNvPr id="572" name="Google Shape;572;p35"/>
+          <p:cNvPr id="582" name="Google Shape;582;p35"/>
           <p:cNvSpPr txBox="1"/>
           <p:nvPr/>
         </p:nvSpPr>
@@ -32592,7 +32736,162 @@
       </p:sp>
       <p:pic>
         <p:nvPicPr>
-          <p:cNvPr id="573" name="Google Shape;573;p35"/>
+          <p:cNvPr id="583" name="Google Shape;583;p35"/>
+          <p:cNvPicPr preferRelativeResize="0"/>
+          <p:nvPr/>
+        </p:nvPicPr>
+        <p:blipFill>
+          <a:blip r:embed="rId3">
+            <a:alphaModFix/>
+          </a:blip>
+          <a:stretch>
+            <a:fillRect/>
+          </a:stretch>
+        </p:blipFill>
+        <p:spPr>
+          <a:xfrm>
+            <a:off x="164250" y="1037800"/>
+            <a:ext cx="8579531" cy="3682675"/>
+          </a:xfrm>
+          <a:prstGeom prst="rect">
+            <a:avLst/>
+          </a:prstGeom>
+          <a:noFill/>
+          <a:ln>
+            <a:noFill/>
+          </a:ln>
+        </p:spPr>
+      </p:pic>
+    </p:spTree>
+  </p:cSld>
+  <p:clrMapOvr>
+    <a:masterClrMapping/>
+  </p:clrMapOvr>
+</p:sld>
+</file>
+
+<file path=ppt/slides/slide11.xml><?xml version="1.0" encoding="utf-8"?>
+<p:sld xmlns:a="http://schemas.openxmlformats.org/drawingml/2006/main" xmlns:r="http://schemas.openxmlformats.org/officeDocument/2006/relationships" xmlns:mc="http://schemas.openxmlformats.org/markup-compatibility/2006" xmlns:mv="urn:schemas-microsoft-com:mac:vml" xmlns:p="http://schemas.openxmlformats.org/presentationml/2006/main" xmlns:c="http://schemas.openxmlformats.org/drawingml/2006/chart" xmlns:dgm="http://schemas.openxmlformats.org/drawingml/2006/diagram" xmlns:o="urn:schemas-microsoft-com:office:office" xmlns:v="urn:schemas-microsoft-com:vml" xmlns:pvml="urn:schemas-microsoft-com:office:powerpoint" xmlns:com="http://schemas.openxmlformats.org/drawingml/2006/compatibility" xmlns:p14="http://schemas.microsoft.com/office/powerpoint/2010/main" xmlns:p15="http://schemas.microsoft.com/office/powerpoint/2012/main" xmlns:ahyp="http://schemas.microsoft.com/office/drawing/2018/hyperlinkcolor">
+  <p:cSld>
+    <p:spTree>
+      <p:nvGrpSpPr>
+        <p:cNvPr id="587" name="Shape 587"/>
+        <p:cNvGrpSpPr/>
+        <p:nvPr/>
+      </p:nvGrpSpPr>
+      <p:grpSpPr>
+        <a:xfrm>
+          <a:off x="0" y="0"/>
+          <a:ext cx="0" cy="0"/>
+          <a:chOff x="0" y="0"/>
+          <a:chExt cx="0" cy="0"/>
+        </a:xfrm>
+      </p:grpSpPr>
+      <p:sp>
+        <p:nvSpPr>
+          <p:cNvPr id="588" name="Google Shape;588;p36"/>
+          <p:cNvSpPr txBox="1"/>
+          <p:nvPr>
+            <p:ph idx="4294967295" type="ctrTitle"/>
+          </p:nvPr>
+        </p:nvSpPr>
+        <p:spPr>
+          <a:xfrm>
+            <a:off x="1260925" y="687525"/>
+            <a:ext cx="6548400" cy="623400"/>
+          </a:xfrm>
+          <a:prstGeom prst="rect">
+            <a:avLst/>
+          </a:prstGeom>
+        </p:spPr>
+        <p:txBody>
+          <a:bodyPr anchorCtr="0" anchor="t" bIns="91425" lIns="91425" spcFirstLastPara="1" rIns="91425" wrap="square" tIns="91425">
+            <a:noAutofit/>
+          </a:bodyPr>
+          <a:lstStyle/>
+          <a:p>
+            <a:pPr indent="0" lvl="0" marL="0" rtl="0" algn="l">
+              <a:spcBef>
+                <a:spcPts val="0"/>
+              </a:spcBef>
+              <a:spcAft>
+                <a:spcPts val="0"/>
+              </a:spcAft>
+              <a:buNone/>
+            </a:pPr>
+            <a:r>
+              <a:rPr lang="en" sz="3300"/>
+              <a:t>  </a:t>
+            </a:r>
+            <a:endParaRPr sz="2300">
+              <a:solidFill>
+                <a:schemeClr val="lt2"/>
+              </a:solidFill>
+            </a:endParaRPr>
+          </a:p>
+        </p:txBody>
+      </p:sp>
+      <p:sp>
+        <p:nvSpPr>
+          <p:cNvPr id="589" name="Google Shape;589;p36"/>
+          <p:cNvSpPr txBox="1"/>
+          <p:nvPr/>
+        </p:nvSpPr>
+        <p:spPr>
+          <a:xfrm>
+            <a:off x="1970325" y="157900"/>
+            <a:ext cx="5477400" cy="692700"/>
+          </a:xfrm>
+          <a:prstGeom prst="rect">
+            <a:avLst/>
+          </a:prstGeom>
+          <a:noFill/>
+          <a:ln>
+            <a:noFill/>
+          </a:ln>
+        </p:spPr>
+        <p:txBody>
+          <a:bodyPr anchorCtr="0" anchor="t" bIns="91425" lIns="91425" spcFirstLastPara="1" rIns="91425" wrap="square" tIns="91425">
+            <a:spAutoFit/>
+          </a:bodyPr>
+          <a:lstStyle/>
+          <a:p>
+            <a:pPr indent="0" lvl="0" marL="0" rtl="0" algn="ctr">
+              <a:spcBef>
+                <a:spcPts val="0"/>
+              </a:spcBef>
+              <a:spcAft>
+                <a:spcPts val="0"/>
+              </a:spcAft>
+              <a:buNone/>
+            </a:pPr>
+            <a:r>
+              <a:rPr lang="en" sz="3300">
+                <a:solidFill>
+                  <a:schemeClr val="dk1"/>
+                </a:solidFill>
+                <a:latin typeface="Rubik Black"/>
+                <a:ea typeface="Rubik Black"/>
+                <a:cs typeface="Rubik Black"/>
+                <a:sym typeface="Rubik Black"/>
+              </a:rPr>
+              <a:t>EDA FINDINGS CONT…</a:t>
+            </a:r>
+            <a:endParaRPr sz="1000">
+              <a:solidFill>
+                <a:schemeClr val="dk1"/>
+              </a:solidFill>
+              <a:latin typeface="Rubik Black"/>
+              <a:ea typeface="Rubik Black"/>
+              <a:cs typeface="Rubik Black"/>
+              <a:sym typeface="Rubik Black"/>
+            </a:endParaRPr>
+          </a:p>
+        </p:txBody>
+      </p:sp>
+      <p:pic>
+        <p:nvPicPr>
+          <p:cNvPr id="590" name="Google Shape;590;p36"/>
           <p:cNvPicPr preferRelativeResize="0"/>
           <p:nvPr/>
         </p:nvPicPr>
@@ -32626,12 +32925,12 @@
 </p:sld>
 </file>
 
-<file path=ppt/slides/slide11.xml><?xml version="1.0" encoding="utf-8"?>
+<file path=ppt/slides/slide12.xml><?xml version="1.0" encoding="utf-8"?>
 <p:sld xmlns:a="http://schemas.openxmlformats.org/drawingml/2006/main" xmlns:r="http://schemas.openxmlformats.org/officeDocument/2006/relationships" xmlns:mc="http://schemas.openxmlformats.org/markup-compatibility/2006" xmlns:mv="urn:schemas-microsoft-com:mac:vml" xmlns:p="http://schemas.openxmlformats.org/presentationml/2006/main" xmlns:c="http://schemas.openxmlformats.org/drawingml/2006/chart" xmlns:dgm="http://schemas.openxmlformats.org/drawingml/2006/diagram" xmlns:o="urn:schemas-microsoft-com:office:office" xmlns:v="urn:schemas-microsoft-com:vml" xmlns:pvml="urn:schemas-microsoft-com:office:powerpoint" xmlns:com="http://schemas.openxmlformats.org/drawingml/2006/compatibility" xmlns:p14="http://schemas.microsoft.com/office/powerpoint/2010/main" xmlns:p15="http://schemas.microsoft.com/office/powerpoint/2012/main" xmlns:ahyp="http://schemas.microsoft.com/office/drawing/2018/hyperlinkcolor">
   <p:cSld>
     <p:spTree>
       <p:nvGrpSpPr>
-        <p:cNvPr id="577" name="Shape 577"/>
+        <p:cNvPr id="594" name="Shape 594"/>
         <p:cNvGrpSpPr/>
         <p:nvPr/>
       </p:nvGrpSpPr>
@@ -32645,7 +32944,7 @@
       </p:grpSpPr>
       <p:sp>
         <p:nvSpPr>
-          <p:cNvPr id="578" name="Google Shape;578;p36"/>
+          <p:cNvPr id="595" name="Google Shape;595;p37"/>
           <p:cNvSpPr txBox="1"/>
           <p:nvPr>
             <p:ph idx="4294967295" type="ctrTitle"/>
@@ -32689,7 +32988,7 @@
       </p:sp>
       <p:sp>
         <p:nvSpPr>
-          <p:cNvPr id="579" name="Google Shape;579;p36"/>
+          <p:cNvPr id="596" name="Google Shape;596;p37"/>
           <p:cNvSpPr txBox="1"/>
           <p:nvPr/>
         </p:nvSpPr>
@@ -32747,7 +33046,7 @@
       </p:sp>
       <p:pic>
         <p:nvPicPr>
-          <p:cNvPr id="580" name="Google Shape;580;p36"/>
+          <p:cNvPr id="597" name="Google Shape;597;p37"/>
           <p:cNvPicPr preferRelativeResize="0"/>
           <p:nvPr/>
         </p:nvPicPr>
@@ -32781,12 +33080,12 @@
 </p:sld>
 </file>
 
-<file path=ppt/slides/slide12.xml><?xml version="1.0" encoding="utf-8"?>
+<file path=ppt/slides/slide13.xml><?xml version="1.0" encoding="utf-8"?>
 <p:sld xmlns:a="http://schemas.openxmlformats.org/drawingml/2006/main" xmlns:r="http://schemas.openxmlformats.org/officeDocument/2006/relationships" xmlns:mc="http://schemas.openxmlformats.org/markup-compatibility/2006" xmlns:mv="urn:schemas-microsoft-com:mac:vml" xmlns:p="http://schemas.openxmlformats.org/presentationml/2006/main" xmlns:c="http://schemas.openxmlformats.org/drawingml/2006/chart" xmlns:dgm="http://schemas.openxmlformats.org/drawingml/2006/diagram" xmlns:o="urn:schemas-microsoft-com:office:office" xmlns:v="urn:schemas-microsoft-com:vml" xmlns:pvml="urn:schemas-microsoft-com:office:powerpoint" xmlns:com="http://schemas.openxmlformats.org/drawingml/2006/compatibility" xmlns:p14="http://schemas.microsoft.com/office/powerpoint/2010/main" xmlns:p15="http://schemas.microsoft.com/office/powerpoint/2012/main" xmlns:ahyp="http://schemas.microsoft.com/office/drawing/2018/hyperlinkcolor">
   <p:cSld>
     <p:spTree>
       <p:nvGrpSpPr>
-        <p:cNvPr id="584" name="Shape 584"/>
+        <p:cNvPr id="601" name="Shape 601"/>
         <p:cNvGrpSpPr/>
         <p:nvPr/>
       </p:nvGrpSpPr>
@@ -32800,7 +33099,7 @@
       </p:grpSpPr>
       <p:sp>
         <p:nvSpPr>
-          <p:cNvPr id="585" name="Google Shape;585;p37"/>
+          <p:cNvPr id="602" name="Google Shape;602;p38"/>
           <p:cNvSpPr txBox="1"/>
           <p:nvPr>
             <p:ph type="title"/>
@@ -32856,7 +33155,7 @@
       </p:sp>
       <p:pic>
         <p:nvPicPr>
-          <p:cNvPr id="586" name="Google Shape;586;p37"/>
+          <p:cNvPr id="603" name="Google Shape;603;p38"/>
           <p:cNvPicPr preferRelativeResize="0"/>
           <p:nvPr/>
         </p:nvPicPr>
@@ -32884,7 +33183,7 @@
       </p:pic>
       <p:sp>
         <p:nvSpPr>
-          <p:cNvPr id="587" name="Google Shape;587;p37"/>
+          <p:cNvPr id="604" name="Google Shape;604;p38"/>
           <p:cNvSpPr txBox="1"/>
           <p:nvPr/>
         </p:nvSpPr>
@@ -33049,12 +33348,12 @@
 </p:sld>
 </file>
 
-<file path=ppt/slides/slide13.xml><?xml version="1.0" encoding="utf-8"?>
+<file path=ppt/slides/slide14.xml><?xml version="1.0" encoding="utf-8"?>
 <p:sld xmlns:a="http://schemas.openxmlformats.org/drawingml/2006/main" xmlns:r="http://schemas.openxmlformats.org/officeDocument/2006/relationships" xmlns:mc="http://schemas.openxmlformats.org/markup-compatibility/2006" xmlns:mv="urn:schemas-microsoft-com:mac:vml" xmlns:p="http://schemas.openxmlformats.org/presentationml/2006/main" xmlns:c="http://schemas.openxmlformats.org/drawingml/2006/chart" xmlns:dgm="http://schemas.openxmlformats.org/drawingml/2006/diagram" xmlns:o="urn:schemas-microsoft-com:office:office" xmlns:v="urn:schemas-microsoft-com:vml" xmlns:pvml="urn:schemas-microsoft-com:office:powerpoint" xmlns:com="http://schemas.openxmlformats.org/drawingml/2006/compatibility" xmlns:p14="http://schemas.microsoft.com/office/powerpoint/2010/main" xmlns:p15="http://schemas.microsoft.com/office/powerpoint/2012/main" xmlns:ahyp="http://schemas.microsoft.com/office/drawing/2018/hyperlinkcolor">
   <p:cSld>
     <p:spTree>
       <p:nvGrpSpPr>
-        <p:cNvPr id="591" name="Shape 591"/>
+        <p:cNvPr id="608" name="Shape 608"/>
         <p:cNvGrpSpPr/>
         <p:nvPr/>
       </p:nvGrpSpPr>
@@ -33068,7 +33367,7 @@
       </p:grpSpPr>
       <p:sp>
         <p:nvSpPr>
-          <p:cNvPr id="592" name="Google Shape;592;p38"/>
+          <p:cNvPr id="609" name="Google Shape;609;p39"/>
           <p:cNvSpPr txBox="1"/>
           <p:nvPr>
             <p:ph idx="4294967295" type="ctrTitle"/>
@@ -33112,7 +33411,7 @@
       </p:sp>
       <p:sp>
         <p:nvSpPr>
-          <p:cNvPr id="593" name="Google Shape;593;p38"/>
+          <p:cNvPr id="610" name="Google Shape;610;p39"/>
           <p:cNvSpPr txBox="1"/>
           <p:nvPr/>
         </p:nvSpPr>
@@ -33170,7 +33469,7 @@
       </p:sp>
       <p:pic>
         <p:nvPicPr>
-          <p:cNvPr id="594" name="Google Shape;594;p38"/>
+          <p:cNvPr id="611" name="Google Shape;611;p39"/>
           <p:cNvPicPr preferRelativeResize="0"/>
           <p:nvPr/>
         </p:nvPicPr>
@@ -33204,12 +33503,12 @@
 </p:sld>
 </file>
 
-<file path=ppt/slides/slide14.xml><?xml version="1.0" encoding="utf-8"?>
+<file path=ppt/slides/slide15.xml><?xml version="1.0" encoding="utf-8"?>
 <p:sld xmlns:a="http://schemas.openxmlformats.org/drawingml/2006/main" xmlns:r="http://schemas.openxmlformats.org/officeDocument/2006/relationships" xmlns:mc="http://schemas.openxmlformats.org/markup-compatibility/2006" xmlns:mv="urn:schemas-microsoft-com:mac:vml" xmlns:p="http://schemas.openxmlformats.org/presentationml/2006/main" xmlns:c="http://schemas.openxmlformats.org/drawingml/2006/chart" xmlns:dgm="http://schemas.openxmlformats.org/drawingml/2006/diagram" xmlns:o="urn:schemas-microsoft-com:office:office" xmlns:v="urn:schemas-microsoft-com:vml" xmlns:pvml="urn:schemas-microsoft-com:office:powerpoint" xmlns:com="http://schemas.openxmlformats.org/drawingml/2006/compatibility" xmlns:p14="http://schemas.microsoft.com/office/powerpoint/2010/main" xmlns:p15="http://schemas.microsoft.com/office/powerpoint/2012/main" xmlns:ahyp="http://schemas.microsoft.com/office/drawing/2018/hyperlinkcolor">
   <p:cSld>
     <p:spTree>
       <p:nvGrpSpPr>
-        <p:cNvPr id="598" name="Shape 598"/>
+        <p:cNvPr id="615" name="Shape 615"/>
         <p:cNvGrpSpPr/>
         <p:nvPr/>
       </p:nvGrpSpPr>
@@ -33223,7 +33522,7 @@
       </p:grpSpPr>
       <p:sp>
         <p:nvSpPr>
-          <p:cNvPr id="599" name="Google Shape;599;p39"/>
+          <p:cNvPr id="616" name="Google Shape;616;p40"/>
           <p:cNvSpPr txBox="1"/>
           <p:nvPr/>
         </p:nvSpPr>
@@ -33305,7 +33604,7 @@
       </p:sp>
       <p:pic>
         <p:nvPicPr>
-          <p:cNvPr id="600" name="Google Shape;600;p39"/>
+          <p:cNvPr id="617" name="Google Shape;617;p40"/>
           <p:cNvPicPr preferRelativeResize="0"/>
           <p:nvPr/>
         </p:nvPicPr>
@@ -33332,7 +33631,7 @@
       </p:pic>
       <p:sp>
         <p:nvSpPr>
-          <p:cNvPr id="601" name="Google Shape;601;p39"/>
+          <p:cNvPr id="618" name="Google Shape;618;p40"/>
           <p:cNvSpPr txBox="1"/>
           <p:nvPr/>
         </p:nvSpPr>
@@ -33390,12 +33689,12 @@
 </p:sld>
 </file>
 
-<file path=ppt/slides/slide15.xml><?xml version="1.0" encoding="utf-8"?>
+<file path=ppt/slides/slide16.xml><?xml version="1.0" encoding="utf-8"?>
 <p:sld xmlns:a="http://schemas.openxmlformats.org/drawingml/2006/main" xmlns:r="http://schemas.openxmlformats.org/officeDocument/2006/relationships" xmlns:mc="http://schemas.openxmlformats.org/markup-compatibility/2006" xmlns:mv="urn:schemas-microsoft-com:mac:vml" xmlns:p="http://schemas.openxmlformats.org/presentationml/2006/main" xmlns:c="http://schemas.openxmlformats.org/drawingml/2006/chart" xmlns:dgm="http://schemas.openxmlformats.org/drawingml/2006/diagram" xmlns:o="urn:schemas-microsoft-com:office:office" xmlns:v="urn:schemas-microsoft-com:vml" xmlns:pvml="urn:schemas-microsoft-com:office:powerpoint" xmlns:com="http://schemas.openxmlformats.org/drawingml/2006/compatibility" xmlns:p14="http://schemas.microsoft.com/office/powerpoint/2010/main" xmlns:p15="http://schemas.microsoft.com/office/powerpoint/2012/main" xmlns:ahyp="http://schemas.microsoft.com/office/drawing/2018/hyperlinkcolor">
   <p:cSld>
     <p:spTree>
       <p:nvGrpSpPr>
-        <p:cNvPr id="605" name="Shape 605"/>
+        <p:cNvPr id="622" name="Shape 622"/>
         <p:cNvGrpSpPr/>
         <p:nvPr/>
       </p:nvGrpSpPr>
@@ -33409,7 +33708,7 @@
       </p:grpSpPr>
       <p:sp>
         <p:nvSpPr>
-          <p:cNvPr id="606" name="Google Shape;606;p40"/>
+          <p:cNvPr id="623" name="Google Shape;623;p41"/>
           <p:cNvSpPr txBox="1"/>
           <p:nvPr>
             <p:ph type="title"/>
@@ -33449,7 +33748,7 @@
       </p:sp>
       <p:grpSp>
         <p:nvGrpSpPr>
-          <p:cNvPr id="607" name="Google Shape;607;p40"/>
+          <p:cNvPr id="624" name="Google Shape;624;p41"/>
           <p:cNvGrpSpPr/>
           <p:nvPr/>
         </p:nvGrpSpPr>
@@ -33463,7 +33762,7 @@
         </p:grpSpPr>
         <p:sp>
           <p:nvSpPr>
-            <p:cNvPr id="608" name="Google Shape;608;p40"/>
+            <p:cNvPr id="625" name="Google Shape;625;p41"/>
             <p:cNvSpPr/>
             <p:nvPr/>
           </p:nvSpPr>
@@ -33508,7 +33807,7 @@
         </p:sp>
         <p:sp>
           <p:nvSpPr>
-            <p:cNvPr id="609" name="Google Shape;609;p40"/>
+            <p:cNvPr id="626" name="Google Shape;626;p41"/>
             <p:cNvSpPr/>
             <p:nvPr/>
           </p:nvSpPr>
@@ -33559,7 +33858,7 @@
         </p:sp>
         <p:cxnSp>
           <p:nvCxnSpPr>
-            <p:cNvPr id="610" name="Google Shape;610;p40"/>
+            <p:cNvPr id="627" name="Google Shape;627;p41"/>
             <p:cNvCxnSpPr/>
             <p:nvPr/>
           </p:nvCxnSpPr>
@@ -33585,7 +33884,7 @@
         </p:cxnSp>
         <p:sp>
           <p:nvSpPr>
-            <p:cNvPr id="611" name="Google Shape;611;p40"/>
+            <p:cNvPr id="628" name="Google Shape;628;p41"/>
             <p:cNvSpPr/>
             <p:nvPr/>
           </p:nvSpPr>
@@ -33742,7 +34041,7 @@
         </p:sp>
         <p:sp>
           <p:nvSpPr>
-            <p:cNvPr id="612" name="Google Shape;612;p40"/>
+            <p:cNvPr id="629" name="Google Shape;629;p41"/>
             <p:cNvSpPr/>
             <p:nvPr/>
           </p:nvSpPr>
@@ -33899,7 +34198,7 @@
         </p:sp>
         <p:sp>
           <p:nvSpPr>
-            <p:cNvPr id="613" name="Google Shape;613;p40"/>
+            <p:cNvPr id="630" name="Google Shape;630;p41"/>
             <p:cNvSpPr/>
             <p:nvPr/>
           </p:nvSpPr>
@@ -34056,7 +34355,7 @@
         </p:sp>
         <p:grpSp>
           <p:nvGrpSpPr>
-            <p:cNvPr id="614" name="Google Shape;614;p40"/>
+            <p:cNvPr id="631" name="Google Shape;631;p41"/>
             <p:cNvGrpSpPr/>
             <p:nvPr/>
           </p:nvGrpSpPr>
@@ -34070,7 +34369,7 @@
           </p:grpSpPr>
           <p:sp>
             <p:nvSpPr>
-              <p:cNvPr id="615" name="Google Shape;615;p40"/>
+              <p:cNvPr id="632" name="Google Shape;632;p41"/>
               <p:cNvSpPr/>
               <p:nvPr/>
             </p:nvSpPr>
@@ -34134,7 +34433,7 @@
           </p:sp>
           <p:sp>
             <p:nvSpPr>
-              <p:cNvPr id="616" name="Google Shape;616;p40"/>
+              <p:cNvPr id="633" name="Google Shape;633;p41"/>
               <p:cNvSpPr/>
               <p:nvPr/>
             </p:nvSpPr>
@@ -34200,7 +34499,7 @@
       </p:grpSp>
       <p:grpSp>
         <p:nvGrpSpPr>
-          <p:cNvPr id="617" name="Google Shape;617;p40"/>
+          <p:cNvPr id="634" name="Google Shape;634;p41"/>
           <p:cNvGrpSpPr/>
           <p:nvPr/>
         </p:nvGrpSpPr>
@@ -34214,7 +34513,7 @@
         </p:grpSpPr>
         <p:sp>
           <p:nvSpPr>
-            <p:cNvPr id="618" name="Google Shape;618;p40"/>
+            <p:cNvPr id="635" name="Google Shape;635;p41"/>
             <p:cNvSpPr/>
             <p:nvPr/>
           </p:nvSpPr>
@@ -34300,7 +34599,7 @@
         </p:sp>
         <p:sp>
           <p:nvSpPr>
-            <p:cNvPr id="619" name="Google Shape;619;p40"/>
+            <p:cNvPr id="636" name="Google Shape;636;p41"/>
             <p:cNvSpPr/>
             <p:nvPr/>
           </p:nvSpPr>
@@ -34521,12 +34820,12 @@
 </p:sld>
 </file>
 
-<file path=ppt/slides/slide16.xml><?xml version="1.0" encoding="utf-8"?>
+<file path=ppt/slides/slide17.xml><?xml version="1.0" encoding="utf-8"?>
 <p:sld xmlns:a="http://schemas.openxmlformats.org/drawingml/2006/main" xmlns:r="http://schemas.openxmlformats.org/officeDocument/2006/relationships" xmlns:mc="http://schemas.openxmlformats.org/markup-compatibility/2006" xmlns:mv="urn:schemas-microsoft-com:mac:vml" xmlns:p="http://schemas.openxmlformats.org/presentationml/2006/main" xmlns:c="http://schemas.openxmlformats.org/drawingml/2006/chart" xmlns:dgm="http://schemas.openxmlformats.org/drawingml/2006/diagram" xmlns:o="urn:schemas-microsoft-com:office:office" xmlns:v="urn:schemas-microsoft-com:vml" xmlns:pvml="urn:schemas-microsoft-com:office:powerpoint" xmlns:com="http://schemas.openxmlformats.org/drawingml/2006/compatibility" xmlns:p14="http://schemas.microsoft.com/office/powerpoint/2010/main" xmlns:p15="http://schemas.microsoft.com/office/powerpoint/2012/main" xmlns:ahyp="http://schemas.microsoft.com/office/drawing/2018/hyperlinkcolor">
   <p:cSld>
     <p:spTree>
       <p:nvGrpSpPr>
-        <p:cNvPr id="623" name="Shape 623"/>
+        <p:cNvPr id="640" name="Shape 640"/>
         <p:cNvGrpSpPr/>
         <p:nvPr/>
       </p:nvGrpSpPr>
@@ -34540,7 +34839,7 @@
       </p:grpSpPr>
       <p:grpSp>
         <p:nvGrpSpPr>
-          <p:cNvPr id="624" name="Google Shape;624;p41"/>
+          <p:cNvPr id="641" name="Google Shape;641;p42"/>
           <p:cNvGrpSpPr/>
           <p:nvPr/>
         </p:nvGrpSpPr>
@@ -34554,7 +34853,7 @@
         </p:grpSpPr>
         <p:sp>
           <p:nvSpPr>
-            <p:cNvPr id="625" name="Google Shape;625;p41"/>
+            <p:cNvPr id="642" name="Google Shape;642;p42"/>
             <p:cNvSpPr/>
             <p:nvPr/>
           </p:nvSpPr>
@@ -34661,7 +34960,7 @@
         </p:sp>
         <p:sp>
           <p:nvSpPr>
-            <p:cNvPr id="626" name="Google Shape;626;p41"/>
+            <p:cNvPr id="643" name="Google Shape;643;p42"/>
             <p:cNvSpPr/>
             <p:nvPr/>
           </p:nvSpPr>
@@ -35082,7 +35381,7 @@
         </p:sp>
         <p:sp>
           <p:nvSpPr>
-            <p:cNvPr id="627" name="Google Shape;627;p41"/>
+            <p:cNvPr id="644" name="Google Shape;644;p42"/>
             <p:cNvSpPr/>
             <p:nvPr/>
           </p:nvSpPr>
@@ -35156,7 +35455,7 @@
         </p:sp>
         <p:sp>
           <p:nvSpPr>
-            <p:cNvPr id="628" name="Google Shape;628;p41"/>
+            <p:cNvPr id="645" name="Google Shape;645;p42"/>
             <p:cNvSpPr/>
             <p:nvPr/>
           </p:nvSpPr>
@@ -35234,7 +35533,7 @@
         </p:sp>
         <p:sp>
           <p:nvSpPr>
-            <p:cNvPr id="629" name="Google Shape;629;p41"/>
+            <p:cNvPr id="646" name="Google Shape;646;p42"/>
             <p:cNvSpPr/>
             <p:nvPr/>
           </p:nvSpPr>
@@ -35320,7 +35619,7 @@
         </p:sp>
         <p:sp>
           <p:nvSpPr>
-            <p:cNvPr id="630" name="Google Shape;630;p41"/>
+            <p:cNvPr id="647" name="Google Shape;647;p42"/>
             <p:cNvSpPr/>
             <p:nvPr/>
           </p:nvSpPr>
@@ -35399,7 +35698,7 @@
         </p:sp>
         <p:sp>
           <p:nvSpPr>
-            <p:cNvPr id="631" name="Google Shape;631;p41"/>
+            <p:cNvPr id="648" name="Google Shape;648;p42"/>
             <p:cNvSpPr/>
             <p:nvPr/>
           </p:nvSpPr>
@@ -35635,7 +35934,7 @@
         </p:sp>
         <p:sp>
           <p:nvSpPr>
-            <p:cNvPr id="632" name="Google Shape;632;p41"/>
+            <p:cNvPr id="649" name="Google Shape;649;p42"/>
             <p:cNvSpPr/>
             <p:nvPr/>
           </p:nvSpPr>
@@ -35712,7 +36011,7 @@
         </p:sp>
         <p:sp>
           <p:nvSpPr>
-            <p:cNvPr id="633" name="Google Shape;633;p41"/>
+            <p:cNvPr id="650" name="Google Shape;650;p42"/>
             <p:cNvSpPr/>
             <p:nvPr/>
           </p:nvSpPr>
@@ -35784,7 +36083,7 @@
         </p:sp>
         <p:sp>
           <p:nvSpPr>
-            <p:cNvPr id="634" name="Google Shape;634;p41"/>
+            <p:cNvPr id="651" name="Google Shape;651;p42"/>
             <p:cNvSpPr/>
             <p:nvPr/>
           </p:nvSpPr>
@@ -35849,7 +36148,7 @@
         </p:sp>
         <p:sp>
           <p:nvSpPr>
-            <p:cNvPr id="635" name="Google Shape;635;p41"/>
+            <p:cNvPr id="652" name="Google Shape;652;p42"/>
             <p:cNvSpPr/>
             <p:nvPr/>
           </p:nvSpPr>
@@ -35921,7 +36220,7 @@
         </p:sp>
         <p:sp>
           <p:nvSpPr>
-            <p:cNvPr id="636" name="Google Shape;636;p41"/>
+            <p:cNvPr id="653" name="Google Shape;653;p42"/>
             <p:cNvSpPr/>
             <p:nvPr/>
           </p:nvSpPr>
@@ -36001,7 +36300,7 @@
       </p:grpSp>
       <p:sp>
         <p:nvSpPr>
-          <p:cNvPr id="637" name="Google Shape;637;p41"/>
+          <p:cNvPr id="654" name="Google Shape;654;p42"/>
           <p:cNvSpPr txBox="1"/>
           <p:nvPr>
             <p:ph type="title"/>
@@ -36045,7 +36344,7 @@
       </p:sp>
       <p:sp>
         <p:nvSpPr>
-          <p:cNvPr id="638" name="Google Shape;638;p41"/>
+          <p:cNvPr id="655" name="Google Shape;655;p42"/>
           <p:cNvSpPr txBox="1"/>
           <p:nvPr>
             <p:ph idx="1" type="subTitle"/>
@@ -36135,7 +36434,7 @@
       </p:sp>
       <p:sp>
         <p:nvSpPr>
-          <p:cNvPr id="639" name="Google Shape;639;p41"/>
+          <p:cNvPr id="656" name="Google Shape;656;p42"/>
           <p:cNvSpPr/>
           <p:nvPr/>
         </p:nvSpPr>
@@ -36187,7 +36486,7 @@
       </p:sp>
       <p:sp>
         <p:nvSpPr>
-          <p:cNvPr id="640" name="Google Shape;640;p41"/>
+          <p:cNvPr id="657" name="Google Shape;657;p42"/>
           <p:cNvSpPr/>
           <p:nvPr/>
         </p:nvSpPr>
@@ -36383,7 +36682,7 @@
       </p:sp>
       <p:sp>
         <p:nvSpPr>
-          <p:cNvPr id="641" name="Google Shape;641;p41"/>
+          <p:cNvPr id="658" name="Google Shape;658;p42"/>
           <p:cNvSpPr txBox="1"/>
           <p:nvPr>
             <p:ph type="title"/>
@@ -36431,7 +36730,7 @@
       </p:sp>
       <p:sp>
         <p:nvSpPr>
-          <p:cNvPr id="642" name="Google Shape;642;p41"/>
+          <p:cNvPr id="659" name="Google Shape;659;p42"/>
           <p:cNvSpPr txBox="1"/>
           <p:nvPr/>
         </p:nvSpPr>
@@ -36487,12 +36786,12 @@
 </p:sld>
 </file>
 
-<file path=ppt/slides/slide17.xml><?xml version="1.0" encoding="utf-8"?>
+<file path=ppt/slides/slide18.xml><?xml version="1.0" encoding="utf-8"?>
 <p:sld xmlns:a="http://schemas.openxmlformats.org/drawingml/2006/main" xmlns:r="http://schemas.openxmlformats.org/officeDocument/2006/relationships" xmlns:mc="http://schemas.openxmlformats.org/markup-compatibility/2006" xmlns:mv="urn:schemas-microsoft-com:mac:vml" xmlns:p="http://schemas.openxmlformats.org/presentationml/2006/main" xmlns:c="http://schemas.openxmlformats.org/drawingml/2006/chart" xmlns:dgm="http://schemas.openxmlformats.org/drawingml/2006/diagram" xmlns:o="urn:schemas-microsoft-com:office:office" xmlns:v="urn:schemas-microsoft-com:vml" xmlns:pvml="urn:schemas-microsoft-com:office:powerpoint" xmlns:com="http://schemas.openxmlformats.org/drawingml/2006/compatibility" xmlns:p14="http://schemas.microsoft.com/office/powerpoint/2010/main" xmlns:p15="http://schemas.microsoft.com/office/powerpoint/2012/main" xmlns:ahyp="http://schemas.microsoft.com/office/drawing/2018/hyperlinkcolor">
   <p:cSld>
     <p:spTree>
       <p:nvGrpSpPr>
-        <p:cNvPr id="646" name="Shape 646"/>
+        <p:cNvPr id="663" name="Shape 663"/>
         <p:cNvGrpSpPr/>
         <p:nvPr/>
       </p:nvGrpSpPr>
@@ -36506,7 +36805,7 @@
       </p:grpSpPr>
       <p:grpSp>
         <p:nvGrpSpPr>
-          <p:cNvPr id="647" name="Google Shape;647;p42"/>
+          <p:cNvPr id="664" name="Google Shape;664;p43"/>
           <p:cNvGrpSpPr/>
           <p:nvPr/>
         </p:nvGrpSpPr>
@@ -36520,7 +36819,7 @@
         </p:grpSpPr>
         <p:sp>
           <p:nvSpPr>
-            <p:cNvPr id="648" name="Google Shape;648;p42"/>
+            <p:cNvPr id="665" name="Google Shape;665;p43"/>
             <p:cNvSpPr/>
             <p:nvPr/>
           </p:nvSpPr>
@@ -36627,7 +36926,7 @@
         </p:sp>
         <p:sp>
           <p:nvSpPr>
-            <p:cNvPr id="649" name="Google Shape;649;p42"/>
+            <p:cNvPr id="666" name="Google Shape;666;p43"/>
             <p:cNvSpPr/>
             <p:nvPr/>
           </p:nvSpPr>
@@ -37048,7 +37347,7 @@
         </p:sp>
         <p:sp>
           <p:nvSpPr>
-            <p:cNvPr id="650" name="Google Shape;650;p42"/>
+            <p:cNvPr id="667" name="Google Shape;667;p43"/>
             <p:cNvSpPr/>
             <p:nvPr/>
           </p:nvSpPr>
@@ -37122,7 +37421,7 @@
         </p:sp>
         <p:sp>
           <p:nvSpPr>
-            <p:cNvPr id="651" name="Google Shape;651;p42"/>
+            <p:cNvPr id="668" name="Google Shape;668;p43"/>
             <p:cNvSpPr/>
             <p:nvPr/>
           </p:nvSpPr>
@@ -37200,7 +37499,7 @@
         </p:sp>
         <p:sp>
           <p:nvSpPr>
-            <p:cNvPr id="652" name="Google Shape;652;p42"/>
+            <p:cNvPr id="669" name="Google Shape;669;p43"/>
             <p:cNvSpPr/>
             <p:nvPr/>
           </p:nvSpPr>
@@ -37286,7 +37585,7 @@
         </p:sp>
         <p:sp>
           <p:nvSpPr>
-            <p:cNvPr id="653" name="Google Shape;653;p42"/>
+            <p:cNvPr id="670" name="Google Shape;670;p43"/>
             <p:cNvSpPr/>
             <p:nvPr/>
           </p:nvSpPr>
@@ -37365,7 +37664,7 @@
         </p:sp>
         <p:sp>
           <p:nvSpPr>
-            <p:cNvPr id="654" name="Google Shape;654;p42"/>
+            <p:cNvPr id="671" name="Google Shape;671;p43"/>
             <p:cNvSpPr/>
             <p:nvPr/>
           </p:nvSpPr>
@@ -37601,7 +37900,7 @@
         </p:sp>
         <p:sp>
           <p:nvSpPr>
-            <p:cNvPr id="655" name="Google Shape;655;p42"/>
+            <p:cNvPr id="672" name="Google Shape;672;p43"/>
             <p:cNvSpPr/>
             <p:nvPr/>
           </p:nvSpPr>
@@ -37678,7 +37977,7 @@
         </p:sp>
         <p:sp>
           <p:nvSpPr>
-            <p:cNvPr id="656" name="Google Shape;656;p42"/>
+            <p:cNvPr id="673" name="Google Shape;673;p43"/>
             <p:cNvSpPr/>
             <p:nvPr/>
           </p:nvSpPr>
@@ -37750,7 +38049,7 @@
         </p:sp>
         <p:sp>
           <p:nvSpPr>
-            <p:cNvPr id="657" name="Google Shape;657;p42"/>
+            <p:cNvPr id="674" name="Google Shape;674;p43"/>
             <p:cNvSpPr/>
             <p:nvPr/>
           </p:nvSpPr>
@@ -37815,7 +38114,7 @@
         </p:sp>
         <p:sp>
           <p:nvSpPr>
-            <p:cNvPr id="658" name="Google Shape;658;p42"/>
+            <p:cNvPr id="675" name="Google Shape;675;p43"/>
             <p:cNvSpPr/>
             <p:nvPr/>
           </p:nvSpPr>
@@ -37887,7 +38186,7 @@
         </p:sp>
         <p:sp>
           <p:nvSpPr>
-            <p:cNvPr id="659" name="Google Shape;659;p42"/>
+            <p:cNvPr id="676" name="Google Shape;676;p43"/>
             <p:cNvSpPr/>
             <p:nvPr/>
           </p:nvSpPr>
@@ -37967,7 +38266,7 @@
       </p:grpSp>
       <p:sp>
         <p:nvSpPr>
-          <p:cNvPr id="660" name="Google Shape;660;p42"/>
+          <p:cNvPr id="677" name="Google Shape;677;p43"/>
           <p:cNvSpPr txBox="1"/>
           <p:nvPr>
             <p:ph type="title"/>
@@ -38019,7 +38318,7 @@
       </p:sp>
       <p:sp>
         <p:nvSpPr>
-          <p:cNvPr id="661" name="Google Shape;661;p42"/>
+          <p:cNvPr id="678" name="Google Shape;678;p43"/>
           <p:cNvSpPr txBox="1"/>
           <p:nvPr>
             <p:ph idx="1" type="subTitle"/>
@@ -38104,7 +38403,7 @@
       </p:sp>
       <p:sp>
         <p:nvSpPr>
-          <p:cNvPr id="662" name="Google Shape;662;p42"/>
+          <p:cNvPr id="679" name="Google Shape;679;p43"/>
           <p:cNvSpPr/>
           <p:nvPr/>
         </p:nvSpPr>
@@ -38156,7 +38455,7 @@
       </p:sp>
       <p:sp>
         <p:nvSpPr>
-          <p:cNvPr id="663" name="Google Shape;663;p42"/>
+          <p:cNvPr id="680" name="Google Shape;680;p43"/>
           <p:cNvSpPr/>
           <p:nvPr/>
         </p:nvSpPr>
@@ -38352,7 +38651,7 @@
       </p:sp>
       <p:sp>
         <p:nvSpPr>
-          <p:cNvPr id="664" name="Google Shape;664;p42"/>
+          <p:cNvPr id="681" name="Google Shape;681;p43"/>
           <p:cNvSpPr txBox="1"/>
           <p:nvPr>
             <p:ph type="title"/>
@@ -38404,7 +38703,7 @@
       </p:sp>
       <p:sp>
         <p:nvSpPr>
-          <p:cNvPr id="665" name="Google Shape;665;p42"/>
+          <p:cNvPr id="682" name="Google Shape;682;p43"/>
           <p:cNvSpPr txBox="1"/>
           <p:nvPr/>
         </p:nvSpPr>
@@ -38464,12 +38763,12 @@
 </p:sld>
 </file>
 
-<file path=ppt/slides/slide18.xml><?xml version="1.0" encoding="utf-8"?>
+<file path=ppt/slides/slide19.xml><?xml version="1.0" encoding="utf-8"?>
 <p:sld xmlns:a="http://schemas.openxmlformats.org/drawingml/2006/main" xmlns:r="http://schemas.openxmlformats.org/officeDocument/2006/relationships" xmlns:mc="http://schemas.openxmlformats.org/markup-compatibility/2006" xmlns:mv="urn:schemas-microsoft-com:mac:vml" xmlns:p="http://schemas.openxmlformats.org/presentationml/2006/main" xmlns:c="http://schemas.openxmlformats.org/drawingml/2006/chart" xmlns:dgm="http://schemas.openxmlformats.org/drawingml/2006/diagram" xmlns:o="urn:schemas-microsoft-com:office:office" xmlns:v="urn:schemas-microsoft-com:vml" xmlns:pvml="urn:schemas-microsoft-com:office:powerpoint" xmlns:com="http://schemas.openxmlformats.org/drawingml/2006/compatibility" xmlns:p14="http://schemas.microsoft.com/office/powerpoint/2010/main" xmlns:p15="http://schemas.microsoft.com/office/powerpoint/2012/main" xmlns:ahyp="http://schemas.microsoft.com/office/drawing/2018/hyperlinkcolor">
   <p:cSld>
     <p:spTree>
       <p:nvGrpSpPr>
-        <p:cNvPr id="669" name="Shape 669"/>
+        <p:cNvPr id="686" name="Shape 686"/>
         <p:cNvGrpSpPr/>
         <p:nvPr/>
       </p:nvGrpSpPr>
@@ -38483,7 +38782,7 @@
       </p:grpSpPr>
       <p:sp>
         <p:nvSpPr>
-          <p:cNvPr id="670" name="Google Shape;670;p43"/>
+          <p:cNvPr id="687" name="Google Shape;687;p44"/>
           <p:cNvSpPr txBox="1"/>
           <p:nvPr>
             <p:ph idx="1" type="subTitle"/>
@@ -38633,7 +38932,7 @@
       </p:sp>
       <p:sp>
         <p:nvSpPr>
-          <p:cNvPr id="671" name="Google Shape;671;p43"/>
+          <p:cNvPr id="688" name="Google Shape;688;p44"/>
           <p:cNvSpPr txBox="1"/>
           <p:nvPr>
             <p:ph type="ctrTitle"/>
@@ -38673,7 +38972,7 @@
       </p:sp>
       <p:grpSp>
         <p:nvGrpSpPr>
-          <p:cNvPr id="672" name="Google Shape;672;p43"/>
+          <p:cNvPr id="689" name="Google Shape;689;p44"/>
           <p:cNvGrpSpPr/>
           <p:nvPr/>
         </p:nvGrpSpPr>
@@ -38687,7 +38986,7 @@
         </p:grpSpPr>
         <p:grpSp>
           <p:nvGrpSpPr>
-            <p:cNvPr id="673" name="Google Shape;673;p43"/>
+            <p:cNvPr id="690" name="Google Shape;690;p44"/>
             <p:cNvGrpSpPr/>
             <p:nvPr/>
           </p:nvGrpSpPr>
@@ -38701,7 +39000,7 @@
           </p:grpSpPr>
           <p:sp>
             <p:nvSpPr>
-              <p:cNvPr id="674" name="Google Shape;674;p43"/>
+              <p:cNvPr id="691" name="Google Shape;691;p44"/>
               <p:cNvSpPr/>
               <p:nvPr/>
             </p:nvSpPr>
@@ -38746,7 +39045,7 @@
           </p:sp>
           <p:grpSp>
             <p:nvGrpSpPr>
-              <p:cNvPr id="675" name="Google Shape;675;p43"/>
+              <p:cNvPr id="692" name="Google Shape;692;p44"/>
               <p:cNvGrpSpPr/>
               <p:nvPr/>
             </p:nvGrpSpPr>
@@ -38760,7 +39059,7 @@
             </p:grpSpPr>
             <p:sp>
               <p:nvSpPr>
-                <p:cNvPr id="676" name="Google Shape;676;p43"/>
+                <p:cNvPr id="693" name="Google Shape;693;p44"/>
                 <p:cNvSpPr/>
                 <p:nvPr/>
               </p:nvSpPr>
@@ -38811,7 +39110,7 @@
             </p:sp>
             <p:cxnSp>
               <p:nvCxnSpPr>
-                <p:cNvPr id="677" name="Google Shape;677;p43"/>
+                <p:cNvPr id="694" name="Google Shape;694;p44"/>
                 <p:cNvCxnSpPr/>
                 <p:nvPr/>
               </p:nvCxnSpPr>
@@ -38839,7 +39138,7 @@
         </p:grpSp>
         <p:grpSp>
           <p:nvGrpSpPr>
-            <p:cNvPr id="678" name="Google Shape;678;p43"/>
+            <p:cNvPr id="695" name="Google Shape;695;p44"/>
             <p:cNvGrpSpPr/>
             <p:nvPr/>
           </p:nvGrpSpPr>
@@ -38853,7 +39152,7 @@
           </p:grpSpPr>
           <p:sp>
             <p:nvSpPr>
-              <p:cNvPr id="679" name="Google Shape;679;p43"/>
+              <p:cNvPr id="696" name="Google Shape;696;p44"/>
               <p:cNvSpPr/>
               <p:nvPr/>
             </p:nvSpPr>
@@ -38930,7 +39229,7 @@
           </p:sp>
           <p:sp>
             <p:nvSpPr>
-              <p:cNvPr id="680" name="Google Shape;680;p43"/>
+              <p:cNvPr id="697" name="Google Shape;697;p44"/>
               <p:cNvSpPr/>
               <p:nvPr/>
             </p:nvSpPr>
@@ -39007,7 +39306,7 @@
           </p:sp>
           <p:sp>
             <p:nvSpPr>
-              <p:cNvPr id="681" name="Google Shape;681;p43"/>
+              <p:cNvPr id="698" name="Google Shape;698;p44"/>
               <p:cNvSpPr/>
               <p:nvPr/>
             </p:nvSpPr>
@@ -39084,7 +39383,7 @@
           </p:sp>
           <p:sp>
             <p:nvSpPr>
-              <p:cNvPr id="682" name="Google Shape;682;p43"/>
+              <p:cNvPr id="699" name="Google Shape;699;p44"/>
               <p:cNvSpPr/>
               <p:nvPr/>
             </p:nvSpPr>
@@ -39152,7 +39451,7 @@
       </p:grpSp>
       <p:grpSp>
         <p:nvGrpSpPr>
-          <p:cNvPr id="683" name="Google Shape;683;p43"/>
+          <p:cNvPr id="700" name="Google Shape;700;p44"/>
           <p:cNvGrpSpPr/>
           <p:nvPr/>
         </p:nvGrpSpPr>
@@ -39166,7 +39465,7 @@
         </p:grpSpPr>
         <p:grpSp>
           <p:nvGrpSpPr>
-            <p:cNvPr id="684" name="Google Shape;684;p43"/>
+            <p:cNvPr id="701" name="Google Shape;701;p44"/>
             <p:cNvGrpSpPr/>
             <p:nvPr/>
           </p:nvGrpSpPr>
@@ -39180,7 +39479,7 @@
           </p:grpSpPr>
           <p:sp>
             <p:nvSpPr>
-              <p:cNvPr id="685" name="Google Shape;685;p43"/>
+              <p:cNvPr id="702" name="Google Shape;702;p44"/>
               <p:cNvSpPr/>
               <p:nvPr/>
             </p:nvSpPr>
@@ -39225,7 +39524,7 @@
           </p:sp>
           <p:grpSp>
             <p:nvGrpSpPr>
-              <p:cNvPr id="686" name="Google Shape;686;p43"/>
+              <p:cNvPr id="703" name="Google Shape;703;p44"/>
               <p:cNvGrpSpPr/>
               <p:nvPr/>
             </p:nvGrpSpPr>
@@ -39239,7 +39538,7 @@
             </p:grpSpPr>
             <p:sp>
               <p:nvSpPr>
-                <p:cNvPr id="687" name="Google Shape;687;p43"/>
+                <p:cNvPr id="704" name="Google Shape;704;p44"/>
                 <p:cNvSpPr/>
                 <p:nvPr/>
               </p:nvSpPr>
@@ -39290,7 +39589,7 @@
             </p:sp>
             <p:cxnSp>
               <p:nvCxnSpPr>
-                <p:cNvPr id="688" name="Google Shape;688;p43"/>
+                <p:cNvPr id="705" name="Google Shape;705;p44"/>
                 <p:cNvCxnSpPr/>
                 <p:nvPr/>
               </p:nvCxnSpPr>
@@ -39318,7 +39617,7 @@
         </p:grpSp>
         <p:cxnSp>
           <p:nvCxnSpPr>
-            <p:cNvPr id="689" name="Google Shape;689;p43"/>
+            <p:cNvPr id="706" name="Google Shape;706;p44"/>
             <p:cNvCxnSpPr/>
             <p:nvPr/>
           </p:nvCxnSpPr>
@@ -39344,7 +39643,7 @@
         </p:cxnSp>
         <p:sp>
           <p:nvSpPr>
-            <p:cNvPr id="690" name="Google Shape;690;p43"/>
+            <p:cNvPr id="707" name="Google Shape;707;p44"/>
             <p:cNvSpPr/>
             <p:nvPr/>
           </p:nvSpPr>
@@ -39431,7 +39730,7 @@
         </p:sp>
         <p:sp>
           <p:nvSpPr>
-            <p:cNvPr id="691" name="Google Shape;691;p43"/>
+            <p:cNvPr id="708" name="Google Shape;708;p44"/>
             <p:cNvSpPr/>
             <p:nvPr/>
           </p:nvSpPr>
@@ -39535,7 +39834,7 @@
       </p:grpSp>
       <p:grpSp>
         <p:nvGrpSpPr>
-          <p:cNvPr id="692" name="Google Shape;692;p43"/>
+          <p:cNvPr id="709" name="Google Shape;709;p44"/>
           <p:cNvGrpSpPr/>
           <p:nvPr/>
         </p:nvGrpSpPr>
@@ -39549,7 +39848,7 @@
         </p:grpSpPr>
         <p:sp>
           <p:nvSpPr>
-            <p:cNvPr id="693" name="Google Shape;693;p43"/>
+            <p:cNvPr id="710" name="Google Shape;710;p44"/>
             <p:cNvSpPr/>
             <p:nvPr/>
           </p:nvSpPr>
@@ -39658,7 +39957,7 @@
         </p:sp>
         <p:sp>
           <p:nvSpPr>
-            <p:cNvPr id="694" name="Google Shape;694;p43"/>
+            <p:cNvPr id="711" name="Google Shape;711;p44"/>
             <p:cNvSpPr/>
             <p:nvPr/>
           </p:nvSpPr>
@@ -39965,7 +40264,7 @@
         </p:sp>
         <p:sp>
           <p:nvSpPr>
-            <p:cNvPr id="695" name="Google Shape;695;p43"/>
+            <p:cNvPr id="712" name="Google Shape;712;p44"/>
             <p:cNvSpPr/>
             <p:nvPr/>
           </p:nvSpPr>
@@ -40135,7 +40434,7 @@
         </p:sp>
         <p:sp>
           <p:nvSpPr>
-            <p:cNvPr id="696" name="Google Shape;696;p43"/>
+            <p:cNvPr id="713" name="Google Shape;713;p44"/>
             <p:cNvSpPr/>
             <p:nvPr/>
           </p:nvSpPr>
@@ -40197,7 +40496,7 @@
         </p:sp>
         <p:sp>
           <p:nvSpPr>
-            <p:cNvPr id="697" name="Google Shape;697;p43"/>
+            <p:cNvPr id="714" name="Google Shape;714;p44"/>
             <p:cNvSpPr/>
             <p:nvPr/>
           </p:nvSpPr>
@@ -40259,7 +40558,7 @@
         </p:sp>
         <p:sp>
           <p:nvSpPr>
-            <p:cNvPr id="698" name="Google Shape;698;p43"/>
+            <p:cNvPr id="715" name="Google Shape;715;p44"/>
             <p:cNvSpPr/>
             <p:nvPr/>
           </p:nvSpPr>
@@ -40321,7 +40620,7 @@
         </p:sp>
         <p:sp>
           <p:nvSpPr>
-            <p:cNvPr id="699" name="Google Shape;699;p43"/>
+            <p:cNvPr id="716" name="Google Shape;716;p44"/>
             <p:cNvSpPr/>
             <p:nvPr/>
           </p:nvSpPr>
@@ -40383,7 +40682,7 @@
         </p:sp>
         <p:sp>
           <p:nvSpPr>
-            <p:cNvPr id="700" name="Google Shape;700;p43"/>
+            <p:cNvPr id="717" name="Google Shape;717;p44"/>
             <p:cNvSpPr/>
             <p:nvPr/>
           </p:nvSpPr>
@@ -40445,7 +40744,7 @@
         </p:sp>
         <p:sp>
           <p:nvSpPr>
-            <p:cNvPr id="701" name="Google Shape;701;p43"/>
+            <p:cNvPr id="718" name="Google Shape;718;p44"/>
             <p:cNvSpPr/>
             <p:nvPr/>
           </p:nvSpPr>
@@ -40505,7 +40804,7 @@
         </p:sp>
         <p:sp>
           <p:nvSpPr>
-            <p:cNvPr id="702" name="Google Shape;702;p43"/>
+            <p:cNvPr id="719" name="Google Shape;719;p44"/>
             <p:cNvSpPr/>
             <p:nvPr/>
           </p:nvSpPr>
@@ -40613,7 +40912,7 @@
       </p:grpSp>
       <p:grpSp>
         <p:nvGrpSpPr>
-          <p:cNvPr id="703" name="Google Shape;703;p43"/>
+          <p:cNvPr id="720" name="Google Shape;720;p44"/>
           <p:cNvGrpSpPr/>
           <p:nvPr/>
         </p:nvGrpSpPr>
@@ -40627,7 +40926,7 @@
         </p:grpSpPr>
         <p:sp>
           <p:nvSpPr>
-            <p:cNvPr id="704" name="Google Shape;704;p43"/>
+            <p:cNvPr id="721" name="Google Shape;721;p44"/>
             <p:cNvSpPr/>
             <p:nvPr/>
           </p:nvSpPr>
@@ -40736,7 +41035,7 @@
         </p:sp>
         <p:sp>
           <p:nvSpPr>
-            <p:cNvPr id="705" name="Google Shape;705;p43"/>
+            <p:cNvPr id="722" name="Google Shape;722;p44"/>
             <p:cNvSpPr/>
             <p:nvPr/>
           </p:nvSpPr>
@@ -40819,7 +41118,7 @@
         </p:sp>
         <p:sp>
           <p:nvSpPr>
-            <p:cNvPr id="706" name="Google Shape;706;p43"/>
+            <p:cNvPr id="723" name="Google Shape;723;p44"/>
             <p:cNvSpPr/>
             <p:nvPr/>
           </p:nvSpPr>
@@ -40900,7 +41199,7 @@
         </p:sp>
         <p:sp>
           <p:nvSpPr>
-            <p:cNvPr id="707" name="Google Shape;707;p43"/>
+            <p:cNvPr id="724" name="Google Shape;724;p44"/>
             <p:cNvSpPr/>
             <p:nvPr/>
           </p:nvSpPr>
@@ -41139,7 +41438,7 @@
         </p:sp>
         <p:sp>
           <p:nvSpPr>
-            <p:cNvPr id="708" name="Google Shape;708;p43"/>
+            <p:cNvPr id="725" name="Google Shape;725;p44"/>
             <p:cNvSpPr/>
             <p:nvPr/>
           </p:nvSpPr>
@@ -41286,7 +41585,7 @@
         </p:sp>
         <p:sp>
           <p:nvSpPr>
-            <p:cNvPr id="709" name="Google Shape;709;p43"/>
+            <p:cNvPr id="726" name="Google Shape;726;p44"/>
             <p:cNvSpPr/>
             <p:nvPr/>
           </p:nvSpPr>
@@ -42161,9 +42460,763 @@
           <a:chExt cx="0" cy="0"/>
         </a:xfrm>
       </p:grpSpPr>
+      <p:sp>
+        <p:nvSpPr>
+          <p:cNvPr id="466" name="Google Shape;466;p29"/>
+          <p:cNvSpPr txBox="1"/>
+          <p:nvPr>
+            <p:ph type="title"/>
+          </p:nvPr>
+        </p:nvSpPr>
+        <p:spPr>
+          <a:xfrm>
+            <a:off x="1525550" y="1221400"/>
+            <a:ext cx="3396300" cy="355800"/>
+          </a:xfrm>
+          <a:prstGeom prst="rect">
+            <a:avLst/>
+          </a:prstGeom>
+        </p:spPr>
+        <p:txBody>
+          <a:bodyPr anchorCtr="0" anchor="t" bIns="91425" lIns="91425" spcFirstLastPara="1" rIns="91425" wrap="square" tIns="91425">
+            <a:noAutofit/>
+          </a:bodyPr>
+          <a:lstStyle/>
+          <a:p>
+            <a:pPr indent="0" lvl="0" marL="0" rtl="0" algn="ctr">
+              <a:spcBef>
+                <a:spcPts val="0"/>
+              </a:spcBef>
+              <a:spcAft>
+                <a:spcPts val="0"/>
+              </a:spcAft>
+              <a:buNone/>
+            </a:pPr>
+            <a:r>
+              <a:rPr lang="en" sz="3200"/>
+              <a:t>ABOUT ME  </a:t>
+            </a:r>
+            <a:r>
+              <a:rPr lang="en" sz="3200"/>
+              <a:t> </a:t>
+            </a:r>
+            <a:r>
+              <a:rPr lang="en" sz="3200"/>
+              <a:t>:)</a:t>
+            </a:r>
+            <a:endParaRPr sz="3200"/>
+          </a:p>
+        </p:txBody>
+      </p:sp>
+      <p:sp>
+        <p:nvSpPr>
+          <p:cNvPr id="467" name="Google Shape;467;p29"/>
+          <p:cNvSpPr txBox="1"/>
+          <p:nvPr>
+            <p:ph idx="1" type="subTitle"/>
+          </p:nvPr>
+        </p:nvSpPr>
+        <p:spPr>
+          <a:xfrm>
+            <a:off x="1861550" y="1971825"/>
+            <a:ext cx="3591300" cy="914400"/>
+          </a:xfrm>
+          <a:prstGeom prst="rect">
+            <a:avLst/>
+          </a:prstGeom>
+        </p:spPr>
+        <p:txBody>
+          <a:bodyPr anchorCtr="0" anchor="t" bIns="91425" lIns="91425" spcFirstLastPara="1" rIns="91425" wrap="square" tIns="91425">
+            <a:noAutofit/>
+          </a:bodyPr>
+          <a:lstStyle/>
+          <a:p>
+            <a:pPr indent="-298450" lvl="0" marL="457200" rtl="0" algn="l">
+              <a:spcBef>
+                <a:spcPts val="0"/>
+              </a:spcBef>
+              <a:spcAft>
+                <a:spcPts val="0"/>
+              </a:spcAft>
+              <a:buSzPts val="1100"/>
+              <a:buFont typeface="Karla"/>
+              <a:buChar char="●"/>
+            </a:pPr>
+            <a:r>
+              <a:rPr lang="en" sz="1100"/>
+              <a:t>D</a:t>
+            </a:r>
+            <a:r>
+              <a:rPr lang="en" sz="1100"/>
+              <a:t>ata scientist/analyst with an accounting </a:t>
+            </a:r>
+            <a:endParaRPr sz="1100"/>
+          </a:p>
+          <a:p>
+            <a:pPr indent="0" lvl="0" marL="457200" rtl="0" algn="l">
+              <a:spcBef>
+                <a:spcPts val="0"/>
+              </a:spcBef>
+              <a:spcAft>
+                <a:spcPts val="0"/>
+              </a:spcAft>
+              <a:buNone/>
+            </a:pPr>
+            <a:r>
+              <a:rPr lang="en" sz="1100"/>
+              <a:t>background</a:t>
+            </a:r>
+            <a:endParaRPr sz="1100"/>
+          </a:p>
+          <a:p>
+            <a:pPr indent="0" lvl="0" marL="457200" rtl="0" algn="l">
+              <a:spcBef>
+                <a:spcPts val="0"/>
+              </a:spcBef>
+              <a:spcAft>
+                <a:spcPts val="0"/>
+              </a:spcAft>
+              <a:buNone/>
+            </a:pPr>
+            <a:r>
+              <a:t/>
+            </a:r>
+            <a:endParaRPr sz="1100"/>
+          </a:p>
+          <a:p>
+            <a:pPr indent="-298450" lvl="0" marL="457200" rtl="0" algn="l">
+              <a:spcBef>
+                <a:spcPts val="0"/>
+              </a:spcBef>
+              <a:spcAft>
+                <a:spcPts val="0"/>
+              </a:spcAft>
+              <a:buSzPts val="1100"/>
+              <a:buFont typeface="Karla"/>
+              <a:buChar char="●"/>
+            </a:pPr>
+            <a:r>
+              <a:rPr lang="en" sz="1100"/>
+              <a:t>Statistical modeling</a:t>
+            </a:r>
+            <a:endParaRPr sz="1100"/>
+          </a:p>
+          <a:p>
+            <a:pPr indent="0" lvl="0" marL="457200" rtl="0" algn="l">
+              <a:spcBef>
+                <a:spcPts val="0"/>
+              </a:spcBef>
+              <a:spcAft>
+                <a:spcPts val="0"/>
+              </a:spcAft>
+              <a:buNone/>
+            </a:pPr>
+            <a:r>
+              <a:t/>
+            </a:r>
+            <a:endParaRPr sz="1100"/>
+          </a:p>
+          <a:p>
+            <a:pPr indent="-298450" lvl="0" marL="457200" rtl="0" algn="l">
+              <a:spcBef>
+                <a:spcPts val="0"/>
+              </a:spcBef>
+              <a:spcAft>
+                <a:spcPts val="0"/>
+              </a:spcAft>
+              <a:buSzPts val="1100"/>
+              <a:buFont typeface="Karla"/>
+              <a:buChar char="●"/>
+            </a:pPr>
+            <a:r>
+              <a:rPr lang="en" sz="1100"/>
+              <a:t>Tech Stack: SQL, Python: pandas, numpy, matplotlib, seaborn, sklearn, AWS</a:t>
+            </a:r>
+            <a:endParaRPr sz="1100"/>
+          </a:p>
+          <a:p>
+            <a:pPr indent="0" lvl="0" marL="457200" rtl="0" algn="l">
+              <a:spcBef>
+                <a:spcPts val="0"/>
+              </a:spcBef>
+              <a:spcAft>
+                <a:spcPts val="0"/>
+              </a:spcAft>
+              <a:buNone/>
+            </a:pPr>
+            <a:r>
+              <a:t/>
+            </a:r>
+            <a:endParaRPr sz="1100"/>
+          </a:p>
+          <a:p>
+            <a:pPr indent="-298450" lvl="0" marL="457200" rtl="0" algn="l">
+              <a:spcBef>
+                <a:spcPts val="0"/>
+              </a:spcBef>
+              <a:spcAft>
+                <a:spcPts val="0"/>
+              </a:spcAft>
+              <a:buSzPts val="1100"/>
+              <a:buFont typeface="Karla"/>
+              <a:buChar char="●"/>
+            </a:pPr>
+            <a:r>
+              <a:rPr lang="en" sz="1100"/>
+              <a:t>Financial analysis </a:t>
+            </a:r>
+            <a:endParaRPr sz="1100"/>
+          </a:p>
+        </p:txBody>
+      </p:sp>
       <p:grpSp>
         <p:nvGrpSpPr>
-          <p:cNvPr id="466" name="Google Shape;466;p29"/>
+          <p:cNvPr id="468" name="Google Shape;468;p29"/>
+          <p:cNvGrpSpPr/>
+          <p:nvPr/>
+        </p:nvGrpSpPr>
+        <p:grpSpPr>
+          <a:xfrm>
+            <a:off x="5618711" y="1422444"/>
+            <a:ext cx="1823501" cy="1051350"/>
+            <a:chOff x="7469486" y="1480344"/>
+            <a:chExt cx="1823501" cy="1051350"/>
+          </a:xfrm>
+        </p:grpSpPr>
+        <p:grpSp>
+          <p:nvGrpSpPr>
+            <p:cNvPr id="469" name="Google Shape;469;p29"/>
+            <p:cNvGrpSpPr/>
+            <p:nvPr/>
+          </p:nvGrpSpPr>
+          <p:grpSpPr>
+            <a:xfrm>
+              <a:off x="7469709" y="1480344"/>
+              <a:ext cx="1823279" cy="1051350"/>
+              <a:chOff x="278384" y="1278048"/>
+              <a:chExt cx="1823279" cy="1051350"/>
+            </a:xfrm>
+          </p:grpSpPr>
+          <p:sp>
+            <p:nvSpPr>
+              <p:cNvPr id="470" name="Google Shape;470;p29"/>
+              <p:cNvSpPr/>
+              <p:nvPr/>
+            </p:nvSpPr>
+            <p:spPr>
+              <a:xfrm>
+                <a:off x="364363" y="1369398"/>
+                <a:ext cx="1737300" cy="960000"/>
+              </a:xfrm>
+              <a:prstGeom prst="roundRect">
+                <a:avLst>
+                  <a:gd fmla="val 0" name="adj"/>
+                </a:avLst>
+              </a:prstGeom>
+              <a:solidFill>
+                <a:schemeClr val="dk1"/>
+              </a:solidFill>
+              <a:ln>
+                <a:noFill/>
+              </a:ln>
+            </p:spPr>
+            <p:txBody>
+              <a:bodyPr anchorCtr="0" anchor="ctr" bIns="91425" lIns="91425" spcFirstLastPara="1" rIns="91425" wrap="square" tIns="91425">
+                <a:noAutofit/>
+              </a:bodyPr>
+              <a:lstStyle/>
+              <a:p>
+                <a:pPr indent="0" lvl="0" marL="0" rtl="0" algn="l">
+                  <a:spcBef>
+                    <a:spcPts val="0"/>
+                  </a:spcBef>
+                  <a:spcAft>
+                    <a:spcPts val="0"/>
+                  </a:spcAft>
+                  <a:buNone/>
+                </a:pPr>
+                <a:r>
+                  <a:t/>
+                </a:r>
+                <a:endParaRPr/>
+              </a:p>
+            </p:txBody>
+          </p:sp>
+          <p:grpSp>
+            <p:nvGrpSpPr>
+              <p:cNvPr id="471" name="Google Shape;471;p29"/>
+              <p:cNvGrpSpPr/>
+              <p:nvPr/>
+            </p:nvGrpSpPr>
+            <p:grpSpPr>
+              <a:xfrm>
+                <a:off x="278384" y="1278048"/>
+                <a:ext cx="1737300" cy="960000"/>
+                <a:chOff x="7150671" y="2190661"/>
+                <a:chExt cx="1737300" cy="960000"/>
+              </a:xfrm>
+            </p:grpSpPr>
+            <p:sp>
+              <p:nvSpPr>
+                <p:cNvPr id="472" name="Google Shape;472;p29"/>
+                <p:cNvSpPr/>
+                <p:nvPr/>
+              </p:nvSpPr>
+              <p:spPr>
+                <a:xfrm>
+                  <a:off x="7150671" y="2190661"/>
+                  <a:ext cx="1737300" cy="960000"/>
+                </a:xfrm>
+                <a:prstGeom prst="roundRect">
+                  <a:avLst>
+                    <a:gd fmla="val 0" name="adj"/>
+                  </a:avLst>
+                </a:prstGeom>
+                <a:solidFill>
+                  <a:schemeClr val="lt1"/>
+                </a:solidFill>
+                <a:ln cap="flat" cmpd="sng" w="28575">
+                  <a:solidFill>
+                    <a:schemeClr val="dk1"/>
+                  </a:solidFill>
+                  <a:prstDash val="solid"/>
+                  <a:round/>
+                  <a:headEnd len="sm" w="sm" type="none"/>
+                  <a:tailEnd len="sm" w="sm" type="none"/>
+                </a:ln>
+              </p:spPr>
+              <p:txBody>
+                <a:bodyPr anchorCtr="0" anchor="ctr" bIns="91425" lIns="91425" spcFirstLastPara="1" rIns="91425" wrap="square" tIns="91425">
+                  <a:noAutofit/>
+                </a:bodyPr>
+                <a:lstStyle/>
+                <a:p>
+                  <a:pPr indent="0" lvl="0" marL="0" rtl="0" algn="l">
+                    <a:spcBef>
+                      <a:spcPts val="0"/>
+                    </a:spcBef>
+                    <a:spcAft>
+                      <a:spcPts val="0"/>
+                    </a:spcAft>
+                    <a:buNone/>
+                  </a:pPr>
+                  <a:r>
+                    <a:t/>
+                  </a:r>
+                  <a:endParaRPr/>
+                </a:p>
+              </p:txBody>
+            </p:sp>
+            <p:cxnSp>
+              <p:nvCxnSpPr>
+                <p:cNvPr id="473" name="Google Shape;473;p29"/>
+                <p:cNvCxnSpPr/>
+                <p:nvPr/>
+              </p:nvCxnSpPr>
+              <p:spPr>
+                <a:xfrm>
+                  <a:off x="7151600" y="2373361"/>
+                  <a:ext cx="1724700" cy="0"/>
+                </a:xfrm>
+                <a:prstGeom prst="straightConnector1">
+                  <a:avLst/>
+                </a:prstGeom>
+                <a:noFill/>
+                <a:ln cap="flat" cmpd="sng" w="28575">
+                  <a:solidFill>
+                    <a:schemeClr val="dk1"/>
+                  </a:solidFill>
+                  <a:prstDash val="solid"/>
+                  <a:round/>
+                  <a:headEnd len="med" w="med" type="none"/>
+                  <a:tailEnd len="med" w="med" type="none"/>
+                </a:ln>
+              </p:spPr>
+            </p:cxnSp>
+          </p:grpSp>
+        </p:grpSp>
+        <p:cxnSp>
+          <p:nvCxnSpPr>
+            <p:cNvPr id="474" name="Google Shape;474;p29"/>
+            <p:cNvCxnSpPr/>
+            <p:nvPr/>
+          </p:nvCxnSpPr>
+          <p:spPr>
+            <a:xfrm>
+              <a:off x="7469486" y="2052225"/>
+              <a:ext cx="1724100" cy="0"/>
+            </a:xfrm>
+            <a:prstGeom prst="straightConnector1">
+              <a:avLst/>
+            </a:prstGeom>
+            <a:noFill/>
+            <a:ln cap="flat" cmpd="sng" w="28575">
+              <a:solidFill>
+                <a:schemeClr val="dk1"/>
+              </a:solidFill>
+              <a:prstDash val="solid"/>
+              <a:round/>
+              <a:headEnd len="med" w="med" type="none"/>
+              <a:tailEnd len="med" w="med" type="none"/>
+            </a:ln>
+          </p:spPr>
+        </p:cxnSp>
+        <p:sp>
+          <p:nvSpPr>
+            <p:cNvPr id="475" name="Google Shape;475;p29"/>
+            <p:cNvSpPr/>
+            <p:nvPr/>
+          </p:nvSpPr>
+          <p:spPr>
+            <a:xfrm>
+              <a:off x="8031688" y="1782907"/>
+              <a:ext cx="599697" cy="538636"/>
+            </a:xfrm>
+            <a:custGeom>
+              <a:rect b="b" l="l" r="r" t="t"/>
+              <a:pathLst>
+                <a:path extrusionOk="0" h="9990" w="11123">
+                  <a:moveTo>
+                    <a:pt x="5566" y="0"/>
+                  </a:moveTo>
+                  <a:cubicBezTo>
+                    <a:pt x="4372" y="0"/>
+                    <a:pt x="3174" y="424"/>
+                    <a:pt x="2220" y="1288"/>
+                  </a:cubicBezTo>
+                  <a:cubicBezTo>
+                    <a:pt x="172" y="3117"/>
+                    <a:pt x="1" y="6287"/>
+                    <a:pt x="1855" y="8336"/>
+                  </a:cubicBezTo>
+                  <a:cubicBezTo>
+                    <a:pt x="2832" y="9431"/>
+                    <a:pt x="4192" y="9989"/>
+                    <a:pt x="5560" y="9989"/>
+                  </a:cubicBezTo>
+                  <a:cubicBezTo>
+                    <a:pt x="6752" y="9989"/>
+                    <a:pt x="7949" y="9565"/>
+                    <a:pt x="8903" y="8702"/>
+                  </a:cubicBezTo>
+                  <a:cubicBezTo>
+                    <a:pt x="10952" y="6873"/>
+                    <a:pt x="11123" y="3702"/>
+                    <a:pt x="9293" y="1653"/>
+                  </a:cubicBezTo>
+                  <a:cubicBezTo>
+                    <a:pt x="8303" y="559"/>
+                    <a:pt x="6936" y="0"/>
+                    <a:pt x="5566" y="0"/>
+                  </a:cubicBezTo>
+                  <a:close/>
+                </a:path>
+              </a:pathLst>
+            </a:custGeom>
+            <a:solidFill>
+              <a:schemeClr val="accent3"/>
+            </a:solidFill>
+            <a:ln cap="flat" cmpd="sng" w="28575">
+              <a:solidFill>
+                <a:schemeClr val="dk1"/>
+              </a:solidFill>
+              <a:prstDash val="solid"/>
+              <a:round/>
+              <a:headEnd len="sm" w="sm" type="none"/>
+              <a:tailEnd len="sm" w="sm" type="none"/>
+            </a:ln>
+          </p:spPr>
+          <p:txBody>
+            <a:bodyPr anchorCtr="0" anchor="ctr" bIns="91425" lIns="91425" spcFirstLastPara="1" rIns="91425" wrap="square" tIns="91425">
+              <a:noAutofit/>
+            </a:bodyPr>
+            <a:lstStyle/>
+            <a:p>
+              <a:pPr indent="0" lvl="0" marL="0" rtl="0" algn="l">
+                <a:spcBef>
+                  <a:spcPts val="0"/>
+                </a:spcBef>
+                <a:spcAft>
+                  <a:spcPts val="0"/>
+                </a:spcAft>
+                <a:buNone/>
+              </a:pPr>
+              <a:r>
+                <a:t/>
+              </a:r>
+              <a:endParaRPr/>
+            </a:p>
+          </p:txBody>
+        </p:sp>
+        <p:sp>
+          <p:nvSpPr>
+            <p:cNvPr id="476" name="Google Shape;476;p29"/>
+            <p:cNvSpPr/>
+            <p:nvPr/>
+          </p:nvSpPr>
+          <p:spPr>
+            <a:xfrm>
+              <a:off x="8111159" y="1873044"/>
+              <a:ext cx="448465" cy="440236"/>
+            </a:xfrm>
+            <a:custGeom>
+              <a:rect b="b" l="l" r="r" t="t"/>
+              <a:pathLst>
+                <a:path extrusionOk="0" h="8165" w="8318">
+                  <a:moveTo>
+                    <a:pt x="4147" y="0"/>
+                  </a:moveTo>
+                  <a:cubicBezTo>
+                    <a:pt x="1171" y="0"/>
+                    <a:pt x="1366" y="3829"/>
+                    <a:pt x="1366" y="3829"/>
+                  </a:cubicBezTo>
+                  <a:lnTo>
+                    <a:pt x="2513" y="3829"/>
+                  </a:lnTo>
+                  <a:cubicBezTo>
+                    <a:pt x="2659" y="4098"/>
+                    <a:pt x="2854" y="4366"/>
+                    <a:pt x="3074" y="4561"/>
+                  </a:cubicBezTo>
+                  <a:cubicBezTo>
+                    <a:pt x="1952" y="4707"/>
+                    <a:pt x="879" y="5195"/>
+                    <a:pt x="1" y="5951"/>
+                  </a:cubicBezTo>
+                  <a:cubicBezTo>
+                    <a:pt x="1000" y="7427"/>
+                    <a:pt x="2580" y="8165"/>
+                    <a:pt x="4159" y="8165"/>
+                  </a:cubicBezTo>
+                  <a:cubicBezTo>
+                    <a:pt x="5738" y="8165"/>
+                    <a:pt x="7317" y="7427"/>
+                    <a:pt x="8317" y="5951"/>
+                  </a:cubicBezTo>
+                  <a:cubicBezTo>
+                    <a:pt x="7439" y="5195"/>
+                    <a:pt x="6366" y="4707"/>
+                    <a:pt x="5220" y="4561"/>
+                  </a:cubicBezTo>
+                  <a:cubicBezTo>
+                    <a:pt x="5464" y="4366"/>
+                    <a:pt x="5659" y="4098"/>
+                    <a:pt x="5805" y="3829"/>
+                  </a:cubicBezTo>
+                  <a:lnTo>
+                    <a:pt x="6952" y="3829"/>
+                  </a:lnTo>
+                  <a:cubicBezTo>
+                    <a:pt x="6952" y="3829"/>
+                    <a:pt x="7122" y="0"/>
+                    <a:pt x="4147" y="0"/>
+                  </a:cubicBezTo>
+                  <a:close/>
+                </a:path>
+              </a:pathLst>
+            </a:custGeom>
+            <a:solidFill>
+              <a:schemeClr val="accent2"/>
+            </a:solidFill>
+            <a:ln cap="flat" cmpd="sng" w="28575">
+              <a:solidFill>
+                <a:schemeClr val="dk1"/>
+              </a:solidFill>
+              <a:prstDash val="solid"/>
+              <a:round/>
+              <a:headEnd len="sm" w="sm" type="none"/>
+              <a:tailEnd len="sm" w="sm" type="none"/>
+            </a:ln>
+          </p:spPr>
+          <p:txBody>
+            <a:bodyPr anchorCtr="0" anchor="ctr" bIns="91425" lIns="91425" spcFirstLastPara="1" rIns="91425" wrap="square" tIns="91425">
+              <a:noAutofit/>
+            </a:bodyPr>
+            <a:lstStyle/>
+            <a:p>
+              <a:pPr indent="0" lvl="0" marL="0" rtl="0" algn="l">
+                <a:spcBef>
+                  <a:spcPts val="0"/>
+                </a:spcBef>
+                <a:spcAft>
+                  <a:spcPts val="0"/>
+                </a:spcAft>
+                <a:buNone/>
+              </a:pPr>
+              <a:r>
+                <a:t/>
+              </a:r>
+              <a:endParaRPr/>
+            </a:p>
+          </p:txBody>
+        </p:sp>
+      </p:grpSp>
+      <p:sp>
+        <p:nvSpPr>
+          <p:cNvPr id="477" name="Google Shape;477;p29"/>
+          <p:cNvSpPr txBox="1"/>
+          <p:nvPr/>
+        </p:nvSpPr>
+        <p:spPr>
+          <a:xfrm>
+            <a:off x="5689800" y="2473800"/>
+            <a:ext cx="1633800" cy="492600"/>
+          </a:xfrm>
+          <a:prstGeom prst="rect">
+            <a:avLst/>
+          </a:prstGeom>
+          <a:noFill/>
+          <a:ln>
+            <a:noFill/>
+          </a:ln>
+        </p:spPr>
+        <p:txBody>
+          <a:bodyPr anchorCtr="0" anchor="t" bIns="91425" lIns="91425" spcFirstLastPara="1" rIns="91425" wrap="square" tIns="91425">
+            <a:spAutoFit/>
+          </a:bodyPr>
+          <a:lstStyle/>
+          <a:p>
+            <a:pPr indent="0" lvl="0" marL="0" rtl="0" algn="ctr">
+              <a:lnSpc>
+                <a:spcPct val="150000"/>
+              </a:lnSpc>
+              <a:spcBef>
+                <a:spcPts val="0"/>
+              </a:spcBef>
+              <a:spcAft>
+                <a:spcPts val="0"/>
+              </a:spcAft>
+              <a:buNone/>
+            </a:pPr>
+            <a:r>
+              <a:rPr lang="en" sz="800">
+                <a:solidFill>
+                  <a:schemeClr val="dk1"/>
+                </a:solidFill>
+                <a:latin typeface="Karla"/>
+                <a:ea typeface="Karla"/>
+                <a:cs typeface="Karla"/>
+                <a:sym typeface="Karla"/>
+              </a:rPr>
+              <a:t>dhesijagvir@gmail.com</a:t>
+            </a:r>
+            <a:endParaRPr sz="900"/>
+          </a:p>
+          <a:p>
+            <a:pPr indent="0" lvl="0" marL="0" rtl="0" algn="ctr">
+              <a:lnSpc>
+                <a:spcPct val="150000"/>
+              </a:lnSpc>
+              <a:spcBef>
+                <a:spcPts val="0"/>
+              </a:spcBef>
+              <a:spcAft>
+                <a:spcPts val="0"/>
+              </a:spcAft>
+              <a:buNone/>
+            </a:pPr>
+            <a:r>
+              <a:rPr lang="en" sz="800" u="sng">
+                <a:solidFill>
+                  <a:schemeClr val="dk1"/>
+                </a:solidFill>
+                <a:latin typeface="Karla"/>
+                <a:ea typeface="Karla"/>
+                <a:cs typeface="Karla"/>
+                <a:sym typeface="Karla"/>
+                <a:hlinkClick r:id="rId3">
+                  <a:extLst>
+                    <a:ext uri="{A12FA001-AC4F-418D-AE19-62706E023703}">
+                      <ahyp:hlinkClr val="tx"/>
+                    </a:ext>
+                  </a:extLst>
+                </a:hlinkClick>
+              </a:rPr>
+              <a:t>linkedin.com/in/jagvirdhesi/</a:t>
+            </a:r>
+            <a:endParaRPr sz="900"/>
+          </a:p>
+        </p:txBody>
+      </p:sp>
+      <p:sp>
+        <p:nvSpPr>
+          <p:cNvPr id="478" name="Google Shape;478;p29"/>
+          <p:cNvSpPr txBox="1"/>
+          <p:nvPr/>
+        </p:nvSpPr>
+        <p:spPr>
+          <a:xfrm>
+            <a:off x="6024000" y="1355450"/>
+            <a:ext cx="965400" cy="307800"/>
+          </a:xfrm>
+          <a:prstGeom prst="rect">
+            <a:avLst/>
+          </a:prstGeom>
+          <a:noFill/>
+          <a:ln>
+            <a:noFill/>
+          </a:ln>
+        </p:spPr>
+        <p:txBody>
+          <a:bodyPr anchorCtr="0" anchor="t" bIns="91425" lIns="91425" spcFirstLastPara="1" rIns="91425" wrap="square" tIns="91425">
+            <a:spAutoFit/>
+          </a:bodyPr>
+          <a:lstStyle/>
+          <a:p>
+            <a:pPr indent="0" lvl="0" marL="0" rtl="0" algn="l">
+              <a:spcBef>
+                <a:spcPts val="0"/>
+              </a:spcBef>
+              <a:spcAft>
+                <a:spcPts val="0"/>
+              </a:spcAft>
+              <a:buNone/>
+            </a:pPr>
+            <a:r>
+              <a:rPr lang="en" sz="800">
+                <a:solidFill>
+                  <a:schemeClr val="dk1"/>
+                </a:solidFill>
+                <a:latin typeface="Rubik Black"/>
+                <a:ea typeface="Rubik Black"/>
+                <a:cs typeface="Rubik Black"/>
+                <a:sym typeface="Rubik Black"/>
+              </a:rPr>
+              <a:t>JAGVIR DHESI</a:t>
+            </a:r>
+            <a:endParaRPr sz="700"/>
+          </a:p>
+        </p:txBody>
+      </p:sp>
+    </p:spTree>
+  </p:cSld>
+  <p:clrMapOvr>
+    <a:masterClrMapping/>
+  </p:clrMapOvr>
+</p:sld>
+</file>
+
+<file path=ppt/slides/slide5.xml><?xml version="1.0" encoding="utf-8"?>
+<p:sld xmlns:a="http://schemas.openxmlformats.org/drawingml/2006/main" xmlns:r="http://schemas.openxmlformats.org/officeDocument/2006/relationships" xmlns:mc="http://schemas.openxmlformats.org/markup-compatibility/2006" xmlns:mv="urn:schemas-microsoft-com:mac:vml" xmlns:p="http://schemas.openxmlformats.org/presentationml/2006/main" xmlns:c="http://schemas.openxmlformats.org/drawingml/2006/chart" xmlns:dgm="http://schemas.openxmlformats.org/drawingml/2006/diagram" xmlns:o="urn:schemas-microsoft-com:office:office" xmlns:v="urn:schemas-microsoft-com:vml" xmlns:pvml="urn:schemas-microsoft-com:office:powerpoint" xmlns:com="http://schemas.openxmlformats.org/drawingml/2006/compatibility" xmlns:p14="http://schemas.microsoft.com/office/powerpoint/2010/main" xmlns:p15="http://schemas.microsoft.com/office/powerpoint/2012/main" xmlns:ahyp="http://schemas.microsoft.com/office/drawing/2018/hyperlinkcolor">
+  <p:cSld>
+    <p:spTree>
+      <p:nvGrpSpPr>
+        <p:cNvPr id="482" name="Shape 482"/>
+        <p:cNvGrpSpPr/>
+        <p:nvPr/>
+      </p:nvGrpSpPr>
+      <p:grpSpPr>
+        <a:xfrm>
+          <a:off x="0" y="0"/>
+          <a:ext cx="0" cy="0"/>
+          <a:chOff x="0" y="0"/>
+          <a:chExt cx="0" cy="0"/>
+        </a:xfrm>
+      </p:grpSpPr>
+      <p:grpSp>
+        <p:nvGrpSpPr>
+          <p:cNvPr id="483" name="Google Shape;483;p30"/>
           <p:cNvGrpSpPr/>
           <p:nvPr/>
         </p:nvGrpSpPr>
@@ -42177,7 +43230,7 @@
         </p:grpSpPr>
         <p:sp>
           <p:nvSpPr>
-            <p:cNvPr id="467" name="Google Shape;467;p29"/>
+            <p:cNvPr id="484" name="Google Shape;484;p30"/>
             <p:cNvSpPr/>
             <p:nvPr/>
           </p:nvSpPr>
@@ -42222,7 +43275,7 @@
         </p:sp>
         <p:grpSp>
           <p:nvGrpSpPr>
-            <p:cNvPr id="468" name="Google Shape;468;p29"/>
+            <p:cNvPr id="485" name="Google Shape;485;p30"/>
             <p:cNvGrpSpPr/>
             <p:nvPr/>
           </p:nvGrpSpPr>
@@ -42236,7 +43289,7 @@
           </p:grpSpPr>
           <p:sp>
             <p:nvSpPr>
-              <p:cNvPr id="469" name="Google Shape;469;p29"/>
+              <p:cNvPr id="486" name="Google Shape;486;p30"/>
               <p:cNvSpPr/>
               <p:nvPr/>
             </p:nvSpPr>
@@ -42287,7 +43340,7 @@
           </p:sp>
           <p:cxnSp>
             <p:nvCxnSpPr>
-              <p:cNvPr id="470" name="Google Shape;470;p29"/>
+              <p:cNvPr id="487" name="Google Shape;487;p30"/>
               <p:cNvCxnSpPr/>
               <p:nvPr/>
             </p:nvCxnSpPr>
@@ -42315,7 +43368,7 @@
       </p:grpSp>
       <p:pic>
         <p:nvPicPr>
-          <p:cNvPr id="471" name="Google Shape;471;p29"/>
+          <p:cNvPr id="488" name="Google Shape;488;p30"/>
           <p:cNvPicPr preferRelativeResize="0"/>
           <p:nvPr/>
         </p:nvPicPr>
@@ -42342,7 +43395,7 @@
       </p:pic>
       <p:sp>
         <p:nvSpPr>
-          <p:cNvPr id="472" name="Google Shape;472;p29"/>
+          <p:cNvPr id="489" name="Google Shape;489;p30"/>
           <p:cNvSpPr txBox="1"/>
           <p:nvPr/>
         </p:nvSpPr>
@@ -42518,7 +43571,7 @@
       </p:sp>
       <p:pic>
         <p:nvPicPr>
-          <p:cNvPr id="473" name="Google Shape;473;p29"/>
+          <p:cNvPr id="490" name="Google Shape;490;p30"/>
           <p:cNvPicPr preferRelativeResize="0"/>
           <p:nvPr/>
         </p:nvPicPr>
@@ -42552,12 +43605,12 @@
 </p:sld>
 </file>
 
-<file path=ppt/slides/slide5.xml><?xml version="1.0" encoding="utf-8"?>
+<file path=ppt/slides/slide6.xml><?xml version="1.0" encoding="utf-8"?>
 <p:sld xmlns:a="http://schemas.openxmlformats.org/drawingml/2006/main" xmlns:r="http://schemas.openxmlformats.org/officeDocument/2006/relationships" xmlns:mc="http://schemas.openxmlformats.org/markup-compatibility/2006" xmlns:mv="urn:schemas-microsoft-com:mac:vml" xmlns:p="http://schemas.openxmlformats.org/presentationml/2006/main" xmlns:c="http://schemas.openxmlformats.org/drawingml/2006/chart" xmlns:dgm="http://schemas.openxmlformats.org/drawingml/2006/diagram" xmlns:o="urn:schemas-microsoft-com:office:office" xmlns:v="urn:schemas-microsoft-com:vml" xmlns:pvml="urn:schemas-microsoft-com:office:powerpoint" xmlns:com="http://schemas.openxmlformats.org/drawingml/2006/compatibility" xmlns:p14="http://schemas.microsoft.com/office/powerpoint/2010/main" xmlns:p15="http://schemas.microsoft.com/office/powerpoint/2012/main" xmlns:ahyp="http://schemas.microsoft.com/office/drawing/2018/hyperlinkcolor">
   <p:cSld>
     <p:spTree>
       <p:nvGrpSpPr>
-        <p:cNvPr id="477" name="Shape 477"/>
+        <p:cNvPr id="494" name="Shape 494"/>
         <p:cNvGrpSpPr/>
         <p:nvPr/>
       </p:nvGrpSpPr>
@@ -42571,7 +43624,7 @@
       </p:grpSpPr>
       <p:sp>
         <p:nvSpPr>
-          <p:cNvPr id="478" name="Google Shape;478;p30"/>
+          <p:cNvPr id="495" name="Google Shape;495;p31"/>
           <p:cNvSpPr/>
           <p:nvPr/>
         </p:nvSpPr>
@@ -42713,7 +43766,7 @@
       </p:sp>
       <p:sp>
         <p:nvSpPr>
-          <p:cNvPr id="479" name="Google Shape;479;p30"/>
+          <p:cNvPr id="496" name="Google Shape;496;p31"/>
           <p:cNvSpPr/>
           <p:nvPr/>
         </p:nvSpPr>
@@ -42966,7 +44019,7 @@
       </p:sp>
       <p:sp>
         <p:nvSpPr>
-          <p:cNvPr id="480" name="Google Shape;480;p30"/>
+          <p:cNvPr id="497" name="Google Shape;497;p31"/>
           <p:cNvSpPr/>
           <p:nvPr/>
         </p:nvSpPr>
@@ -43162,7 +44215,7 @@
       </p:sp>
       <p:sp>
         <p:nvSpPr>
-          <p:cNvPr id="481" name="Google Shape;481;p30"/>
+          <p:cNvPr id="498" name="Google Shape;498;p31"/>
           <p:cNvSpPr txBox="1"/>
           <p:nvPr>
             <p:ph idx="4294967295" type="ctrTitle"/>
@@ -43212,12 +44265,12 @@
 </p:sld>
 </file>
 
-<file path=ppt/slides/slide6.xml><?xml version="1.0" encoding="utf-8"?>
+<file path=ppt/slides/slide7.xml><?xml version="1.0" encoding="utf-8"?>
 <p:sld xmlns:a="http://schemas.openxmlformats.org/drawingml/2006/main" xmlns:r="http://schemas.openxmlformats.org/officeDocument/2006/relationships" xmlns:mc="http://schemas.openxmlformats.org/markup-compatibility/2006" xmlns:mv="urn:schemas-microsoft-com:mac:vml" xmlns:p="http://schemas.openxmlformats.org/presentationml/2006/main" xmlns:c="http://schemas.openxmlformats.org/drawingml/2006/chart" xmlns:dgm="http://schemas.openxmlformats.org/drawingml/2006/diagram" xmlns:o="urn:schemas-microsoft-com:office:office" xmlns:v="urn:schemas-microsoft-com:vml" xmlns:pvml="urn:schemas-microsoft-com:office:powerpoint" xmlns:com="http://schemas.openxmlformats.org/drawingml/2006/compatibility" xmlns:p14="http://schemas.microsoft.com/office/powerpoint/2010/main" xmlns:p15="http://schemas.microsoft.com/office/powerpoint/2012/main" xmlns:ahyp="http://schemas.microsoft.com/office/drawing/2018/hyperlinkcolor">
   <p:cSld>
     <p:spTree>
       <p:nvGrpSpPr>
-        <p:cNvPr id="485" name="Shape 485"/>
+        <p:cNvPr id="502" name="Shape 502"/>
         <p:cNvGrpSpPr/>
         <p:nvPr/>
       </p:nvGrpSpPr>
@@ -43231,7 +44284,7 @@
       </p:grpSpPr>
       <p:grpSp>
         <p:nvGrpSpPr>
-          <p:cNvPr id="486" name="Google Shape;486;p31"/>
+          <p:cNvPr id="503" name="Google Shape;503;p32"/>
           <p:cNvGrpSpPr/>
           <p:nvPr/>
         </p:nvGrpSpPr>
@@ -43245,7 +44298,7 @@
         </p:grpSpPr>
         <p:sp>
           <p:nvSpPr>
-            <p:cNvPr id="487" name="Google Shape;487;p31"/>
+            <p:cNvPr id="504" name="Google Shape;504;p32"/>
             <p:cNvSpPr/>
             <p:nvPr/>
           </p:nvSpPr>
@@ -43290,7 +44343,7 @@
         </p:sp>
         <p:grpSp>
           <p:nvGrpSpPr>
-            <p:cNvPr id="488" name="Google Shape;488;p31"/>
+            <p:cNvPr id="505" name="Google Shape;505;p32"/>
             <p:cNvGrpSpPr/>
             <p:nvPr/>
           </p:nvGrpSpPr>
@@ -43304,7 +44357,7 @@
           </p:grpSpPr>
           <p:sp>
             <p:nvSpPr>
-              <p:cNvPr id="489" name="Google Shape;489;p31"/>
+              <p:cNvPr id="506" name="Google Shape;506;p32"/>
               <p:cNvSpPr/>
               <p:nvPr/>
             </p:nvSpPr>
@@ -43355,7 +44408,7 @@
           </p:sp>
           <p:cxnSp>
             <p:nvCxnSpPr>
-              <p:cNvPr id="490" name="Google Shape;490;p31"/>
+              <p:cNvPr id="507" name="Google Shape;507;p32"/>
               <p:cNvCxnSpPr/>
               <p:nvPr/>
             </p:nvCxnSpPr>
@@ -43383,7 +44436,7 @@
       </p:grpSp>
       <p:grpSp>
         <p:nvGrpSpPr>
-          <p:cNvPr id="491" name="Google Shape;491;p31"/>
+          <p:cNvPr id="508" name="Google Shape;508;p32"/>
           <p:cNvGrpSpPr/>
           <p:nvPr/>
         </p:nvGrpSpPr>
@@ -43397,7 +44450,7 @@
         </p:grpSpPr>
         <p:sp>
           <p:nvSpPr>
-            <p:cNvPr id="492" name="Google Shape;492;p31"/>
+            <p:cNvPr id="509" name="Google Shape;509;p32"/>
             <p:cNvSpPr/>
             <p:nvPr/>
           </p:nvSpPr>
@@ -43442,7 +44495,7 @@
         </p:sp>
         <p:grpSp>
           <p:nvGrpSpPr>
-            <p:cNvPr id="493" name="Google Shape;493;p31"/>
+            <p:cNvPr id="510" name="Google Shape;510;p32"/>
             <p:cNvGrpSpPr/>
             <p:nvPr/>
           </p:nvGrpSpPr>
@@ -43456,7 +44509,7 @@
           </p:grpSpPr>
           <p:sp>
             <p:nvSpPr>
-              <p:cNvPr id="494" name="Google Shape;494;p31"/>
+              <p:cNvPr id="511" name="Google Shape;511;p32"/>
               <p:cNvSpPr/>
               <p:nvPr/>
             </p:nvSpPr>
@@ -43507,7 +44560,7 @@
           </p:sp>
           <p:cxnSp>
             <p:nvCxnSpPr>
-              <p:cNvPr id="495" name="Google Shape;495;p31"/>
+              <p:cNvPr id="512" name="Google Shape;512;p32"/>
               <p:cNvCxnSpPr/>
               <p:nvPr/>
             </p:nvCxnSpPr>
@@ -43535,7 +44588,7 @@
       </p:grpSp>
       <p:grpSp>
         <p:nvGrpSpPr>
-          <p:cNvPr id="496" name="Google Shape;496;p31"/>
+          <p:cNvPr id="513" name="Google Shape;513;p32"/>
           <p:cNvGrpSpPr/>
           <p:nvPr/>
         </p:nvGrpSpPr>
@@ -43549,7 +44602,7 @@
         </p:grpSpPr>
         <p:sp>
           <p:nvSpPr>
-            <p:cNvPr id="497" name="Google Shape;497;p31"/>
+            <p:cNvPr id="514" name="Google Shape;514;p32"/>
             <p:cNvSpPr/>
             <p:nvPr/>
           </p:nvSpPr>
@@ -43594,7 +44647,7 @@
         </p:sp>
         <p:grpSp>
           <p:nvGrpSpPr>
-            <p:cNvPr id="498" name="Google Shape;498;p31"/>
+            <p:cNvPr id="515" name="Google Shape;515;p32"/>
             <p:cNvGrpSpPr/>
             <p:nvPr/>
           </p:nvGrpSpPr>
@@ -43608,7 +44661,7 @@
           </p:grpSpPr>
           <p:sp>
             <p:nvSpPr>
-              <p:cNvPr id="499" name="Google Shape;499;p31"/>
+              <p:cNvPr id="516" name="Google Shape;516;p32"/>
               <p:cNvSpPr/>
               <p:nvPr/>
             </p:nvSpPr>
@@ -43659,7 +44712,7 @@
           </p:sp>
           <p:cxnSp>
             <p:nvCxnSpPr>
-              <p:cNvPr id="500" name="Google Shape;500;p31"/>
+              <p:cNvPr id="517" name="Google Shape;517;p32"/>
               <p:cNvCxnSpPr/>
               <p:nvPr/>
             </p:nvCxnSpPr>
@@ -43687,7 +44740,7 @@
       </p:grpSp>
       <p:sp>
         <p:nvSpPr>
-          <p:cNvPr id="501" name="Google Shape;501;p31"/>
+          <p:cNvPr id="518" name="Google Shape;518;p32"/>
           <p:cNvSpPr txBox="1"/>
           <p:nvPr>
             <p:ph idx="1" type="subTitle"/>
@@ -43727,7 +44780,7 @@
       </p:sp>
       <p:sp>
         <p:nvSpPr>
-          <p:cNvPr id="502" name="Google Shape;502;p31"/>
+          <p:cNvPr id="519" name="Google Shape;519;p32"/>
           <p:cNvSpPr txBox="1"/>
           <p:nvPr>
             <p:ph idx="5" type="subTitle"/>
@@ -43767,7 +44820,7 @@
       </p:sp>
       <p:sp>
         <p:nvSpPr>
-          <p:cNvPr id="503" name="Google Shape;503;p31"/>
+          <p:cNvPr id="520" name="Google Shape;520;p32"/>
           <p:cNvSpPr txBox="1"/>
           <p:nvPr>
             <p:ph idx="6" type="subTitle"/>
@@ -43807,7 +44860,7 @@
       </p:sp>
       <p:sp>
         <p:nvSpPr>
-          <p:cNvPr id="504" name="Google Shape;504;p31"/>
+          <p:cNvPr id="521" name="Google Shape;521;p32"/>
           <p:cNvSpPr txBox="1"/>
           <p:nvPr>
             <p:ph type="title"/>
@@ -43867,7 +44920,7 @@
       </p:sp>
       <p:sp>
         <p:nvSpPr>
-          <p:cNvPr id="505" name="Google Shape;505;p31"/>
+          <p:cNvPr id="522" name="Google Shape;522;p32"/>
           <p:cNvSpPr txBox="1"/>
           <p:nvPr>
             <p:ph idx="2" type="subTitle"/>
@@ -43911,7 +44964,7 @@
       </p:sp>
       <p:sp>
         <p:nvSpPr>
-          <p:cNvPr id="506" name="Google Shape;506;p31"/>
+          <p:cNvPr id="523" name="Google Shape;523;p32"/>
           <p:cNvSpPr txBox="1"/>
           <p:nvPr>
             <p:ph idx="3" type="subTitle"/>
@@ -43971,7 +45024,7 @@
       </p:sp>
       <p:sp>
         <p:nvSpPr>
-          <p:cNvPr id="507" name="Google Shape;507;p31"/>
+          <p:cNvPr id="524" name="Google Shape;524;p32"/>
           <p:cNvSpPr txBox="1"/>
           <p:nvPr>
             <p:ph idx="4" type="subTitle"/>
@@ -44023,7 +45076,7 @@
       </p:sp>
       <p:sp>
         <p:nvSpPr>
-          <p:cNvPr id="508" name="Google Shape;508;p31"/>
+          <p:cNvPr id="525" name="Google Shape;525;p32"/>
           <p:cNvSpPr/>
           <p:nvPr/>
         </p:nvSpPr>
@@ -44165,7 +45218,7 @@
       </p:sp>
       <p:sp>
         <p:nvSpPr>
-          <p:cNvPr id="509" name="Google Shape;509;p31"/>
+          <p:cNvPr id="526" name="Google Shape;526;p32"/>
           <p:cNvSpPr/>
           <p:nvPr/>
         </p:nvSpPr>
@@ -44418,7 +45471,7 @@
       </p:sp>
       <p:grpSp>
         <p:nvGrpSpPr>
-          <p:cNvPr id="510" name="Google Shape;510;p31"/>
+          <p:cNvPr id="527" name="Google Shape;527;p32"/>
           <p:cNvGrpSpPr/>
           <p:nvPr/>
         </p:nvGrpSpPr>
@@ -44432,7 +45485,7 @@
         </p:grpSpPr>
         <p:sp>
           <p:nvSpPr>
-            <p:cNvPr id="511" name="Google Shape;511;p31"/>
+            <p:cNvPr id="528" name="Google Shape;528;p32"/>
             <p:cNvSpPr/>
             <p:nvPr/>
           </p:nvSpPr>
@@ -44483,7 +45536,7 @@
         </p:sp>
         <p:sp>
           <p:nvSpPr>
-            <p:cNvPr id="512" name="Google Shape;512;p31"/>
+            <p:cNvPr id="529" name="Google Shape;529;p32"/>
             <p:cNvSpPr/>
             <p:nvPr/>
           </p:nvSpPr>
@@ -44584,7 +45637,7 @@
       </p:grpSp>
       <p:grpSp>
         <p:nvGrpSpPr>
-          <p:cNvPr id="513" name="Google Shape;513;p31"/>
+          <p:cNvPr id="530" name="Google Shape;530;p32"/>
           <p:cNvGrpSpPr/>
           <p:nvPr/>
         </p:nvGrpSpPr>
@@ -44598,7 +45651,7 @@
         </p:grpSpPr>
         <p:sp>
           <p:nvSpPr>
-            <p:cNvPr id="514" name="Google Shape;514;p31"/>
+            <p:cNvPr id="531" name="Google Shape;531;p32"/>
             <p:cNvSpPr/>
             <p:nvPr/>
           </p:nvSpPr>
@@ -44649,7 +45702,7 @@
         </p:sp>
         <p:sp>
           <p:nvSpPr>
-            <p:cNvPr id="515" name="Google Shape;515;p31"/>
+            <p:cNvPr id="532" name="Google Shape;532;p32"/>
             <p:cNvSpPr/>
             <p:nvPr/>
           </p:nvSpPr>
@@ -44807,7 +45860,7 @@
       </p:grpSp>
       <p:sp>
         <p:nvSpPr>
-          <p:cNvPr id="516" name="Google Shape;516;p31"/>
+          <p:cNvPr id="533" name="Google Shape;533;p32"/>
           <p:cNvSpPr/>
           <p:nvPr/>
         </p:nvSpPr>
@@ -45003,7 +46056,7 @@
       </p:sp>
       <p:grpSp>
         <p:nvGrpSpPr>
-          <p:cNvPr id="517" name="Google Shape;517;p31"/>
+          <p:cNvPr id="534" name="Google Shape;534;p32"/>
           <p:cNvGrpSpPr/>
           <p:nvPr/>
         </p:nvGrpSpPr>
@@ -45017,7 +46070,7 @@
         </p:grpSpPr>
         <p:sp>
           <p:nvSpPr>
-            <p:cNvPr id="518" name="Google Shape;518;p31"/>
+            <p:cNvPr id="535" name="Google Shape;535;p32"/>
             <p:cNvSpPr/>
             <p:nvPr/>
           </p:nvSpPr>
@@ -45068,7 +46121,7 @@
         </p:sp>
         <p:sp>
           <p:nvSpPr>
-            <p:cNvPr id="519" name="Google Shape;519;p31"/>
+            <p:cNvPr id="536" name="Google Shape;536;p32"/>
             <p:cNvSpPr/>
             <p:nvPr/>
           </p:nvSpPr>
@@ -45120,7 +46173,7 @@
       </p:grpSp>
       <p:grpSp>
         <p:nvGrpSpPr>
-          <p:cNvPr id="520" name="Google Shape;520;p31"/>
+          <p:cNvPr id="537" name="Google Shape;537;p32"/>
           <p:cNvGrpSpPr/>
           <p:nvPr/>
         </p:nvGrpSpPr>
@@ -45134,7 +46187,7 @@
         </p:grpSpPr>
         <p:sp>
           <p:nvSpPr>
-            <p:cNvPr id="521" name="Google Shape;521;p31"/>
+            <p:cNvPr id="538" name="Google Shape;538;p32"/>
             <p:cNvSpPr/>
             <p:nvPr/>
           </p:nvSpPr>
@@ -45212,7 +46265,7 @@
         </p:sp>
         <p:sp>
           <p:nvSpPr>
-            <p:cNvPr id="522" name="Google Shape;522;p31"/>
+            <p:cNvPr id="539" name="Google Shape;539;p32"/>
             <p:cNvSpPr/>
             <p:nvPr/>
           </p:nvSpPr>
@@ -45308,7 +46361,7 @@
         </p:sp>
         <p:sp>
           <p:nvSpPr>
-            <p:cNvPr id="523" name="Google Shape;523;p31"/>
+            <p:cNvPr id="540" name="Google Shape;540;p32"/>
             <p:cNvSpPr/>
             <p:nvPr/>
           </p:nvSpPr>
@@ -45398,12 +46451,12 @@
 </p:sld>
 </file>
 
-<file path=ppt/slides/slide7.xml><?xml version="1.0" encoding="utf-8"?>
+<file path=ppt/slides/slide8.xml><?xml version="1.0" encoding="utf-8"?>
 <p:sld xmlns:a="http://schemas.openxmlformats.org/drawingml/2006/main" xmlns:r="http://schemas.openxmlformats.org/officeDocument/2006/relationships" xmlns:mc="http://schemas.openxmlformats.org/markup-compatibility/2006" xmlns:mv="urn:schemas-microsoft-com:mac:vml" xmlns:p="http://schemas.openxmlformats.org/presentationml/2006/main" xmlns:c="http://schemas.openxmlformats.org/drawingml/2006/chart" xmlns:dgm="http://schemas.openxmlformats.org/drawingml/2006/diagram" xmlns:o="urn:schemas-microsoft-com:office:office" xmlns:v="urn:schemas-microsoft-com:vml" xmlns:pvml="urn:schemas-microsoft-com:office:powerpoint" xmlns:com="http://schemas.openxmlformats.org/drawingml/2006/compatibility" xmlns:p14="http://schemas.microsoft.com/office/powerpoint/2010/main" xmlns:p15="http://schemas.microsoft.com/office/powerpoint/2012/main" xmlns:ahyp="http://schemas.microsoft.com/office/drawing/2018/hyperlinkcolor">
   <p:cSld>
     <p:spTree>
       <p:nvGrpSpPr>
-        <p:cNvPr id="527" name="Shape 527"/>
+        <p:cNvPr id="544" name="Shape 544"/>
         <p:cNvGrpSpPr/>
         <p:nvPr/>
       </p:nvGrpSpPr>
@@ -45417,7 +46470,7 @@
       </p:grpSpPr>
       <p:sp>
         <p:nvSpPr>
-          <p:cNvPr id="528" name="Google Shape;528;p32"/>
+          <p:cNvPr id="545" name="Google Shape;545;p33"/>
           <p:cNvSpPr txBox="1"/>
           <p:nvPr>
             <p:ph idx="4294967295" type="ctrTitle"/>
@@ -45461,7 +46514,7 @@
       </p:sp>
       <p:grpSp>
         <p:nvGrpSpPr>
-          <p:cNvPr id="529" name="Google Shape;529;p32"/>
+          <p:cNvPr id="546" name="Google Shape;546;p33"/>
           <p:cNvGrpSpPr/>
           <p:nvPr/>
         </p:nvGrpSpPr>
@@ -45475,7 +46528,7 @@
         </p:grpSpPr>
         <p:sp>
           <p:nvSpPr>
-            <p:cNvPr id="530" name="Google Shape;530;p32"/>
+            <p:cNvPr id="547" name="Google Shape;547;p33"/>
             <p:cNvSpPr txBox="1"/>
             <p:nvPr/>
           </p:nvSpPr>
@@ -45533,7 +46586,7 @@
         </p:sp>
         <p:sp>
           <p:nvSpPr>
-            <p:cNvPr id="531" name="Google Shape;531;p32"/>
+            <p:cNvPr id="548" name="Google Shape;548;p33"/>
             <p:cNvSpPr/>
             <p:nvPr/>
           </p:nvSpPr>
@@ -45632,7 +46685,7 @@
         </p:sp>
         <p:sp>
           <p:nvSpPr>
-            <p:cNvPr id="532" name="Google Shape;532;p32"/>
+            <p:cNvPr id="549" name="Google Shape;549;p33"/>
             <p:cNvSpPr/>
             <p:nvPr/>
           </p:nvSpPr>
@@ -45717,7 +46770,7 @@
         </p:sp>
         <p:sp>
           <p:nvSpPr>
-            <p:cNvPr id="533" name="Google Shape;533;p32"/>
+            <p:cNvPr id="550" name="Google Shape;550;p33"/>
             <p:cNvSpPr/>
             <p:nvPr/>
           </p:nvSpPr>
@@ -45815,7 +46868,7 @@
         </p:sp>
         <p:sp>
           <p:nvSpPr>
-            <p:cNvPr id="534" name="Google Shape;534;p32"/>
+            <p:cNvPr id="551" name="Google Shape;551;p33"/>
             <p:cNvSpPr txBox="1"/>
             <p:nvPr/>
           </p:nvSpPr>
@@ -45865,7 +46918,7 @@
       </p:grpSp>
       <p:grpSp>
         <p:nvGrpSpPr>
-          <p:cNvPr id="535" name="Google Shape;535;p32"/>
+          <p:cNvPr id="552" name="Google Shape;552;p33"/>
           <p:cNvGrpSpPr/>
           <p:nvPr/>
         </p:nvGrpSpPr>
@@ -45879,7 +46932,7 @@
         </p:grpSpPr>
         <p:sp>
           <p:nvSpPr>
-            <p:cNvPr id="536" name="Google Shape;536;p32"/>
+            <p:cNvPr id="553" name="Google Shape;553;p33"/>
             <p:cNvSpPr txBox="1"/>
             <p:nvPr/>
           </p:nvSpPr>
@@ -45937,7 +46990,7 @@
         </p:sp>
         <p:sp>
           <p:nvSpPr>
-            <p:cNvPr id="537" name="Google Shape;537;p32"/>
+            <p:cNvPr id="554" name="Google Shape;554;p33"/>
             <p:cNvSpPr/>
             <p:nvPr/>
           </p:nvSpPr>
@@ -46036,7 +47089,7 @@
         </p:sp>
         <p:sp>
           <p:nvSpPr>
-            <p:cNvPr id="538" name="Google Shape;538;p32"/>
+            <p:cNvPr id="555" name="Google Shape;555;p33"/>
             <p:cNvSpPr/>
             <p:nvPr/>
           </p:nvSpPr>
@@ -46121,7 +47174,7 @@
         </p:sp>
         <p:sp>
           <p:nvSpPr>
-            <p:cNvPr id="539" name="Google Shape;539;p32"/>
+            <p:cNvPr id="556" name="Google Shape;556;p33"/>
             <p:cNvSpPr/>
             <p:nvPr/>
           </p:nvSpPr>
@@ -46219,7 +47272,7 @@
         </p:sp>
         <p:sp>
           <p:nvSpPr>
-            <p:cNvPr id="540" name="Google Shape;540;p32"/>
+            <p:cNvPr id="557" name="Google Shape;557;p33"/>
             <p:cNvSpPr txBox="1"/>
             <p:nvPr/>
           </p:nvSpPr>
@@ -46269,7 +47322,7 @@
       </p:grpSp>
       <p:grpSp>
         <p:nvGrpSpPr>
-          <p:cNvPr id="541" name="Google Shape;541;p32"/>
+          <p:cNvPr id="558" name="Google Shape;558;p33"/>
           <p:cNvGrpSpPr/>
           <p:nvPr/>
         </p:nvGrpSpPr>
@@ -46283,7 +47336,7 @@
         </p:grpSpPr>
         <p:sp>
           <p:nvSpPr>
-            <p:cNvPr id="542" name="Google Shape;542;p32"/>
+            <p:cNvPr id="559" name="Google Shape;559;p33"/>
             <p:cNvSpPr txBox="1"/>
             <p:nvPr/>
           </p:nvSpPr>
@@ -46341,7 +47394,7 @@
         </p:sp>
         <p:sp>
           <p:nvSpPr>
-            <p:cNvPr id="543" name="Google Shape;543;p32"/>
+            <p:cNvPr id="560" name="Google Shape;560;p33"/>
             <p:cNvSpPr/>
             <p:nvPr/>
           </p:nvSpPr>
@@ -46440,7 +47493,7 @@
         </p:sp>
         <p:sp>
           <p:nvSpPr>
-            <p:cNvPr id="544" name="Google Shape;544;p32"/>
+            <p:cNvPr id="561" name="Google Shape;561;p33"/>
             <p:cNvSpPr/>
             <p:nvPr/>
           </p:nvSpPr>
@@ -46525,7 +47578,7 @@
         </p:sp>
         <p:sp>
           <p:nvSpPr>
-            <p:cNvPr id="545" name="Google Shape;545;p32"/>
+            <p:cNvPr id="562" name="Google Shape;562;p33"/>
             <p:cNvSpPr/>
             <p:nvPr/>
           </p:nvSpPr>
@@ -46651,7 +47704,7 @@
         </p:sp>
         <p:sp>
           <p:nvSpPr>
-            <p:cNvPr id="546" name="Google Shape;546;p32"/>
+            <p:cNvPr id="563" name="Google Shape;563;p33"/>
             <p:cNvSpPr txBox="1"/>
             <p:nvPr/>
           </p:nvSpPr>
@@ -46701,7 +47754,7 @@
       </p:grpSp>
       <p:grpSp>
         <p:nvGrpSpPr>
-          <p:cNvPr id="547" name="Google Shape;547;p32"/>
+          <p:cNvPr id="564" name="Google Shape;564;p33"/>
           <p:cNvGrpSpPr/>
           <p:nvPr/>
         </p:nvGrpSpPr>
@@ -46715,7 +47768,7 @@
         </p:grpSpPr>
         <p:sp>
           <p:nvSpPr>
-            <p:cNvPr id="548" name="Google Shape;548;p32"/>
+            <p:cNvPr id="565" name="Google Shape;565;p33"/>
             <p:cNvSpPr txBox="1"/>
             <p:nvPr/>
           </p:nvSpPr>
@@ -46773,7 +47826,7 @@
         </p:sp>
         <p:sp>
           <p:nvSpPr>
-            <p:cNvPr id="549" name="Google Shape;549;p32"/>
+            <p:cNvPr id="566" name="Google Shape;566;p33"/>
             <p:cNvSpPr/>
             <p:nvPr/>
           </p:nvSpPr>
@@ -46872,7 +47925,7 @@
         </p:sp>
         <p:sp>
           <p:nvSpPr>
-            <p:cNvPr id="550" name="Google Shape;550;p32"/>
+            <p:cNvPr id="567" name="Google Shape;567;p33"/>
             <p:cNvSpPr/>
             <p:nvPr/>
           </p:nvSpPr>
@@ -46957,7 +48010,7 @@
         </p:sp>
         <p:sp>
           <p:nvSpPr>
-            <p:cNvPr id="551" name="Google Shape;551;p32"/>
+            <p:cNvPr id="568" name="Google Shape;568;p33"/>
             <p:cNvSpPr/>
             <p:nvPr/>
           </p:nvSpPr>
@@ -47055,7 +48108,7 @@
         </p:sp>
         <p:sp>
           <p:nvSpPr>
-            <p:cNvPr id="552" name="Google Shape;552;p32"/>
+            <p:cNvPr id="569" name="Google Shape;569;p33"/>
             <p:cNvSpPr txBox="1"/>
             <p:nvPr/>
           </p:nvSpPr>
@@ -47111,12 +48164,12 @@
 </p:sld>
 </file>
 
-<file path=ppt/slides/slide8.xml><?xml version="1.0" encoding="utf-8"?>
+<file path=ppt/slides/slide9.xml><?xml version="1.0" encoding="utf-8"?>
 <p:sld xmlns:a="http://schemas.openxmlformats.org/drawingml/2006/main" xmlns:r="http://schemas.openxmlformats.org/officeDocument/2006/relationships" xmlns:mc="http://schemas.openxmlformats.org/markup-compatibility/2006" xmlns:mv="urn:schemas-microsoft-com:mac:vml" xmlns:p="http://schemas.openxmlformats.org/presentationml/2006/main" xmlns:c="http://schemas.openxmlformats.org/drawingml/2006/chart" xmlns:dgm="http://schemas.openxmlformats.org/drawingml/2006/diagram" xmlns:o="urn:schemas-microsoft-com:office:office" xmlns:v="urn:schemas-microsoft-com:vml" xmlns:pvml="urn:schemas-microsoft-com:office:powerpoint" xmlns:com="http://schemas.openxmlformats.org/drawingml/2006/compatibility" xmlns:p14="http://schemas.microsoft.com/office/powerpoint/2010/main" xmlns:p15="http://schemas.microsoft.com/office/powerpoint/2012/main" xmlns:ahyp="http://schemas.microsoft.com/office/drawing/2018/hyperlinkcolor">
   <p:cSld>
     <p:spTree>
       <p:nvGrpSpPr>
-        <p:cNvPr id="556" name="Shape 556"/>
+        <p:cNvPr id="573" name="Shape 573"/>
         <p:cNvGrpSpPr/>
         <p:nvPr/>
       </p:nvGrpSpPr>
@@ -47130,7 +48183,7 @@
       </p:grpSpPr>
       <p:sp>
         <p:nvSpPr>
-          <p:cNvPr id="557" name="Google Shape;557;p33"/>
+          <p:cNvPr id="574" name="Google Shape;574;p34"/>
           <p:cNvSpPr txBox="1"/>
           <p:nvPr>
             <p:ph idx="4294967295" type="ctrTitle"/>
@@ -47174,7 +48227,7 @@
       </p:sp>
       <p:pic>
         <p:nvPicPr>
-          <p:cNvPr id="558" name="Google Shape;558;p33"/>
+          <p:cNvPr id="575" name="Google Shape;575;p34"/>
           <p:cNvPicPr preferRelativeResize="0"/>
           <p:nvPr/>
         </p:nvPicPr>
@@ -47202,7 +48255,7 @@
       </p:pic>
       <p:sp>
         <p:nvSpPr>
-          <p:cNvPr id="559" name="Google Shape;559;p33"/>
+          <p:cNvPr id="576" name="Google Shape;576;p34"/>
           <p:cNvSpPr txBox="1"/>
           <p:nvPr/>
         </p:nvSpPr>
@@ -47266,162 +48319,286 @@
 </p:sld>
 </file>
 
-<file path=ppt/slides/slide9.xml><?xml version="1.0" encoding="utf-8"?>
-<p:sld xmlns:a="http://schemas.openxmlformats.org/drawingml/2006/main" xmlns:r="http://schemas.openxmlformats.org/officeDocument/2006/relationships" xmlns:mc="http://schemas.openxmlformats.org/markup-compatibility/2006" xmlns:mv="urn:schemas-microsoft-com:mac:vml" xmlns:p="http://schemas.openxmlformats.org/presentationml/2006/main" xmlns:c="http://schemas.openxmlformats.org/drawingml/2006/chart" xmlns:dgm="http://schemas.openxmlformats.org/drawingml/2006/diagram" xmlns:o="urn:schemas-microsoft-com:office:office" xmlns:v="urn:schemas-microsoft-com:vml" xmlns:pvml="urn:schemas-microsoft-com:office:powerpoint" xmlns:com="http://schemas.openxmlformats.org/drawingml/2006/compatibility" xmlns:p14="http://schemas.microsoft.com/office/powerpoint/2010/main" xmlns:p15="http://schemas.microsoft.com/office/powerpoint/2012/main" xmlns:ahyp="http://schemas.microsoft.com/office/drawing/2018/hyperlinkcolor">
-  <p:cSld>
-    <p:spTree>
-      <p:nvGrpSpPr>
-        <p:cNvPr id="563" name="Shape 563"/>
-        <p:cNvGrpSpPr/>
-        <p:nvPr/>
-      </p:nvGrpSpPr>
-      <p:grpSpPr>
-        <a:xfrm>
-          <a:off x="0" y="0"/>
-          <a:ext cx="0" cy="0"/>
-          <a:chOff x="0" y="0"/>
-          <a:chExt cx="0" cy="0"/>
-        </a:xfrm>
-      </p:grpSpPr>
-      <p:sp>
-        <p:nvSpPr>
-          <p:cNvPr id="564" name="Google Shape;564;p34"/>
-          <p:cNvSpPr txBox="1"/>
-          <p:nvPr>
-            <p:ph idx="4294967295" type="ctrTitle"/>
-          </p:nvPr>
-        </p:nvSpPr>
-        <p:spPr>
-          <a:xfrm>
-            <a:off x="1260925" y="687525"/>
-            <a:ext cx="6548400" cy="623400"/>
-          </a:xfrm>
-          <a:prstGeom prst="rect">
-            <a:avLst/>
-          </a:prstGeom>
-        </p:spPr>
-        <p:txBody>
-          <a:bodyPr anchorCtr="0" anchor="t" bIns="91425" lIns="91425" spcFirstLastPara="1" rIns="91425" wrap="square" tIns="91425">
-            <a:noAutofit/>
-          </a:bodyPr>
-          <a:lstStyle/>
-          <a:p>
-            <a:pPr indent="0" lvl="0" marL="0" rtl="0" algn="l">
-              <a:spcBef>
-                <a:spcPts val="0"/>
-              </a:spcBef>
-              <a:spcAft>
-                <a:spcPts val="0"/>
-              </a:spcAft>
-              <a:buNone/>
-            </a:pPr>
-            <a:r>
-              <a:rPr lang="en" sz="3300"/>
-              <a:t>  </a:t>
-            </a:r>
-            <a:endParaRPr sz="2300">
-              <a:solidFill>
-                <a:schemeClr val="lt2"/>
-              </a:solidFill>
-            </a:endParaRPr>
-          </a:p>
-        </p:txBody>
-      </p:sp>
-      <p:sp>
-        <p:nvSpPr>
-          <p:cNvPr id="565" name="Google Shape;565;p34"/>
-          <p:cNvSpPr txBox="1"/>
-          <p:nvPr/>
-        </p:nvSpPr>
-        <p:spPr>
-          <a:xfrm>
-            <a:off x="1970325" y="157900"/>
-            <a:ext cx="5477400" cy="692700"/>
-          </a:xfrm>
-          <a:prstGeom prst="rect">
-            <a:avLst/>
-          </a:prstGeom>
-          <a:noFill/>
-          <a:ln>
-            <a:noFill/>
-          </a:ln>
-        </p:spPr>
-        <p:txBody>
-          <a:bodyPr anchorCtr="0" anchor="t" bIns="91425" lIns="91425" spcFirstLastPara="1" rIns="91425" wrap="square" tIns="91425">
-            <a:spAutoFit/>
-          </a:bodyPr>
-          <a:lstStyle/>
-          <a:p>
-            <a:pPr indent="0" lvl="0" marL="0" rtl="0" algn="ctr">
-              <a:spcBef>
-                <a:spcPts val="0"/>
-              </a:spcBef>
-              <a:spcAft>
-                <a:spcPts val="0"/>
-              </a:spcAft>
-              <a:buNone/>
-            </a:pPr>
-            <a:r>
-              <a:rPr lang="en" sz="3300">
-                <a:solidFill>
-                  <a:schemeClr val="dk1"/>
-                </a:solidFill>
-                <a:latin typeface="Rubik Black"/>
-                <a:ea typeface="Rubik Black"/>
-                <a:cs typeface="Rubik Black"/>
-                <a:sym typeface="Rubik Black"/>
-              </a:rPr>
-              <a:t>EDA FINDINGS CONT…</a:t>
-            </a:r>
-            <a:endParaRPr sz="1000">
-              <a:solidFill>
-                <a:schemeClr val="dk1"/>
-              </a:solidFill>
-              <a:latin typeface="Rubik Black"/>
-              <a:ea typeface="Rubik Black"/>
-              <a:cs typeface="Rubik Black"/>
-              <a:sym typeface="Rubik Black"/>
-            </a:endParaRPr>
-          </a:p>
-        </p:txBody>
-      </p:sp>
-      <p:pic>
-        <p:nvPicPr>
-          <p:cNvPr id="566" name="Google Shape;566;p34"/>
-          <p:cNvPicPr preferRelativeResize="0"/>
-          <p:nvPr/>
-        </p:nvPicPr>
-        <p:blipFill>
-          <a:blip r:embed="rId3">
-            <a:alphaModFix/>
-          </a:blip>
-          <a:stretch>
-            <a:fillRect/>
-          </a:stretch>
-        </p:blipFill>
-        <p:spPr>
-          <a:xfrm>
-            <a:off x="164250" y="1037800"/>
-            <a:ext cx="8579531" cy="3682675"/>
-          </a:xfrm>
-          <a:prstGeom prst="rect">
-            <a:avLst/>
-          </a:prstGeom>
-          <a:noFill/>
-          <a:ln>
-            <a:noFill/>
-          </a:ln>
-        </p:spPr>
-      </p:pic>
-    </p:spTree>
-  </p:cSld>
-  <p:clrMapOvr>
-    <a:masterClrMapping/>
-  </p:clrMapOvr>
-</p:sld>
+<file path=ppt/theme/theme1.xml><?xml version="1.0" encoding="utf-8"?>
+<a:theme xmlns:a="http://schemas.openxmlformats.org/drawingml/2006/main" xmlns:r="http://schemas.openxmlformats.org/officeDocument/2006/relationships">
+  <a:themeElements>
+    <a:clrScheme name="Default">
+      <a:dk1>
+        <a:srgbClr val="000000"/>
+      </a:dk1>
+      <a:lt1>
+        <a:srgbClr val="FFFFFF"/>
+      </a:lt1>
+      <a:dk2>
+        <a:srgbClr val="158158"/>
+      </a:dk2>
+      <a:lt2>
+        <a:srgbClr val="F3F3F3"/>
+      </a:lt2>
+      <a:accent1>
+        <a:srgbClr val="058DC7"/>
+      </a:accent1>
+      <a:accent2>
+        <a:srgbClr val="50B432"/>
+      </a:accent2>
+      <a:accent3>
+        <a:srgbClr val="ED561B"/>
+      </a:accent3>
+      <a:accent4>
+        <a:srgbClr val="EDEF00"/>
+      </a:accent4>
+      <a:accent5>
+        <a:srgbClr val="24CBE5"/>
+      </a:accent5>
+      <a:accent6>
+        <a:srgbClr val="64E572"/>
+      </a:accent6>
+      <a:hlink>
+        <a:srgbClr val="2200CC"/>
+      </a:hlink>
+      <a:folHlink>
+        <a:srgbClr val="551A8B"/>
+      </a:folHlink>
+    </a:clrScheme>
+    <a:fontScheme name="Office">
+      <a:majorFont>
+        <a:latin typeface="Arial"/>
+        <a:ea typeface=""/>
+        <a:cs typeface=""/>
+        <a:font script="Jpan" typeface="ＭＳ Ｐゴシック"/>
+        <a:font script="Hang" typeface="맑은 고딕"/>
+        <a:font script="Hans" typeface="宋体"/>
+        <a:font script="Hant" typeface="新細明體"/>
+        <a:font script="Arab" typeface="Times New Roman"/>
+        <a:font script="Hebr" typeface="Times New Roman"/>
+        <a:font script="Thai" typeface="Angsana New"/>
+        <a:font script="Ethi" typeface="Nyala"/>
+        <a:font script="Beng" typeface="Vrinda"/>
+        <a:font script="Gujr" typeface="Shruti"/>
+        <a:font script="Khmr" typeface="MoolBoran"/>
+        <a:font script="Knda" typeface="Tunga"/>
+        <a:font script="Guru" typeface="Raavi"/>
+        <a:font script="Cans" typeface="Euphemia"/>
+        <a:font script="Cher" typeface="Plantagenet Cherokee"/>
+        <a:font script="Yiii" typeface="Microsoft Yi Baiti"/>
+        <a:font script="Tibt" typeface="Microsoft Himalaya"/>
+        <a:font script="Thaa" typeface="MV Boli"/>
+        <a:font script="Deva" typeface="Mangal"/>
+        <a:font script="Telu" typeface="Gautami"/>
+        <a:font script="Taml" typeface="Latha"/>
+        <a:font script="Syrc" typeface="Estrangelo Edessa"/>
+        <a:font script="Orya" typeface="Kalinga"/>
+        <a:font script="Mlym" typeface="Kartika"/>
+        <a:font script="Laoo" typeface="DokChampa"/>
+        <a:font script="Sinh" typeface="Iskoola Pota"/>
+        <a:font script="Mong" typeface="Mongolian Baiti"/>
+        <a:font script="Viet" typeface="Times New Roman"/>
+        <a:font script="Uigh" typeface="Microsoft Uighur"/>
+        <a:font script="Geor" typeface="Sylfaen"/>
+      </a:majorFont>
+      <a:minorFont>
+        <a:latin typeface="Arial"/>
+        <a:ea typeface=""/>
+        <a:cs typeface=""/>
+        <a:font script="Jpan" typeface="ＭＳ Ｐゴシック"/>
+        <a:font script="Hang" typeface="맑은 고딕"/>
+        <a:font script="Hans" typeface="宋体"/>
+        <a:font script="Hant" typeface="新細明體"/>
+        <a:font script="Arab" typeface="Arial"/>
+        <a:font script="Hebr" typeface="Arial"/>
+        <a:font script="Thai" typeface="Cordia New"/>
+        <a:font script="Ethi" typeface="Nyala"/>
+        <a:font script="Beng" typeface="Vrinda"/>
+        <a:font script="Gujr" typeface="Shruti"/>
+        <a:font script="Khmr" typeface="DaunPenh"/>
+        <a:font script="Knda" typeface="Tunga"/>
+        <a:font script="Guru" typeface="Raavi"/>
+        <a:font script="Cans" typeface="Euphemia"/>
+        <a:font script="Cher" typeface="Plantagenet Cherokee"/>
+        <a:font script="Yiii" typeface="Microsoft Yi Baiti"/>
+        <a:font script="Tibt" typeface="Microsoft Himalaya"/>
+        <a:font script="Thaa" typeface="MV Boli"/>
+        <a:font script="Deva" typeface="Mangal"/>
+        <a:font script="Telu" typeface="Gautami"/>
+        <a:font script="Taml" typeface="Latha"/>
+        <a:font script="Syrc" typeface="Estrangelo Edessa"/>
+        <a:font script="Orya" typeface="Kalinga"/>
+        <a:font script="Mlym" typeface="Kartika"/>
+        <a:font script="Laoo" typeface="DokChampa"/>
+        <a:font script="Sinh" typeface="Iskoola Pota"/>
+        <a:font script="Mong" typeface="Mongolian Baiti"/>
+        <a:font script="Viet" typeface="Arial"/>
+        <a:font script="Uigh" typeface="Microsoft Uighur"/>
+        <a:font script="Geor" typeface="Sylfaen"/>
+      </a:minorFont>
+    </a:fontScheme>
+    <a:fmtScheme name="Office">
+      <a:fillStyleLst>
+        <a:solidFill>
+          <a:schemeClr val="phClr"/>
+        </a:solidFill>
+        <a:gradFill rotWithShape="1">
+          <a:gsLst>
+            <a:gs pos="0">
+              <a:schemeClr val="phClr">
+                <a:tint val="50000"/>
+                <a:satMod val="300000"/>
+              </a:schemeClr>
+            </a:gs>
+            <a:gs pos="35000">
+              <a:schemeClr val="phClr">
+                <a:tint val="37000"/>
+                <a:satMod val="300000"/>
+              </a:schemeClr>
+            </a:gs>
+            <a:gs pos="100000">
+              <a:schemeClr val="phClr">
+                <a:tint val="15000"/>
+                <a:satMod val="350000"/>
+              </a:schemeClr>
+            </a:gs>
+          </a:gsLst>
+          <a:lin ang="16200000" scaled="1"/>
+        </a:gradFill>
+        <a:gradFill rotWithShape="1">
+          <a:gsLst>
+            <a:gs pos="0">
+              <a:schemeClr val="phClr">
+                <a:tint val="100000"/>
+                <a:shade val="100000"/>
+                <a:satMod val="130000"/>
+              </a:schemeClr>
+            </a:gs>
+            <a:gs pos="100000">
+              <a:schemeClr val="phClr">
+                <a:tint val="50000"/>
+                <a:shade val="100000"/>
+                <a:satMod val="350000"/>
+              </a:schemeClr>
+            </a:gs>
+          </a:gsLst>
+          <a:lin ang="16200000" scaled="0"/>
+        </a:gradFill>
+      </a:fillStyleLst>
+      <a:lnStyleLst>
+        <a:ln w="9525" cap="flat" cmpd="sng" algn="ctr">
+          <a:solidFill>
+            <a:schemeClr val="phClr">
+              <a:shade val="95000"/>
+              <a:satMod val="105000"/>
+            </a:schemeClr>
+          </a:solidFill>
+          <a:prstDash val="solid"/>
+        </a:ln>
+        <a:ln w="25400" cap="flat" cmpd="sng" algn="ctr">
+          <a:solidFill>
+            <a:schemeClr val="phClr"/>
+          </a:solidFill>
+          <a:prstDash val="solid"/>
+        </a:ln>
+        <a:ln w="38100" cap="flat" cmpd="sng" algn="ctr">
+          <a:solidFill>
+            <a:schemeClr val="phClr"/>
+          </a:solidFill>
+          <a:prstDash val="solid"/>
+        </a:ln>
+      </a:lnStyleLst>
+      <a:effectStyleLst>
+        <a:effectStyle>
+          <a:effectLst>
+            <a:outerShdw blurRad="40000" dist="20000" dir="5400000" rotWithShape="0">
+              <a:srgbClr val="000000">
+                <a:alpha val="38000"/>
+              </a:srgbClr>
+            </a:outerShdw>
+          </a:effectLst>
+        </a:effectStyle>
+        <a:effectStyle>
+          <a:effectLst>
+            <a:outerShdw blurRad="40000" dist="23000" dir="5400000" rotWithShape="0">
+              <a:srgbClr val="000000">
+                <a:alpha val="35000"/>
+              </a:srgbClr>
+            </a:outerShdw>
+          </a:effectLst>
+        </a:effectStyle>
+        <a:effectStyle>
+          <a:effectLst>
+            <a:outerShdw blurRad="40000" dist="23000" dir="5400000" rotWithShape="0">
+              <a:srgbClr val="000000">
+                <a:alpha val="35000"/>
+              </a:srgbClr>
+            </a:outerShdw>
+          </a:effectLst>
+          <a:scene3d>
+            <a:camera prst="orthographicFront">
+              <a:rot lat="0" lon="0" rev="0"/>
+            </a:camera>
+            <a:lightRig rig="threePt" dir="t">
+              <a:rot lat="0" lon="0" rev="1200000"/>
+            </a:lightRig>
+          </a:scene3d>
+          <a:sp3d>
+            <a:bevelT w="63500" h="25400"/>
+          </a:sp3d>
+        </a:effectStyle>
+      </a:effectStyleLst>
+      <a:bgFillStyleLst>
+        <a:solidFill>
+          <a:schemeClr val="phClr"/>
+        </a:solidFill>
+        <a:gradFill rotWithShape="1">
+          <a:gsLst>
+            <a:gs pos="0">
+              <a:schemeClr val="phClr">
+                <a:tint val="40000"/>
+                <a:satMod val="350000"/>
+              </a:schemeClr>
+            </a:gs>
+            <a:gs pos="40000">
+              <a:schemeClr val="phClr">
+                <a:tint val="45000"/>
+                <a:shade val="99000"/>
+                <a:satMod val="350000"/>
+              </a:schemeClr>
+            </a:gs>
+            <a:gs pos="100000">
+              <a:schemeClr val="phClr">
+                <a:shade val="20000"/>
+                <a:satMod val="255000"/>
+              </a:schemeClr>
+            </a:gs>
+          </a:gsLst>
+          <a:path path="circle">
+            <a:fillToRect l="50000" t="-80000" r="50000" b="180000"/>
+          </a:path>
+        </a:gradFill>
+        <a:gradFill rotWithShape="1">
+          <a:gsLst>
+            <a:gs pos="0">
+              <a:schemeClr val="phClr">
+                <a:tint val="80000"/>
+                <a:satMod val="300000"/>
+              </a:schemeClr>
+            </a:gs>
+            <a:gs pos="100000">
+              <a:schemeClr val="phClr">
+                <a:shade val="30000"/>
+                <a:satMod val="200000"/>
+              </a:schemeClr>
+            </a:gs>
+          </a:gsLst>
+          <a:path path="circle">
+            <a:fillToRect l="50000" t="50000" r="50000" b="50000"/>
+          </a:path>
+        </a:gradFill>
+      </a:bgFillStyleLst>
+    </a:fmtScheme>
+  </a:themeElements>
+</a:theme>
 </file>
 
-<file path=ppt/theme/theme1.xml><?xml version="1.0" encoding="utf-8"?>
+<file path=ppt/theme/theme2.xml><?xml version="1.0" encoding="utf-8"?>
 <a:theme xmlns:a="http://schemas.openxmlformats.org/drawingml/2006/main" xmlns:r="http://schemas.openxmlformats.org/officeDocument/2006/relationships" name="Soft Colors UI Design for Agencies by Slidesgo">
   <a:themeElements>
     <a:clrScheme name="Simple Light">
@@ -47698,283 +48875,4 @@
     </a:fmtScheme>
   </a:themeElements>
 </a:theme>
-</file>
-
-<file path=ppt/theme/theme2.xml><?xml version="1.0" encoding="utf-8"?>
-<a:theme xmlns:a="http://schemas.openxmlformats.org/drawingml/2006/main" xmlns:r="http://schemas.openxmlformats.org/officeDocument/2006/relationships">
-  <a:themeElements>
-    <a:clrScheme name="Default">
-      <a:dk1>
-        <a:srgbClr val="000000"/>
-      </a:dk1>
-      <a:lt1>
-        <a:srgbClr val="FFFFFF"/>
-      </a:lt1>
-      <a:dk2>
-        <a:srgbClr val="158158"/>
-      </a:dk2>
-      <a:lt2>
-        <a:srgbClr val="F3F3F3"/>
-      </a:lt2>
-      <a:accent1>
-        <a:srgbClr val="058DC7"/>
-      </a:accent1>
-      <a:accent2>
-        <a:srgbClr val="50B432"/>
-      </a:accent2>
-      <a:accent3>
-        <a:srgbClr val="ED561B"/>
-      </a:accent3>
-      <a:accent4>
-        <a:srgbClr val="EDEF00"/>
-      </a:accent4>
-      <a:accent5>
-        <a:srgbClr val="24CBE5"/>
-      </a:accent5>
-      <a:accent6>
-        <a:srgbClr val="64E572"/>
-      </a:accent6>
-      <a:hlink>
-        <a:srgbClr val="2200CC"/>
-      </a:hlink>
-      <a:folHlink>
-        <a:srgbClr val="551A8B"/>
-      </a:folHlink>
-    </a:clrScheme>
-    <a:fontScheme name="Office">
-      <a:majorFont>
-        <a:latin typeface="Arial"/>
-        <a:ea typeface=""/>
-        <a:cs typeface=""/>
-        <a:font script="Jpan" typeface="ＭＳ Ｐゴシック"/>
-        <a:font script="Hang" typeface="맑은 고딕"/>
-        <a:font script="Hans" typeface="宋体"/>
-        <a:font script="Hant" typeface="新細明體"/>
-        <a:font script="Arab" typeface="Times New Roman"/>
-        <a:font script="Hebr" typeface="Times New Roman"/>
-        <a:font script="Thai" typeface="Angsana New"/>
-        <a:font script="Ethi" typeface="Nyala"/>
-        <a:font script="Beng" typeface="Vrinda"/>
-        <a:font script="Gujr" typeface="Shruti"/>
-        <a:font script="Khmr" typeface="MoolBoran"/>
-        <a:font script="Knda" typeface="Tunga"/>
-        <a:font script="Guru" typeface="Raavi"/>
-        <a:font script="Cans" typeface="Euphemia"/>
-        <a:font script="Cher" typeface="Plantagenet Cherokee"/>
-        <a:font script="Yiii" typeface="Microsoft Yi Baiti"/>
-        <a:font script="Tibt" typeface="Microsoft Himalaya"/>
-        <a:font script="Thaa" typeface="MV Boli"/>
-        <a:font script="Deva" typeface="Mangal"/>
-        <a:font script="Telu" typeface="Gautami"/>
-        <a:font script="Taml" typeface="Latha"/>
-        <a:font script="Syrc" typeface="Estrangelo Edessa"/>
-        <a:font script="Orya" typeface="Kalinga"/>
-        <a:font script="Mlym" typeface="Kartika"/>
-        <a:font script="Laoo" typeface="DokChampa"/>
-        <a:font script="Sinh" typeface="Iskoola Pota"/>
-        <a:font script="Mong" typeface="Mongolian Baiti"/>
-        <a:font script="Viet" typeface="Times New Roman"/>
-        <a:font script="Uigh" typeface="Microsoft Uighur"/>
-        <a:font script="Geor" typeface="Sylfaen"/>
-      </a:majorFont>
-      <a:minorFont>
-        <a:latin typeface="Arial"/>
-        <a:ea typeface=""/>
-        <a:cs typeface=""/>
-        <a:font script="Jpan" typeface="ＭＳ Ｐゴシック"/>
-        <a:font script="Hang" typeface="맑은 고딕"/>
-        <a:font script="Hans" typeface="宋体"/>
-        <a:font script="Hant" typeface="新細明體"/>
-        <a:font script="Arab" typeface="Arial"/>
-        <a:font script="Hebr" typeface="Arial"/>
-        <a:font script="Thai" typeface="Cordia New"/>
-        <a:font script="Ethi" typeface="Nyala"/>
-        <a:font script="Beng" typeface="Vrinda"/>
-        <a:font script="Gujr" typeface="Shruti"/>
-        <a:font script="Khmr" typeface="DaunPenh"/>
-        <a:font script="Knda" typeface="Tunga"/>
-        <a:font script="Guru" typeface="Raavi"/>
-        <a:font script="Cans" typeface="Euphemia"/>
-        <a:font script="Cher" typeface="Plantagenet Cherokee"/>
-        <a:font script="Yiii" typeface="Microsoft Yi Baiti"/>
-        <a:font script="Tibt" typeface="Microsoft Himalaya"/>
-        <a:font script="Thaa" typeface="MV Boli"/>
-        <a:font script="Deva" typeface="Mangal"/>
-        <a:font script="Telu" typeface="Gautami"/>
-        <a:font script="Taml" typeface="Latha"/>
-        <a:font script="Syrc" typeface="Estrangelo Edessa"/>
-        <a:font script="Orya" typeface="Kalinga"/>
-        <a:font script="Mlym" typeface="Kartika"/>
-        <a:font script="Laoo" typeface="DokChampa"/>
-        <a:font script="Sinh" typeface="Iskoola Pota"/>
-        <a:font script="Mong" typeface="Mongolian Baiti"/>
-        <a:font script="Viet" typeface="Arial"/>
-        <a:font script="Uigh" typeface="Microsoft Uighur"/>
-        <a:font script="Geor" typeface="Sylfaen"/>
-      </a:minorFont>
-    </a:fontScheme>
-    <a:fmtScheme name="Office">
-      <a:fillStyleLst>
-        <a:solidFill>
-          <a:schemeClr val="phClr"/>
-        </a:solidFill>
-        <a:gradFill rotWithShape="1">
-          <a:gsLst>
-            <a:gs pos="0">
-              <a:schemeClr val="phClr">
-                <a:tint val="50000"/>
-                <a:satMod val="300000"/>
-              </a:schemeClr>
-            </a:gs>
-            <a:gs pos="35000">
-              <a:schemeClr val="phClr">
-                <a:tint val="37000"/>
-                <a:satMod val="300000"/>
-              </a:schemeClr>
-            </a:gs>
-            <a:gs pos="100000">
-              <a:schemeClr val="phClr">
-                <a:tint val="15000"/>
-                <a:satMod val="350000"/>
-              </a:schemeClr>
-            </a:gs>
-          </a:gsLst>
-          <a:lin ang="16200000" scaled="1"/>
-        </a:gradFill>
-        <a:gradFill rotWithShape="1">
-          <a:gsLst>
-            <a:gs pos="0">
-              <a:schemeClr val="phClr">
-                <a:tint val="100000"/>
-                <a:shade val="100000"/>
-                <a:satMod val="130000"/>
-              </a:schemeClr>
-            </a:gs>
-            <a:gs pos="100000">
-              <a:schemeClr val="phClr">
-                <a:tint val="50000"/>
-                <a:shade val="100000"/>
-                <a:satMod val="350000"/>
-              </a:schemeClr>
-            </a:gs>
-          </a:gsLst>
-          <a:lin ang="16200000" scaled="0"/>
-        </a:gradFill>
-      </a:fillStyleLst>
-      <a:lnStyleLst>
-        <a:ln w="9525" cap="flat" cmpd="sng" algn="ctr">
-          <a:solidFill>
-            <a:schemeClr val="phClr">
-              <a:shade val="95000"/>
-              <a:satMod val="105000"/>
-            </a:schemeClr>
-          </a:solidFill>
-          <a:prstDash val="solid"/>
-        </a:ln>
-        <a:ln w="25400" cap="flat" cmpd="sng" algn="ctr">
-          <a:solidFill>
-            <a:schemeClr val="phClr"/>
-          </a:solidFill>
-          <a:prstDash val="solid"/>
-        </a:ln>
-        <a:ln w="38100" cap="flat" cmpd="sng" algn="ctr">
-          <a:solidFill>
-            <a:schemeClr val="phClr"/>
-          </a:solidFill>
-          <a:prstDash val="solid"/>
-        </a:ln>
-      </a:lnStyleLst>
-      <a:effectStyleLst>
-        <a:effectStyle>
-          <a:effectLst>
-            <a:outerShdw blurRad="40000" dist="20000" dir="5400000" rotWithShape="0">
-              <a:srgbClr val="000000">
-                <a:alpha val="38000"/>
-              </a:srgbClr>
-            </a:outerShdw>
-          </a:effectLst>
-        </a:effectStyle>
-        <a:effectStyle>
-          <a:effectLst>
-            <a:outerShdw blurRad="40000" dist="23000" dir="5400000" rotWithShape="0">
-              <a:srgbClr val="000000">
-                <a:alpha val="35000"/>
-              </a:srgbClr>
-            </a:outerShdw>
-          </a:effectLst>
-        </a:effectStyle>
-        <a:effectStyle>
-          <a:effectLst>
-            <a:outerShdw blurRad="40000" dist="23000" dir="5400000" rotWithShape="0">
-              <a:srgbClr val="000000">
-                <a:alpha val="35000"/>
-              </a:srgbClr>
-            </a:outerShdw>
-          </a:effectLst>
-          <a:scene3d>
-            <a:camera prst="orthographicFront">
-              <a:rot lat="0" lon="0" rev="0"/>
-            </a:camera>
-            <a:lightRig rig="threePt" dir="t">
-              <a:rot lat="0" lon="0" rev="1200000"/>
-            </a:lightRig>
-          </a:scene3d>
-          <a:sp3d>
-            <a:bevelT w="63500" h="25400"/>
-          </a:sp3d>
-        </a:effectStyle>
-      </a:effectStyleLst>
-      <a:bgFillStyleLst>
-        <a:solidFill>
-          <a:schemeClr val="phClr"/>
-        </a:solidFill>
-        <a:gradFill rotWithShape="1">
-          <a:gsLst>
-            <a:gs pos="0">
-              <a:schemeClr val="phClr">
-                <a:tint val="40000"/>
-                <a:satMod val="350000"/>
-              </a:schemeClr>
-            </a:gs>
-            <a:gs pos="40000">
-              <a:schemeClr val="phClr">
-                <a:tint val="45000"/>
-                <a:shade val="99000"/>
-                <a:satMod val="350000"/>
-              </a:schemeClr>
-            </a:gs>
-            <a:gs pos="100000">
-              <a:schemeClr val="phClr">
-                <a:shade val="20000"/>
-                <a:satMod val="255000"/>
-              </a:schemeClr>
-            </a:gs>
-          </a:gsLst>
-          <a:path path="circle">
-            <a:fillToRect l="50000" t="-80000" r="50000" b="180000"/>
-          </a:path>
-        </a:gradFill>
-        <a:gradFill rotWithShape="1">
-          <a:gsLst>
-            <a:gs pos="0">
-              <a:schemeClr val="phClr">
-                <a:tint val="80000"/>
-                <a:satMod val="300000"/>
-              </a:schemeClr>
-            </a:gs>
-            <a:gs pos="100000">
-              <a:schemeClr val="phClr">
-                <a:shade val="30000"/>
-                <a:satMod val="200000"/>
-              </a:schemeClr>
-            </a:gs>
-          </a:gsLst>
-          <a:path path="circle">
-            <a:fillToRect l="50000" t="50000" r="50000" b="50000"/>
-          </a:path>
-        </a:gradFill>
-      </a:bgFillStyleLst>
-    </a:fmtScheme>
-  </a:themeElements>
-</a:theme>
 </file>
</xml_diff>